<commit_message>
add one slide to data leakage case to clarify file system
</commit_message>
<xml_diff>
--- a/NIST_Data_Leakage_Case/NIST_Data_Leakage_03_WebHistory_SQL.pptx
+++ b/NIST_Data_Leakage_Case/NIST_Data_Leakage_03_WebHistory_SQL.pptx
@@ -210,7 +210,7 @@
   <pc:docChgLst>
     <pc:chgData name="Weifeng Xu" userId="e7aed605-a3dd-4d5a-a692-a87037af107b" providerId="ADAL" clId="{409D07DA-7E5C-4EF5-A9AF-5A4926BCA666}"/>
     <pc:docChg chg="undo custSel addSld delSld modSld">
-      <pc:chgData name="Weifeng Xu" userId="e7aed605-a3dd-4d5a-a692-a87037af107b" providerId="ADAL" clId="{409D07DA-7E5C-4EF5-A9AF-5A4926BCA666}" dt="2022-09-27T23:35:18.737" v="849" actId="20577"/>
+      <pc:chgData name="Weifeng Xu" userId="e7aed605-a3dd-4d5a-a692-a87037af107b" providerId="ADAL" clId="{409D07DA-7E5C-4EF5-A9AF-5A4926BCA666}" dt="2023-02-27T14:16:26.910" v="1001" actId="207"/>
       <pc:docMkLst>
         <pc:docMk/>
       </pc:docMkLst>
@@ -345,7 +345,7 @@
         </pc:sldMkLst>
       </pc:sldChg>
       <pc:sldChg chg="addSp modSp new mod modClrScheme chgLayout">
-        <pc:chgData name="Weifeng Xu" userId="e7aed605-a3dd-4d5a-a692-a87037af107b" providerId="ADAL" clId="{409D07DA-7E5C-4EF5-A9AF-5A4926BCA666}" dt="2022-09-27T23:35:18.737" v="849" actId="20577"/>
+        <pc:chgData name="Weifeng Xu" userId="e7aed605-a3dd-4d5a-a692-a87037af107b" providerId="ADAL" clId="{409D07DA-7E5C-4EF5-A9AF-5A4926BCA666}" dt="2023-02-27T14:16:26.910" v="1001" actId="207"/>
         <pc:sldMkLst>
           <pc:docMk/>
           <pc:sldMk cId="3211415656" sldId="302"/>
@@ -359,7 +359,7 @@
           </ac:spMkLst>
         </pc:spChg>
         <pc:spChg chg="add mod ord">
-          <ac:chgData name="Weifeng Xu" userId="e7aed605-a3dd-4d5a-a692-a87037af107b" providerId="ADAL" clId="{409D07DA-7E5C-4EF5-A9AF-5A4926BCA666}" dt="2022-09-27T23:35:18.737" v="849" actId="20577"/>
+          <ac:chgData name="Weifeng Xu" userId="e7aed605-a3dd-4d5a-a692-a87037af107b" providerId="ADAL" clId="{409D07DA-7E5C-4EF5-A9AF-5A4926BCA666}" dt="2023-02-27T14:16:26.910" v="1001" actId="207"/>
           <ac:spMkLst>
             <pc:docMk/>
             <pc:sldMk cId="3211415656" sldId="302"/>
@@ -437,8 +437,8 @@
           </ac:picMkLst>
         </pc:picChg>
       </pc:sldChg>
-      <pc:sldChg chg="addSp delSp modSp new mod">
-        <pc:chgData name="Weifeng Xu" userId="e7aed605-a3dd-4d5a-a692-a87037af107b" providerId="ADAL" clId="{409D07DA-7E5C-4EF5-A9AF-5A4926BCA666}" dt="2022-09-27T21:28:03.999" v="784" actId="1076"/>
+      <pc:sldChg chg="addSp delSp modSp new mod modClrScheme chgLayout">
+        <pc:chgData name="Weifeng Xu" userId="e7aed605-a3dd-4d5a-a692-a87037af107b" providerId="ADAL" clId="{409D07DA-7E5C-4EF5-A9AF-5A4926BCA666}" dt="2023-02-27T14:13:22.234" v="936" actId="20577"/>
         <pc:sldMkLst>
           <pc:docMk/>
           <pc:sldMk cId="2055990861" sldId="305"/>
@@ -449,6 +449,14 @@
             <pc:docMk/>
             <pc:sldMk cId="2055990861" sldId="305"/>
             <ac:spMk id="2" creationId="{793588AD-1E41-081C-1983-AD173D4A0A45}"/>
+          </ac:spMkLst>
+        </pc:spChg>
+        <pc:spChg chg="add mod ord">
+          <ac:chgData name="Weifeng Xu" userId="e7aed605-a3dd-4d5a-a692-a87037af107b" providerId="ADAL" clId="{409D07DA-7E5C-4EF5-A9AF-5A4926BCA666}" dt="2023-02-27T14:13:22.234" v="936" actId="20577"/>
+          <ac:spMkLst>
+            <pc:docMk/>
+            <pc:sldMk cId="2055990861" sldId="305"/>
+            <ac:spMk id="3" creationId="{A2FBCAF6-1D6B-F98D-62FF-A370F64D637F}"/>
           </ac:spMkLst>
         </pc:spChg>
         <pc:picChg chg="add mod">
@@ -806,7 +814,7 @@
           <a:p>
             <a:fld id="{EE41F6E3-57F9-402E-BDBA-5B2DE11C8530}" type="datetimeFigureOut">
               <a:rPr lang="en-US" smtClean="0"/>
-              <a:t>9/27/2022</a:t>
+              <a:t>2/27/2023</a:t>
             </a:fld>
             <a:endParaRPr lang="en-US"/>
           </a:p>
@@ -5243,7 +5251,7 @@
           <a:p>
             <a:fld id="{4263717A-E3C1-4BED-ABE0-B7069385E023}" type="datetimeFigureOut">
               <a:rPr lang="en-US" smtClean="0"/>
-              <a:t>9/27/2022</a:t>
+              <a:t>2/27/2023</a:t>
             </a:fld>
             <a:endParaRPr lang="en-US"/>
           </a:p>
@@ -5416,7 +5424,7 @@
           <a:p>
             <a:fld id="{4263717A-E3C1-4BED-ABE0-B7069385E023}" type="datetimeFigureOut">
               <a:rPr lang="en-US" smtClean="0"/>
-              <a:t>9/27/2022</a:t>
+              <a:t>2/27/2023</a:t>
             </a:fld>
             <a:endParaRPr lang="en-US"/>
           </a:p>
@@ -5594,7 +5602,7 @@
           <a:p>
             <a:fld id="{4263717A-E3C1-4BED-ABE0-B7069385E023}" type="datetimeFigureOut">
               <a:rPr lang="en-US" smtClean="0"/>
-              <a:t>9/27/2022</a:t>
+              <a:t>2/27/2023</a:t>
             </a:fld>
             <a:endParaRPr lang="en-US"/>
           </a:p>
@@ -5762,7 +5770,7 @@
           <a:p>
             <a:fld id="{4263717A-E3C1-4BED-ABE0-B7069385E023}" type="datetimeFigureOut">
               <a:rPr lang="en-US" smtClean="0"/>
-              <a:t>9/27/2022</a:t>
+              <a:t>2/27/2023</a:t>
             </a:fld>
             <a:endParaRPr lang="en-US"/>
           </a:p>
@@ -6007,7 +6015,7 @@
           <a:p>
             <a:fld id="{4263717A-E3C1-4BED-ABE0-B7069385E023}" type="datetimeFigureOut">
               <a:rPr lang="en-US" smtClean="0"/>
-              <a:t>9/27/2022</a:t>
+              <a:t>2/27/2023</a:t>
             </a:fld>
             <a:endParaRPr lang="en-US"/>
           </a:p>
@@ -6236,7 +6244,7 @@
           <a:p>
             <a:fld id="{4263717A-E3C1-4BED-ABE0-B7069385E023}" type="datetimeFigureOut">
               <a:rPr lang="en-US" smtClean="0"/>
-              <a:t>9/27/2022</a:t>
+              <a:t>2/27/2023</a:t>
             </a:fld>
             <a:endParaRPr lang="en-US"/>
           </a:p>
@@ -6600,7 +6608,7 @@
           <a:p>
             <a:fld id="{4263717A-E3C1-4BED-ABE0-B7069385E023}" type="datetimeFigureOut">
               <a:rPr lang="en-US" smtClean="0"/>
-              <a:t>9/27/2022</a:t>
+              <a:t>2/27/2023</a:t>
             </a:fld>
             <a:endParaRPr lang="en-US"/>
           </a:p>
@@ -6717,7 +6725,7 @@
           <a:p>
             <a:fld id="{4263717A-E3C1-4BED-ABE0-B7069385E023}" type="datetimeFigureOut">
               <a:rPr lang="en-US" smtClean="0"/>
-              <a:t>9/27/2022</a:t>
+              <a:t>2/27/2023</a:t>
             </a:fld>
             <a:endParaRPr lang="en-US"/>
           </a:p>
@@ -6812,7 +6820,7 @@
           <a:p>
             <a:fld id="{4263717A-E3C1-4BED-ABE0-B7069385E023}" type="datetimeFigureOut">
               <a:rPr lang="en-US" smtClean="0"/>
-              <a:t>9/27/2022</a:t>
+              <a:t>2/27/2023</a:t>
             </a:fld>
             <a:endParaRPr lang="en-US"/>
           </a:p>
@@ -7087,7 +7095,7 @@
           <a:p>
             <a:fld id="{4263717A-E3C1-4BED-ABE0-B7069385E023}" type="datetimeFigureOut">
               <a:rPr lang="en-US" smtClean="0"/>
-              <a:t>9/27/2022</a:t>
+              <a:t>2/27/2023</a:t>
             </a:fld>
             <a:endParaRPr lang="en-US"/>
           </a:p>
@@ -7339,7 +7347,7 @@
           <a:p>
             <a:fld id="{4263717A-E3C1-4BED-ABE0-B7069385E023}" type="datetimeFigureOut">
               <a:rPr lang="en-US" smtClean="0"/>
-              <a:t>9/27/2022</a:t>
+              <a:t>2/27/2023</a:t>
             </a:fld>
             <a:endParaRPr lang="en-US"/>
           </a:p>
@@ -7550,7 +7558,7 @@
           <a:p>
             <a:fld id="{4263717A-E3C1-4BED-ABE0-B7069385E023}" type="datetimeFigureOut">
               <a:rPr lang="en-US" smtClean="0"/>
-              <a:t>9/27/2022</a:t>
+              <a:t>2/27/2023</a:t>
             </a:fld>
             <a:endParaRPr lang="en-US"/>
           </a:p>
@@ -12483,6 +12491,34 @@
           </a:p>
         </p:txBody>
       </p:sp>
+      <p:sp>
+        <p:nvSpPr>
+          <p:cNvPr id="3" name="Title 2">
+            <a:extLst>
+              <a:ext uri="{FF2B5EF4-FFF2-40B4-BE49-F238E27FC236}">
+                <a16:creationId xmlns:a16="http://schemas.microsoft.com/office/drawing/2014/main" id="{A2FBCAF6-1D6B-F98D-62FF-A370F64D637F}"/>
+              </a:ext>
+            </a:extLst>
+          </p:cNvPr>
+          <p:cNvSpPr>
+            <a:spLocks noGrp="1"/>
+          </p:cNvSpPr>
+          <p:nvPr>
+            <p:ph type="title"/>
+          </p:nvPr>
+        </p:nvSpPr>
+        <p:spPr/>
+        <p:txBody>
+          <a:bodyPr/>
+          <a:lstStyle/>
+          <a:p>
+            <a:r>
+              <a:rPr lang="en-US" dirty="0"/>
+              <a:t>Data generated by applications have different formats</a:t>
+            </a:r>
+          </a:p>
+        </p:txBody>
+      </p:sp>
     </p:spTree>
     <p:extLst>
       <p:ext uri="{BB962C8B-B14F-4D97-AF65-F5344CB8AC3E}">
@@ -14921,13 +14957,20 @@
             <a:pPr lvl="1"/>
             <a:r>
               <a:rPr lang="en-GB" dirty="0"/>
-              <a:t>visit a few other websites</a:t>
-            </a:r>
-            <a:r>
-              <a:rPr lang="en-GB"/>
-              <a:t>/string search</a:t>
-            </a:r>
-            <a:endParaRPr lang="en-GB" dirty="0"/>
+              <a:t>visit a few other websites/string search (e.g., </a:t>
+            </a:r>
+            <a:r>
+              <a:rPr lang="en-GB" dirty="0">
+                <a:solidFill>
+                  <a:srgbClr val="FF0000"/>
+                </a:solidFill>
+              </a:rPr>
+              <a:t>firearm, your name</a:t>
+            </a:r>
+            <a:r>
+              <a:rPr lang="en-GB" dirty="0"/>
+              <a:t>)</a:t>
+            </a:r>
           </a:p>
           <a:p>
             <a:r>
@@ -14935,15 +14978,21 @@
               <a:t>Your tasks (using </a:t>
             </a:r>
             <a:r>
-              <a:rPr lang="en-GB" dirty="0" err="1"/>
+              <a:rPr lang="en-GB" sz="2400" dirty="0" err="1">
+                <a:latin typeface="OCRB" panose="020B0609020202020204" pitchFamily="49" charset="0"/>
+              </a:rPr>
               <a:t>hivexsh</a:t>
             </a:r>
             <a:r>
-              <a:rPr lang="en-GB" dirty="0"/>
+              <a:rPr lang="en-GB" sz="2400" dirty="0">
+                <a:latin typeface="OCRB" panose="020B0609020202020204" pitchFamily="49" charset="0"/>
+              </a:rPr>
               <a:t>/</a:t>
             </a:r>
             <a:r>
-              <a:rPr lang="en-GB" dirty="0" err="1"/>
+              <a:rPr lang="en-GB" sz="2400" dirty="0" err="1">
+                <a:latin typeface="OCRB" panose="020B0609020202020204" pitchFamily="49" charset="0"/>
+              </a:rPr>
               <a:t>Sqlites</a:t>
             </a:r>
             <a:r>
@@ -14958,7 +15007,9 @@
               <a:t>Find the Firefox/Edge installation date (</a:t>
             </a:r>
             <a:r>
-              <a:rPr lang="en-US" dirty="0" err="1"/>
+              <a:rPr lang="en-US" dirty="0" err="1">
+                <a:latin typeface="OCRB" panose="020B0609020202020204" pitchFamily="49" charset="0"/>
+              </a:rPr>
               <a:t>shimcache</a:t>
             </a:r>
             <a:r>
@@ -14970,7 +15021,7 @@
             <a:pPr lvl="1"/>
             <a:r>
               <a:rPr lang="en-US" dirty="0"/>
-              <a:t>Find the Firefox/Edge version from registry</a:t>
+              <a:t>Find the Firefox/Edge version from the registry</a:t>
             </a:r>
           </a:p>
           <a:p>
@@ -14984,15 +15035,32 @@
             <a:pPr lvl="1"/>
             <a:r>
               <a:rPr lang="en-US" dirty="0"/>
-              <a:t>Find the websites you have visited starts from pytorch.org and their timestamps</a:t>
+              <a:t>Find the websites you have visited starting from pytorch.org and their timestamps</a:t>
             </a:r>
           </a:p>
           <a:p>
             <a:pPr lvl="1"/>
             <a:r>
               <a:rPr lang="en-US" dirty="0"/>
-              <a:t>Search keywords</a:t>
-            </a:r>
+              <a:t>Search keywords (</a:t>
+            </a:r>
+            <a:r>
+              <a:rPr lang="en-GB" dirty="0"/>
+              <a:t>e.g., </a:t>
+            </a:r>
+            <a:r>
+              <a:rPr lang="en-GB" dirty="0">
+                <a:solidFill>
+                  <a:srgbClr val="FF0000"/>
+                </a:solidFill>
+              </a:rPr>
+              <a:t>firearm, your name</a:t>
+            </a:r>
+            <a:r>
+              <a:rPr lang="en-GB" dirty="0"/>
+              <a:t>)</a:t>
+            </a:r>
+            <a:endParaRPr lang="en-US" dirty="0"/>
           </a:p>
         </p:txBody>
       </p:sp>

</xml_diff>

<commit_message>
add objectives to Data Leakage case Web History PPT
</commit_message>
<xml_diff>
--- a/NIST_Data_Leakage_Case/NIST_Data_Leakage_03_WebHistory_SQL.pptx
+++ b/NIST_Data_Leakage_Case/NIST_Data_Leakage_03_WebHistory_SQL.pptx
@@ -5,52 +5,54 @@
     <p:sldMasterId id="2147483648" r:id="rId1"/>
   </p:sldMasterIdLst>
   <p:notesMasterIdLst>
-    <p:notesMasterId r:id="rId45"/>
+    <p:notesMasterId r:id="rId47"/>
   </p:notesMasterIdLst>
   <p:sldIdLst>
     <p:sldId id="256" r:id="rId2"/>
-    <p:sldId id="304" r:id="rId3"/>
-    <p:sldId id="305" r:id="rId4"/>
-    <p:sldId id="257" r:id="rId5"/>
-    <p:sldId id="271" r:id="rId6"/>
-    <p:sldId id="272" r:id="rId7"/>
-    <p:sldId id="259" r:id="rId8"/>
-    <p:sldId id="260" r:id="rId9"/>
-    <p:sldId id="261" r:id="rId10"/>
-    <p:sldId id="258" r:id="rId11"/>
-    <p:sldId id="275" r:id="rId12"/>
-    <p:sldId id="266" r:id="rId13"/>
-    <p:sldId id="264" r:id="rId14"/>
-    <p:sldId id="263" r:id="rId15"/>
-    <p:sldId id="269" r:id="rId16"/>
-    <p:sldId id="273" r:id="rId17"/>
-    <p:sldId id="274" r:id="rId18"/>
-    <p:sldId id="296" r:id="rId19"/>
-    <p:sldId id="268" r:id="rId20"/>
-    <p:sldId id="276" r:id="rId21"/>
-    <p:sldId id="277" r:id="rId22"/>
-    <p:sldId id="278" r:id="rId23"/>
-    <p:sldId id="279" r:id="rId24"/>
-    <p:sldId id="280" r:id="rId25"/>
-    <p:sldId id="298" r:id="rId26"/>
-    <p:sldId id="281" r:id="rId27"/>
-    <p:sldId id="299" r:id="rId28"/>
-    <p:sldId id="283" r:id="rId29"/>
-    <p:sldId id="284" r:id="rId30"/>
-    <p:sldId id="285" r:id="rId31"/>
-    <p:sldId id="286" r:id="rId32"/>
-    <p:sldId id="301" r:id="rId33"/>
-    <p:sldId id="300" r:id="rId34"/>
-    <p:sldId id="291" r:id="rId35"/>
-    <p:sldId id="294" r:id="rId36"/>
-    <p:sldId id="288" r:id="rId37"/>
-    <p:sldId id="289" r:id="rId38"/>
-    <p:sldId id="287" r:id="rId39"/>
-    <p:sldId id="290" r:id="rId40"/>
-    <p:sldId id="295" r:id="rId41"/>
-    <p:sldId id="292" r:id="rId42"/>
-    <p:sldId id="293" r:id="rId43"/>
-    <p:sldId id="302" r:id="rId44"/>
+    <p:sldId id="307" r:id="rId3"/>
+    <p:sldId id="304" r:id="rId4"/>
+    <p:sldId id="305" r:id="rId5"/>
+    <p:sldId id="306" r:id="rId6"/>
+    <p:sldId id="257" r:id="rId7"/>
+    <p:sldId id="271" r:id="rId8"/>
+    <p:sldId id="272" r:id="rId9"/>
+    <p:sldId id="259" r:id="rId10"/>
+    <p:sldId id="260" r:id="rId11"/>
+    <p:sldId id="261" r:id="rId12"/>
+    <p:sldId id="258" r:id="rId13"/>
+    <p:sldId id="275" r:id="rId14"/>
+    <p:sldId id="266" r:id="rId15"/>
+    <p:sldId id="264" r:id="rId16"/>
+    <p:sldId id="263" r:id="rId17"/>
+    <p:sldId id="269" r:id="rId18"/>
+    <p:sldId id="273" r:id="rId19"/>
+    <p:sldId id="274" r:id="rId20"/>
+    <p:sldId id="296" r:id="rId21"/>
+    <p:sldId id="268" r:id="rId22"/>
+    <p:sldId id="276" r:id="rId23"/>
+    <p:sldId id="277" r:id="rId24"/>
+    <p:sldId id="278" r:id="rId25"/>
+    <p:sldId id="279" r:id="rId26"/>
+    <p:sldId id="280" r:id="rId27"/>
+    <p:sldId id="298" r:id="rId28"/>
+    <p:sldId id="281" r:id="rId29"/>
+    <p:sldId id="299" r:id="rId30"/>
+    <p:sldId id="283" r:id="rId31"/>
+    <p:sldId id="284" r:id="rId32"/>
+    <p:sldId id="285" r:id="rId33"/>
+    <p:sldId id="286" r:id="rId34"/>
+    <p:sldId id="301" r:id="rId35"/>
+    <p:sldId id="300" r:id="rId36"/>
+    <p:sldId id="291" r:id="rId37"/>
+    <p:sldId id="294" r:id="rId38"/>
+    <p:sldId id="288" r:id="rId39"/>
+    <p:sldId id="289" r:id="rId40"/>
+    <p:sldId id="287" r:id="rId41"/>
+    <p:sldId id="290" r:id="rId42"/>
+    <p:sldId id="295" r:id="rId43"/>
+    <p:sldId id="292" r:id="rId44"/>
+    <p:sldId id="293" r:id="rId45"/>
+    <p:sldId id="302" r:id="rId46"/>
   </p:sldIdLst>
   <p:sldSz cx="12192000" cy="6858000"/>
   <p:notesSz cx="6858000" cy="9144000"/>
@@ -209,8 +211,8 @@
   </pc:docChgLst>
   <pc:docChgLst>
     <pc:chgData name="Weifeng Xu" userId="e7aed605-a3dd-4d5a-a692-a87037af107b" providerId="ADAL" clId="{409D07DA-7E5C-4EF5-A9AF-5A4926BCA666}"/>
-    <pc:docChg chg="undo custSel addSld delSld modSld">
-      <pc:chgData name="Weifeng Xu" userId="e7aed605-a3dd-4d5a-a692-a87037af107b" providerId="ADAL" clId="{409D07DA-7E5C-4EF5-A9AF-5A4926BCA666}" dt="2023-02-27T14:16:26.910" v="1001" actId="207"/>
+    <pc:docChg chg="undo custSel addSld delSld modSld sldOrd">
+      <pc:chgData name="Weifeng Xu" userId="e7aed605-a3dd-4d5a-a692-a87037af107b" providerId="ADAL" clId="{409D07DA-7E5C-4EF5-A9AF-5A4926BCA666}" dt="2023-02-28T15:25:30.597" v="1644" actId="6549"/>
       <pc:docMkLst>
         <pc:docMk/>
       </pc:docMkLst>
@@ -283,7 +285,7 @@
         </pc:picChg>
       </pc:sldChg>
       <pc:sldChg chg="addSp modSp new mod modClrScheme chgLayout modNotesTx">
-        <pc:chgData name="Weifeng Xu" userId="e7aed605-a3dd-4d5a-a692-a87037af107b" providerId="ADAL" clId="{409D07DA-7E5C-4EF5-A9AF-5A4926BCA666}" dt="2022-03-08T14:58:50.921" v="343" actId="14100"/>
+        <pc:chgData name="Weifeng Xu" userId="e7aed605-a3dd-4d5a-a692-a87037af107b" providerId="ADAL" clId="{409D07DA-7E5C-4EF5-A9AF-5A4926BCA666}" dt="2023-02-28T15:05:31.701" v="1005" actId="20577"/>
         <pc:sldMkLst>
           <pc:docMk/>
           <pc:sldMk cId="2904199124" sldId="301"/>
@@ -297,7 +299,7 @@
           </ac:spMkLst>
         </pc:spChg>
         <pc:spChg chg="add mod">
-          <ac:chgData name="Weifeng Xu" userId="e7aed605-a3dd-4d5a-a692-a87037af107b" providerId="ADAL" clId="{409D07DA-7E5C-4EF5-A9AF-5A4926BCA666}" dt="2022-03-08T14:40:04.010" v="328" actId="20577"/>
+          <ac:chgData name="Weifeng Xu" userId="e7aed605-a3dd-4d5a-a692-a87037af107b" providerId="ADAL" clId="{409D07DA-7E5C-4EF5-A9AF-5A4926BCA666}" dt="2023-02-28T15:05:31.701" v="1005" actId="20577"/>
           <ac:spMkLst>
             <pc:docMk/>
             <pc:sldMk cId="2904199124" sldId="301"/>
@@ -483,6 +485,52 @@
             <ac:picMk id="1030" creationId="{4E99F73B-9894-2401-CF24-79CAB34653F6}"/>
           </ac:picMkLst>
         </pc:picChg>
+      </pc:sldChg>
+      <pc:sldChg chg="addSp modSp new mod ord modClrScheme chgLayout">
+        <pc:chgData name="Weifeng Xu" userId="e7aed605-a3dd-4d5a-a692-a87037af107b" providerId="ADAL" clId="{409D07DA-7E5C-4EF5-A9AF-5A4926BCA666}" dt="2023-02-28T15:21:39.217" v="1362" actId="20577"/>
+        <pc:sldMkLst>
+          <pc:docMk/>
+          <pc:sldMk cId="4165459125" sldId="306"/>
+        </pc:sldMkLst>
+        <pc:spChg chg="mod ord">
+          <ac:chgData name="Weifeng Xu" userId="e7aed605-a3dd-4d5a-a692-a87037af107b" providerId="ADAL" clId="{409D07DA-7E5C-4EF5-A9AF-5A4926BCA666}" dt="2023-02-28T15:16:21.162" v="1033" actId="700"/>
+          <ac:spMkLst>
+            <pc:docMk/>
+            <pc:sldMk cId="4165459125" sldId="306"/>
+            <ac:spMk id="2" creationId="{C990B706-7E51-C619-EDB7-465188F981AD}"/>
+          </ac:spMkLst>
+        </pc:spChg>
+        <pc:spChg chg="add mod ord">
+          <ac:chgData name="Weifeng Xu" userId="e7aed605-a3dd-4d5a-a692-a87037af107b" providerId="ADAL" clId="{409D07DA-7E5C-4EF5-A9AF-5A4926BCA666}" dt="2023-02-28T15:21:39.217" v="1362" actId="20577"/>
+          <ac:spMkLst>
+            <pc:docMk/>
+            <pc:sldMk cId="4165459125" sldId="306"/>
+            <ac:spMk id="3" creationId="{FDE5C25D-0753-82FA-B101-7283CC9D92A5}"/>
+          </ac:spMkLst>
+        </pc:spChg>
+      </pc:sldChg>
+      <pc:sldChg chg="modSp new mod">
+        <pc:chgData name="Weifeng Xu" userId="e7aed605-a3dd-4d5a-a692-a87037af107b" providerId="ADAL" clId="{409D07DA-7E5C-4EF5-A9AF-5A4926BCA666}" dt="2023-02-28T15:25:30.597" v="1644" actId="6549"/>
+        <pc:sldMkLst>
+          <pc:docMk/>
+          <pc:sldMk cId="2202518917" sldId="307"/>
+        </pc:sldMkLst>
+        <pc:spChg chg="mod">
+          <ac:chgData name="Weifeng Xu" userId="e7aed605-a3dd-4d5a-a692-a87037af107b" providerId="ADAL" clId="{409D07DA-7E5C-4EF5-A9AF-5A4926BCA666}" dt="2023-02-28T15:22:41.863" v="1368" actId="20577"/>
+          <ac:spMkLst>
+            <pc:docMk/>
+            <pc:sldMk cId="2202518917" sldId="307"/>
+            <ac:spMk id="2" creationId="{5FA1E2A4-C2D3-092B-E707-504A200298E7}"/>
+          </ac:spMkLst>
+        </pc:spChg>
+        <pc:spChg chg="mod">
+          <ac:chgData name="Weifeng Xu" userId="e7aed605-a3dd-4d5a-a692-a87037af107b" providerId="ADAL" clId="{409D07DA-7E5C-4EF5-A9AF-5A4926BCA666}" dt="2023-02-28T15:25:30.597" v="1644" actId="6549"/>
+          <ac:spMkLst>
+            <pc:docMk/>
+            <pc:sldMk cId="2202518917" sldId="307"/>
+            <ac:spMk id="3" creationId="{C37B6B56-2138-CADD-E2D5-70BE27CBC5CC}"/>
+          </ac:spMkLst>
+        </pc:spChg>
       </pc:sldChg>
     </pc:docChg>
   </pc:docChgLst>
@@ -814,7 +862,7 @@
           <a:p>
             <a:fld id="{EE41F6E3-57F9-402E-BDBA-5B2DE11C8530}" type="datetimeFigureOut">
               <a:rPr lang="en-US" smtClean="0"/>
-              <a:t>2/27/2023</a:t>
+              <a:t>2/28/2023</a:t>
             </a:fld>
             <a:endParaRPr lang="en-US"/>
           </a:p>
@@ -1249,7 +1297,7 @@
           <a:p>
             <a:fld id="{DDBF98C7-164A-4723-84F0-B1E4B080DDEC}" type="slidenum">
               <a:rPr lang="en-US" smtClean="0"/>
-              <a:t>12</a:t>
+              <a:t>14</a:t>
             </a:fld>
             <a:endParaRPr lang="en-US"/>
           </a:p>
@@ -1363,7 +1411,7 @@
           <a:p>
             <a:fld id="{DDBF98C7-164A-4723-84F0-B1E4B080DDEC}" type="slidenum">
               <a:rPr lang="en-US" smtClean="0"/>
-              <a:t>13</a:t>
+              <a:t>15</a:t>
             </a:fld>
             <a:endParaRPr lang="en-US"/>
           </a:p>
@@ -1458,7 +1506,7 @@
           <a:p>
             <a:fld id="{DDBF98C7-164A-4723-84F0-B1E4B080DDEC}" type="slidenum">
               <a:rPr lang="en-US" smtClean="0"/>
-              <a:t>14</a:t>
+              <a:t>16</a:t>
             </a:fld>
             <a:endParaRPr lang="en-US"/>
           </a:p>
@@ -1619,7 +1667,7 @@
           <a:p>
             <a:fld id="{DDBF98C7-164A-4723-84F0-B1E4B080DDEC}" type="slidenum">
               <a:rPr lang="en-US" smtClean="0"/>
-              <a:t>15</a:t>
+              <a:t>17</a:t>
             </a:fld>
             <a:endParaRPr lang="en-US"/>
           </a:p>
@@ -1729,7 +1777,7 @@
           <a:p>
             <a:fld id="{DDBF98C7-164A-4723-84F0-B1E4B080DDEC}" type="slidenum">
               <a:rPr lang="en-US" smtClean="0"/>
-              <a:t>16</a:t>
+              <a:t>18</a:t>
             </a:fld>
             <a:endParaRPr lang="en-US"/>
           </a:p>
@@ -1824,7 +1872,7 @@
           <a:p>
             <a:fld id="{DDBF98C7-164A-4723-84F0-B1E4B080DDEC}" type="slidenum">
               <a:rPr lang="en-US" smtClean="0"/>
-              <a:t>17</a:t>
+              <a:t>19</a:t>
             </a:fld>
             <a:endParaRPr lang="en-US"/>
           </a:p>
@@ -1919,7 +1967,7 @@
           <a:p>
             <a:fld id="{DDBF98C7-164A-4723-84F0-B1E4B080DDEC}" type="slidenum">
               <a:rPr lang="en-US" smtClean="0"/>
-              <a:t>18</a:t>
+              <a:t>20</a:t>
             </a:fld>
             <a:endParaRPr lang="en-US"/>
           </a:p>
@@ -2029,7 +2077,7 @@
           <a:p>
             <a:fld id="{DDBF98C7-164A-4723-84F0-B1E4B080DDEC}" type="slidenum">
               <a:rPr lang="en-US" smtClean="0"/>
-              <a:t>20</a:t>
+              <a:t>22</a:t>
             </a:fld>
             <a:endParaRPr lang="en-US"/>
           </a:p>
@@ -2116,7 +2164,7 @@
           <a:p>
             <a:fld id="{DDBF98C7-164A-4723-84F0-B1E4B080DDEC}" type="slidenum">
               <a:rPr lang="en-US" smtClean="0"/>
-              <a:t>21</a:t>
+              <a:t>23</a:t>
             </a:fld>
             <a:endParaRPr lang="en-US"/>
           </a:p>
@@ -2219,7 +2267,7 @@
           <a:p>
             <a:fld id="{DDBF98C7-164A-4723-84F0-B1E4B080DDEC}" type="slidenum">
               <a:rPr lang="en-US" smtClean="0"/>
-              <a:t>22</a:t>
+              <a:t>24</a:t>
             </a:fld>
             <a:endParaRPr lang="en-US"/>
           </a:p>
@@ -2309,7 +2357,7 @@
           <a:p>
             <a:fld id="{DDBF98C7-164A-4723-84F0-B1E4B080DDEC}" type="slidenum">
               <a:rPr lang="en-US" smtClean="0"/>
-              <a:t>4</a:t>
+              <a:t>6</a:t>
             </a:fld>
             <a:endParaRPr lang="en-US"/>
           </a:p>
@@ -2453,7 +2501,7 @@
           <a:p>
             <a:fld id="{DDBF98C7-164A-4723-84F0-B1E4B080DDEC}" type="slidenum">
               <a:rPr lang="en-US" smtClean="0"/>
-              <a:t>23</a:t>
+              <a:t>25</a:t>
             </a:fld>
             <a:endParaRPr lang="en-US"/>
           </a:p>
@@ -2554,7 +2602,7 @@
           <a:p>
             <a:fld id="{DDBF98C7-164A-4723-84F0-B1E4B080DDEC}" type="slidenum">
               <a:rPr lang="en-US" smtClean="0"/>
-              <a:t>24</a:t>
+              <a:t>26</a:t>
             </a:fld>
             <a:endParaRPr lang="en-US"/>
           </a:p>
@@ -2728,7 +2776,7 @@
           <a:p>
             <a:fld id="{DDBF98C7-164A-4723-84F0-B1E4B080DDEC}" type="slidenum">
               <a:rPr lang="en-US" smtClean="0"/>
-              <a:t>25</a:t>
+              <a:t>27</a:t>
             </a:fld>
             <a:endParaRPr lang="en-US"/>
           </a:p>
@@ -2815,7 +2863,7 @@
           <a:p>
             <a:fld id="{DDBF98C7-164A-4723-84F0-B1E4B080DDEC}" type="slidenum">
               <a:rPr lang="en-US" smtClean="0"/>
-              <a:t>26</a:t>
+              <a:t>28</a:t>
             </a:fld>
             <a:endParaRPr lang="en-US"/>
           </a:p>
@@ -2907,7 +2955,7 @@
           <a:p>
             <a:fld id="{DDBF98C7-164A-4723-84F0-B1E4B080DDEC}" type="slidenum">
               <a:rPr lang="en-US" smtClean="0"/>
-              <a:t>27</a:t>
+              <a:t>29</a:t>
             </a:fld>
             <a:endParaRPr lang="en-US"/>
           </a:p>
@@ -3030,7 +3078,7 @@
           <a:p>
             <a:fld id="{DDBF98C7-164A-4723-84F0-B1E4B080DDEC}" type="slidenum">
               <a:rPr lang="en-US" smtClean="0"/>
-              <a:t>30</a:t>
+              <a:t>32</a:t>
             </a:fld>
             <a:endParaRPr lang="en-US"/>
           </a:p>
@@ -3253,7 +3301,7 @@
           <a:p>
             <a:fld id="{DDBF98C7-164A-4723-84F0-B1E4B080DDEC}" type="slidenum">
               <a:rPr lang="en-US" smtClean="0"/>
-              <a:t>31</a:t>
+              <a:t>33</a:t>
             </a:fld>
             <a:endParaRPr lang="en-US"/>
           </a:p>
@@ -3341,7 +3389,7 @@
           <a:p>
             <a:fld id="{DDBF98C7-164A-4723-84F0-B1E4B080DDEC}" type="slidenum">
               <a:rPr lang="en-US" smtClean="0"/>
-              <a:t>32</a:t>
+              <a:t>34</a:t>
             </a:fld>
             <a:endParaRPr lang="en-US"/>
           </a:p>
@@ -3469,7 +3517,7 @@
           <a:p>
             <a:fld id="{DDBF98C7-164A-4723-84F0-B1E4B080DDEC}" type="slidenum">
               <a:rPr lang="en-US" smtClean="0"/>
-              <a:t>33</a:t>
+              <a:t>35</a:t>
             </a:fld>
             <a:endParaRPr lang="en-US"/>
           </a:p>
@@ -3556,7 +3604,7 @@
           <a:p>
             <a:fld id="{DDBF98C7-164A-4723-84F0-B1E4B080DDEC}" type="slidenum">
               <a:rPr lang="en-US" smtClean="0"/>
-              <a:t>34</a:t>
+              <a:t>36</a:t>
             </a:fld>
             <a:endParaRPr lang="en-US"/>
           </a:p>
@@ -3729,7 +3777,7 @@
           <a:p>
             <a:fld id="{DDBF98C7-164A-4723-84F0-B1E4B080DDEC}" type="slidenum">
               <a:rPr lang="en-US" smtClean="0"/>
-              <a:t>5</a:t>
+              <a:t>7</a:t>
             </a:fld>
             <a:endParaRPr lang="en-US"/>
           </a:p>
@@ -3816,7 +3864,7 @@
           <a:p>
             <a:fld id="{DDBF98C7-164A-4723-84F0-B1E4B080DDEC}" type="slidenum">
               <a:rPr lang="en-US" smtClean="0"/>
-              <a:t>35</a:t>
+              <a:t>37</a:t>
             </a:fld>
             <a:endParaRPr lang="en-US"/>
           </a:p>
@@ -3925,7 +3973,7 @@
           <a:p>
             <a:fld id="{DDBF98C7-164A-4723-84F0-B1E4B080DDEC}" type="slidenum">
               <a:rPr lang="en-US" smtClean="0"/>
-              <a:t>36</a:t>
+              <a:t>38</a:t>
             </a:fld>
             <a:endParaRPr lang="en-US"/>
           </a:p>
@@ -4032,7 +4080,7 @@
           <a:p>
             <a:fld id="{DDBF98C7-164A-4723-84F0-B1E4B080DDEC}" type="slidenum">
               <a:rPr lang="en-US" smtClean="0"/>
-              <a:t>37</a:t>
+              <a:t>39</a:t>
             </a:fld>
             <a:endParaRPr lang="en-US"/>
           </a:p>
@@ -4116,7 +4164,7 @@
           <a:p>
             <a:fld id="{DDBF98C7-164A-4723-84F0-B1E4B080DDEC}" type="slidenum">
               <a:rPr lang="en-US" smtClean="0"/>
-              <a:t>38</a:t>
+              <a:t>40</a:t>
             </a:fld>
             <a:endParaRPr lang="en-US"/>
           </a:p>
@@ -4223,7 +4271,7 @@
           <a:p>
             <a:fld id="{DDBF98C7-164A-4723-84F0-B1E4B080DDEC}" type="slidenum">
               <a:rPr lang="en-US" smtClean="0"/>
-              <a:t>39</a:t>
+              <a:t>41</a:t>
             </a:fld>
             <a:endParaRPr lang="en-US"/>
           </a:p>
@@ -4307,7 +4355,7 @@
           <a:p>
             <a:fld id="{DDBF98C7-164A-4723-84F0-B1E4B080DDEC}" type="slidenum">
               <a:rPr lang="en-US" smtClean="0"/>
-              <a:t>40</a:t>
+              <a:t>42</a:t>
             </a:fld>
             <a:endParaRPr lang="en-US"/>
           </a:p>
@@ -4430,7 +4478,7 @@
           <a:p>
             <a:fld id="{DDBF98C7-164A-4723-84F0-B1E4B080DDEC}" type="slidenum">
               <a:rPr lang="en-US" smtClean="0"/>
-              <a:t>41</a:t>
+              <a:t>43</a:t>
             </a:fld>
             <a:endParaRPr lang="en-US"/>
           </a:p>
@@ -4522,7 +4570,7 @@
           <a:p>
             <a:fld id="{DDBF98C7-164A-4723-84F0-B1E4B080DDEC}" type="slidenum">
               <a:rPr lang="en-US" smtClean="0"/>
-              <a:t>42</a:t>
+              <a:t>44</a:t>
             </a:fld>
             <a:endParaRPr lang="en-US"/>
           </a:p>
@@ -4609,7 +4657,7 @@
           <a:p>
             <a:fld id="{DDBF98C7-164A-4723-84F0-B1E4B080DDEC}" type="slidenum">
               <a:rPr lang="en-US" smtClean="0"/>
-              <a:t>6</a:t>
+              <a:t>8</a:t>
             </a:fld>
             <a:endParaRPr lang="en-US"/>
           </a:p>
@@ -4704,7 +4752,7 @@
           <a:p>
             <a:fld id="{DDBF98C7-164A-4723-84F0-B1E4B080DDEC}" type="slidenum">
               <a:rPr lang="en-US" smtClean="0"/>
-              <a:t>7</a:t>
+              <a:t>9</a:t>
             </a:fld>
             <a:endParaRPr lang="en-US"/>
           </a:p>
@@ -4791,7 +4839,7 @@
           <a:p>
             <a:fld id="{DDBF98C7-164A-4723-84F0-B1E4B080DDEC}" type="slidenum">
               <a:rPr lang="en-US" smtClean="0"/>
-              <a:t>8</a:t>
+              <a:t>10</a:t>
             </a:fld>
             <a:endParaRPr lang="en-US"/>
           </a:p>
@@ -4905,7 +4953,7 @@
           <a:p>
             <a:fld id="{DDBF98C7-164A-4723-84F0-B1E4B080DDEC}" type="slidenum">
               <a:rPr lang="en-US" smtClean="0"/>
-              <a:t>9</a:t>
+              <a:t>11</a:t>
             </a:fld>
             <a:endParaRPr lang="en-US"/>
           </a:p>
@@ -5000,7 +5048,7 @@
           <a:p>
             <a:fld id="{DDBF98C7-164A-4723-84F0-B1E4B080DDEC}" type="slidenum">
               <a:rPr lang="en-US" smtClean="0"/>
-              <a:t>10</a:t>
+              <a:t>12</a:t>
             </a:fld>
             <a:endParaRPr lang="en-US"/>
           </a:p>
@@ -5103,7 +5151,7 @@
           <a:p>
             <a:fld id="{DDBF98C7-164A-4723-84F0-B1E4B080DDEC}" type="slidenum">
               <a:rPr lang="en-US" smtClean="0"/>
-              <a:t>11</a:t>
+              <a:t>13</a:t>
             </a:fld>
             <a:endParaRPr lang="en-US"/>
           </a:p>
@@ -5251,7 +5299,7 @@
           <a:p>
             <a:fld id="{4263717A-E3C1-4BED-ABE0-B7069385E023}" type="datetimeFigureOut">
               <a:rPr lang="en-US" smtClean="0"/>
-              <a:t>2/27/2023</a:t>
+              <a:t>2/28/2023</a:t>
             </a:fld>
             <a:endParaRPr lang="en-US"/>
           </a:p>
@@ -5424,7 +5472,7 @@
           <a:p>
             <a:fld id="{4263717A-E3C1-4BED-ABE0-B7069385E023}" type="datetimeFigureOut">
               <a:rPr lang="en-US" smtClean="0"/>
-              <a:t>2/27/2023</a:t>
+              <a:t>2/28/2023</a:t>
             </a:fld>
             <a:endParaRPr lang="en-US"/>
           </a:p>
@@ -5602,7 +5650,7 @@
           <a:p>
             <a:fld id="{4263717A-E3C1-4BED-ABE0-B7069385E023}" type="datetimeFigureOut">
               <a:rPr lang="en-US" smtClean="0"/>
-              <a:t>2/27/2023</a:t>
+              <a:t>2/28/2023</a:t>
             </a:fld>
             <a:endParaRPr lang="en-US"/>
           </a:p>
@@ -5770,7 +5818,7 @@
           <a:p>
             <a:fld id="{4263717A-E3C1-4BED-ABE0-B7069385E023}" type="datetimeFigureOut">
               <a:rPr lang="en-US" smtClean="0"/>
-              <a:t>2/27/2023</a:t>
+              <a:t>2/28/2023</a:t>
             </a:fld>
             <a:endParaRPr lang="en-US"/>
           </a:p>
@@ -6015,7 +6063,7 @@
           <a:p>
             <a:fld id="{4263717A-E3C1-4BED-ABE0-B7069385E023}" type="datetimeFigureOut">
               <a:rPr lang="en-US" smtClean="0"/>
-              <a:t>2/27/2023</a:t>
+              <a:t>2/28/2023</a:t>
             </a:fld>
             <a:endParaRPr lang="en-US"/>
           </a:p>
@@ -6244,7 +6292,7 @@
           <a:p>
             <a:fld id="{4263717A-E3C1-4BED-ABE0-B7069385E023}" type="datetimeFigureOut">
               <a:rPr lang="en-US" smtClean="0"/>
-              <a:t>2/27/2023</a:t>
+              <a:t>2/28/2023</a:t>
             </a:fld>
             <a:endParaRPr lang="en-US"/>
           </a:p>
@@ -6608,7 +6656,7 @@
           <a:p>
             <a:fld id="{4263717A-E3C1-4BED-ABE0-B7069385E023}" type="datetimeFigureOut">
               <a:rPr lang="en-US" smtClean="0"/>
-              <a:t>2/27/2023</a:t>
+              <a:t>2/28/2023</a:t>
             </a:fld>
             <a:endParaRPr lang="en-US"/>
           </a:p>
@@ -6725,7 +6773,7 @@
           <a:p>
             <a:fld id="{4263717A-E3C1-4BED-ABE0-B7069385E023}" type="datetimeFigureOut">
               <a:rPr lang="en-US" smtClean="0"/>
-              <a:t>2/27/2023</a:t>
+              <a:t>2/28/2023</a:t>
             </a:fld>
             <a:endParaRPr lang="en-US"/>
           </a:p>
@@ -6820,7 +6868,7 @@
           <a:p>
             <a:fld id="{4263717A-E3C1-4BED-ABE0-B7069385E023}" type="datetimeFigureOut">
               <a:rPr lang="en-US" smtClean="0"/>
-              <a:t>2/27/2023</a:t>
+              <a:t>2/28/2023</a:t>
             </a:fld>
             <a:endParaRPr lang="en-US"/>
           </a:p>
@@ -7095,7 +7143,7 @@
           <a:p>
             <a:fld id="{4263717A-E3C1-4BED-ABE0-B7069385E023}" type="datetimeFigureOut">
               <a:rPr lang="en-US" smtClean="0"/>
-              <a:t>2/27/2023</a:t>
+              <a:t>2/28/2023</a:t>
             </a:fld>
             <a:endParaRPr lang="en-US"/>
           </a:p>
@@ -7347,7 +7395,7 @@
           <a:p>
             <a:fld id="{4263717A-E3C1-4BED-ABE0-B7069385E023}" type="datetimeFigureOut">
               <a:rPr lang="en-US" smtClean="0"/>
-              <a:t>2/27/2023</a:t>
+              <a:t>2/28/2023</a:t>
             </a:fld>
             <a:endParaRPr lang="en-US"/>
           </a:p>
@@ -7558,7 +7606,7 @@
           <a:p>
             <a:fld id="{4263717A-E3C1-4BED-ABE0-B7069385E023}" type="datetimeFigureOut">
               <a:rPr lang="en-US" smtClean="0"/>
-              <a:t>2/27/2023</a:t>
+              <a:t>2/28/2023</a:t>
             </a:fld>
             <a:endParaRPr lang="en-US"/>
           </a:p>
@@ -8193,6 +8241,396 @@
 </file>
 
 <file path=ppt/slides/slide10.xml><?xml version="1.0" encoding="utf-8"?>
+<p:sld xmlns:a="http://schemas.openxmlformats.org/drawingml/2006/main" xmlns:r="http://schemas.openxmlformats.org/officeDocument/2006/relationships" xmlns:p="http://schemas.openxmlformats.org/presentationml/2006/main">
+  <p:cSld>
+    <p:spTree>
+      <p:nvGrpSpPr>
+        <p:cNvPr id="1" name=""/>
+        <p:cNvGrpSpPr/>
+        <p:nvPr/>
+      </p:nvGrpSpPr>
+      <p:grpSpPr>
+        <a:xfrm>
+          <a:off x="0" y="0"/>
+          <a:ext cx="0" cy="0"/>
+          <a:chOff x="0" y="0"/>
+          <a:chExt cx="0" cy="0"/>
+        </a:xfrm>
+      </p:grpSpPr>
+      <p:pic>
+        <p:nvPicPr>
+          <p:cNvPr id="4" name="Picture 3"/>
+          <p:cNvPicPr>
+            <a:picLocks noChangeAspect="1"/>
+          </p:cNvPicPr>
+          <p:nvPr/>
+        </p:nvPicPr>
+        <p:blipFill>
+          <a:blip r:embed="rId3"/>
+          <a:stretch>
+            <a:fillRect/>
+          </a:stretch>
+        </p:blipFill>
+        <p:spPr>
+          <a:xfrm>
+            <a:off x="3591719" y="3530456"/>
+            <a:ext cx="3563713" cy="762988"/>
+          </a:xfrm>
+          <a:prstGeom prst="rect">
+            <a:avLst/>
+          </a:prstGeom>
+        </p:spPr>
+      </p:pic>
+      <p:pic>
+        <p:nvPicPr>
+          <p:cNvPr id="5" name="Picture 4"/>
+          <p:cNvPicPr>
+            <a:picLocks noChangeAspect="1"/>
+          </p:cNvPicPr>
+          <p:nvPr/>
+        </p:nvPicPr>
+        <p:blipFill>
+          <a:blip r:embed="rId4"/>
+          <a:stretch>
+            <a:fillRect/>
+          </a:stretch>
+        </p:blipFill>
+        <p:spPr>
+          <a:xfrm>
+            <a:off x="3607101" y="4395981"/>
+            <a:ext cx="6238503" cy="1744805"/>
+          </a:xfrm>
+          <a:prstGeom prst="rect">
+            <a:avLst/>
+          </a:prstGeom>
+        </p:spPr>
+      </p:pic>
+      <p:pic>
+        <p:nvPicPr>
+          <p:cNvPr id="6" name="Picture 5"/>
+          <p:cNvPicPr>
+            <a:picLocks noChangeAspect="1"/>
+          </p:cNvPicPr>
+          <p:nvPr/>
+        </p:nvPicPr>
+        <p:blipFill>
+          <a:blip r:embed="rId5"/>
+          <a:stretch>
+            <a:fillRect/>
+          </a:stretch>
+        </p:blipFill>
+        <p:spPr>
+          <a:xfrm>
+            <a:off x="3607101" y="1876897"/>
+            <a:ext cx="5902911" cy="1468529"/>
+          </a:xfrm>
+          <a:prstGeom prst="rect">
+            <a:avLst/>
+          </a:prstGeom>
+        </p:spPr>
+      </p:pic>
+      <p:sp>
+        <p:nvSpPr>
+          <p:cNvPr id="7" name="TextBox 6"/>
+          <p:cNvSpPr txBox="1"/>
+          <p:nvPr/>
+        </p:nvSpPr>
+        <p:spPr>
+          <a:xfrm>
+            <a:off x="896816" y="1875718"/>
+            <a:ext cx="2710285" cy="369332"/>
+          </a:xfrm>
+          <a:prstGeom prst="rect">
+            <a:avLst/>
+          </a:prstGeom>
+          <a:solidFill>
+            <a:srgbClr val="FFC000"/>
+          </a:solidFill>
+        </p:spPr>
+        <p:txBody>
+          <a:bodyPr wrap="square" rtlCol="0">
+            <a:spAutoFit/>
+          </a:bodyPr>
+          <a:lstStyle/>
+          <a:p>
+            <a:r>
+              <a:rPr lang="en-US" dirty="0"/>
+              <a:t>Install </a:t>
+            </a:r>
+            <a:r>
+              <a:rPr lang="en-US" i="1" dirty="0" err="1">
+                <a:solidFill>
+                  <a:srgbClr val="007DB5"/>
+                </a:solidFill>
+              </a:rPr>
+              <a:t>hivexsh</a:t>
+            </a:r>
+            <a:endParaRPr lang="en-US" i="1" dirty="0">
+              <a:solidFill>
+                <a:srgbClr val="007DB5"/>
+              </a:solidFill>
+            </a:endParaRPr>
+          </a:p>
+        </p:txBody>
+      </p:sp>
+      <p:sp>
+        <p:nvSpPr>
+          <p:cNvPr id="2" name="Title 1"/>
+          <p:cNvSpPr>
+            <a:spLocks noGrp="1"/>
+          </p:cNvSpPr>
+          <p:nvPr>
+            <p:ph type="title"/>
+          </p:nvPr>
+        </p:nvSpPr>
+        <p:spPr/>
+        <p:txBody>
+          <a:bodyPr/>
+          <a:lstStyle/>
+          <a:p>
+            <a:r>
+              <a:rPr lang="en-US" dirty="0"/>
+              <a:t>Install </a:t>
+            </a:r>
+            <a:r>
+              <a:rPr lang="en-US" i="1" dirty="0" err="1">
+                <a:solidFill>
+                  <a:srgbClr val="FF0000"/>
+                </a:solidFill>
+              </a:rPr>
+              <a:t>hivexsh</a:t>
+            </a:r>
+            <a:endParaRPr lang="en-US" i="1" dirty="0">
+              <a:solidFill>
+                <a:srgbClr val="FF0000"/>
+              </a:solidFill>
+            </a:endParaRPr>
+          </a:p>
+        </p:txBody>
+      </p:sp>
+      <p:sp>
+        <p:nvSpPr>
+          <p:cNvPr id="8" name="TextBox 7"/>
+          <p:cNvSpPr txBox="1"/>
+          <p:nvPr/>
+        </p:nvSpPr>
+        <p:spPr>
+          <a:xfrm>
+            <a:off x="881434" y="3542618"/>
+            <a:ext cx="2710285" cy="369332"/>
+          </a:xfrm>
+          <a:prstGeom prst="rect">
+            <a:avLst/>
+          </a:prstGeom>
+          <a:solidFill>
+            <a:srgbClr val="FFC000"/>
+          </a:solidFill>
+        </p:spPr>
+        <p:txBody>
+          <a:bodyPr wrap="square" rtlCol="0">
+            <a:spAutoFit/>
+          </a:bodyPr>
+          <a:lstStyle/>
+          <a:p>
+            <a:r>
+              <a:rPr lang="en-US" dirty="0"/>
+              <a:t>Show </a:t>
+            </a:r>
+            <a:r>
+              <a:rPr lang="en-US" i="1" dirty="0" err="1">
+                <a:solidFill>
+                  <a:srgbClr val="007DB5"/>
+                </a:solidFill>
+              </a:rPr>
+              <a:t>hivexsh</a:t>
+            </a:r>
+            <a:r>
+              <a:rPr lang="en-US" dirty="0"/>
+              <a:t> manual</a:t>
+            </a:r>
+            <a:endParaRPr lang="en-US" i="1" dirty="0">
+              <a:solidFill>
+                <a:srgbClr val="007DB5"/>
+              </a:solidFill>
+            </a:endParaRPr>
+          </a:p>
+        </p:txBody>
+      </p:sp>
+    </p:spTree>
+    <p:extLst>
+      <p:ext uri="{BB962C8B-B14F-4D97-AF65-F5344CB8AC3E}">
+        <p14:creationId xmlns:p14="http://schemas.microsoft.com/office/powerpoint/2010/main" val="929697321"/>
+      </p:ext>
+    </p:extLst>
+  </p:cSld>
+  <p:clrMapOvr>
+    <a:masterClrMapping/>
+  </p:clrMapOvr>
+</p:sld>
+</file>
+
+<file path=ppt/slides/slide11.xml><?xml version="1.0" encoding="utf-8"?>
+<p:sld xmlns:a="http://schemas.openxmlformats.org/drawingml/2006/main" xmlns:r="http://schemas.openxmlformats.org/officeDocument/2006/relationships" xmlns:p="http://schemas.openxmlformats.org/presentationml/2006/main">
+  <p:cSld>
+    <p:spTree>
+      <p:nvGrpSpPr>
+        <p:cNvPr id="1" name=""/>
+        <p:cNvGrpSpPr/>
+        <p:nvPr/>
+      </p:nvGrpSpPr>
+      <p:grpSpPr>
+        <a:xfrm>
+          <a:off x="0" y="0"/>
+          <a:ext cx="0" cy="0"/>
+          <a:chOff x="0" y="0"/>
+          <a:chExt cx="0" cy="0"/>
+        </a:xfrm>
+      </p:grpSpPr>
+      <p:pic>
+        <p:nvPicPr>
+          <p:cNvPr id="2" name="Picture 1"/>
+          <p:cNvPicPr>
+            <a:picLocks noChangeAspect="1"/>
+          </p:cNvPicPr>
+          <p:nvPr/>
+        </p:nvPicPr>
+        <p:blipFill>
+          <a:blip r:embed="rId3"/>
+          <a:stretch>
+            <a:fillRect/>
+          </a:stretch>
+        </p:blipFill>
+        <p:spPr>
+          <a:xfrm>
+            <a:off x="1361882" y="967040"/>
+            <a:ext cx="7321618" cy="3469507"/>
+          </a:xfrm>
+          <a:prstGeom prst="rect">
+            <a:avLst/>
+          </a:prstGeom>
+        </p:spPr>
+      </p:pic>
+      <p:sp>
+        <p:nvSpPr>
+          <p:cNvPr id="3" name="TextBox 2"/>
+          <p:cNvSpPr txBox="1"/>
+          <p:nvPr/>
+        </p:nvSpPr>
+        <p:spPr>
+          <a:xfrm>
+            <a:off x="1361882" y="597708"/>
+            <a:ext cx="4304272" cy="369332"/>
+          </a:xfrm>
+          <a:prstGeom prst="rect">
+            <a:avLst/>
+          </a:prstGeom>
+          <a:solidFill>
+            <a:srgbClr val="FFC000"/>
+          </a:solidFill>
+        </p:spPr>
+        <p:txBody>
+          <a:bodyPr wrap="square" rtlCol="0">
+            <a:spAutoFit/>
+          </a:bodyPr>
+          <a:lstStyle/>
+          <a:p>
+            <a:r>
+              <a:rPr lang="en-US" dirty="0"/>
+              <a:t>Exam the version of IE using </a:t>
+            </a:r>
+            <a:r>
+              <a:rPr lang="en-US" i="1" dirty="0" err="1">
+                <a:solidFill>
+                  <a:srgbClr val="007DB5"/>
+                </a:solidFill>
+              </a:rPr>
+              <a:t>hivexsh</a:t>
+            </a:r>
+            <a:endParaRPr lang="en-US" i="1" dirty="0">
+              <a:solidFill>
+                <a:srgbClr val="007DB5"/>
+              </a:solidFill>
+            </a:endParaRPr>
+          </a:p>
+        </p:txBody>
+      </p:sp>
+      <p:sp>
+        <p:nvSpPr>
+          <p:cNvPr id="4" name="TextBox 3"/>
+          <p:cNvSpPr txBox="1"/>
+          <p:nvPr/>
+        </p:nvSpPr>
+        <p:spPr>
+          <a:xfrm>
+            <a:off x="1361882" y="4805879"/>
+            <a:ext cx="6508210" cy="369332"/>
+          </a:xfrm>
+          <a:prstGeom prst="rect">
+            <a:avLst/>
+          </a:prstGeom>
+          <a:solidFill>
+            <a:srgbClr val="FFC000"/>
+          </a:solidFill>
+        </p:spPr>
+        <p:txBody>
+          <a:bodyPr wrap="square" rtlCol="0">
+            <a:spAutoFit/>
+          </a:bodyPr>
+          <a:lstStyle/>
+          <a:p>
+            <a:r>
+              <a:rPr lang="en-US" dirty="0"/>
+              <a:t>How to exam the version of </a:t>
+            </a:r>
+            <a:r>
+              <a:rPr lang="en-US" i="1" dirty="0">
+                <a:solidFill>
+                  <a:srgbClr val="007DB5"/>
+                </a:solidFill>
+              </a:rPr>
+              <a:t>Chrome</a:t>
+            </a:r>
+            <a:r>
+              <a:rPr lang="en-US" dirty="0"/>
+              <a:t> using </a:t>
+            </a:r>
+            <a:r>
+              <a:rPr lang="en-US" i="1" dirty="0" err="1">
+                <a:solidFill>
+                  <a:srgbClr val="007DB5"/>
+                </a:solidFill>
+              </a:rPr>
+              <a:t>hivexsh</a:t>
+            </a:r>
+            <a:r>
+              <a:rPr lang="en-US" i="1" dirty="0">
+                <a:solidFill>
+                  <a:srgbClr val="007DB5"/>
+                </a:solidFill>
+              </a:rPr>
+              <a:t> </a:t>
+            </a:r>
+            <a:r>
+              <a:rPr lang="en-US" dirty="0"/>
+              <a:t>?</a:t>
+            </a:r>
+          </a:p>
+        </p:txBody>
+      </p:sp>
+    </p:spTree>
+    <p:extLst>
+      <p:ext uri="{BB962C8B-B14F-4D97-AF65-F5344CB8AC3E}">
+        <p14:creationId xmlns:p14="http://schemas.microsoft.com/office/powerpoint/2010/main" val="3748405130"/>
+      </p:ext>
+    </p:extLst>
+  </p:cSld>
+  <p:clrMapOvr>
+    <a:masterClrMapping/>
+  </p:clrMapOvr>
+</p:sld>
+</file>
+
+<file path=ppt/slides/slide12.xml><?xml version="1.0" encoding="utf-8"?>
 <p:sld xmlns:a="http://schemas.openxmlformats.org/drawingml/2006/main" xmlns:r="http://schemas.openxmlformats.org/officeDocument/2006/relationships" xmlns:p="http://schemas.openxmlformats.org/presentationml/2006/main">
   <p:cSld>
     <p:spTree>
@@ -8831,7 +9269,7 @@
 </p:sld>
 </file>
 
-<file path=ppt/slides/slide11.xml><?xml version="1.0" encoding="utf-8"?>
+<file path=ppt/slides/slide13.xml><?xml version="1.0" encoding="utf-8"?>
 <p:sld xmlns:a="http://schemas.openxmlformats.org/drawingml/2006/main" xmlns:r="http://schemas.openxmlformats.org/officeDocument/2006/relationships" xmlns:p="http://schemas.openxmlformats.org/presentationml/2006/main">
   <p:cSld>
     <p:spTree>
@@ -8930,7 +9368,7 @@
 </p:sld>
 </file>
 
-<file path=ppt/slides/slide12.xml><?xml version="1.0" encoding="utf-8"?>
+<file path=ppt/slides/slide14.xml><?xml version="1.0" encoding="utf-8"?>
 <p:sld xmlns:a="http://schemas.openxmlformats.org/drawingml/2006/main" xmlns:r="http://schemas.openxmlformats.org/officeDocument/2006/relationships" xmlns:p="http://schemas.openxmlformats.org/presentationml/2006/main">
   <p:cSld>
     <p:spTree>
@@ -9030,7 +9468,7 @@
 </p:sld>
 </file>
 
-<file path=ppt/slides/slide13.xml><?xml version="1.0" encoding="utf-8"?>
+<file path=ppt/slides/slide15.xml><?xml version="1.0" encoding="utf-8"?>
 <p:sld xmlns:a="http://schemas.openxmlformats.org/drawingml/2006/main" xmlns:r="http://schemas.openxmlformats.org/officeDocument/2006/relationships" xmlns:p="http://schemas.openxmlformats.org/presentationml/2006/main">
   <p:cSld>
     <p:spTree>
@@ -9153,7 +9591,7 @@
 </p:sld>
 </file>
 
-<file path=ppt/slides/slide14.xml><?xml version="1.0" encoding="utf-8"?>
+<file path=ppt/slides/slide16.xml><?xml version="1.0" encoding="utf-8"?>
 <p:sld xmlns:a="http://schemas.openxmlformats.org/drawingml/2006/main" xmlns:r="http://schemas.openxmlformats.org/officeDocument/2006/relationships" xmlns:p="http://schemas.openxmlformats.org/presentationml/2006/main">
   <p:cSld>
     <p:spTree>
@@ -9283,7 +9721,7 @@
 </p:sld>
 </file>
 
-<file path=ppt/slides/slide15.xml><?xml version="1.0" encoding="utf-8"?>
+<file path=ppt/slides/slide17.xml><?xml version="1.0" encoding="utf-8"?>
 <p:sld xmlns:a="http://schemas.openxmlformats.org/drawingml/2006/main" xmlns:r="http://schemas.openxmlformats.org/officeDocument/2006/relationships" xmlns:p="http://schemas.openxmlformats.org/presentationml/2006/main">
   <p:cSld>
     <p:spTree>
@@ -9461,7 +9899,7 @@
 </p:sld>
 </file>
 
-<file path=ppt/slides/slide16.xml><?xml version="1.0" encoding="utf-8"?>
+<file path=ppt/slides/slide18.xml><?xml version="1.0" encoding="utf-8"?>
 <p:sld xmlns:a="http://schemas.openxmlformats.org/drawingml/2006/main" xmlns:r="http://schemas.openxmlformats.org/officeDocument/2006/relationships" xmlns:p="http://schemas.openxmlformats.org/presentationml/2006/main">
   <p:cSld>
     <p:spTree>
@@ -9559,7 +9997,7 @@
 </p:sld>
 </file>
 
-<file path=ppt/slides/slide17.xml><?xml version="1.0" encoding="utf-8"?>
+<file path=ppt/slides/slide19.xml><?xml version="1.0" encoding="utf-8"?>
 <p:sld xmlns:a="http://schemas.openxmlformats.org/drawingml/2006/main" xmlns:r="http://schemas.openxmlformats.org/officeDocument/2006/relationships" xmlns:p="http://schemas.openxmlformats.org/presentationml/2006/main">
   <p:cSld>
     <p:spTree>
@@ -9758,7 +10196,109 @@
 </p:sld>
 </file>
 
-<file path=ppt/slides/slide18.xml><?xml version="1.0" encoding="utf-8"?>
+<file path=ppt/slides/slide2.xml><?xml version="1.0" encoding="utf-8"?>
+<p:sld xmlns:a="http://schemas.openxmlformats.org/drawingml/2006/main" xmlns:r="http://schemas.openxmlformats.org/officeDocument/2006/relationships" xmlns:p="http://schemas.openxmlformats.org/presentationml/2006/main">
+  <p:cSld>
+    <p:spTree>
+      <p:nvGrpSpPr>
+        <p:cNvPr id="1" name=""/>
+        <p:cNvGrpSpPr/>
+        <p:nvPr/>
+      </p:nvGrpSpPr>
+      <p:grpSpPr>
+        <a:xfrm>
+          <a:off x="0" y="0"/>
+          <a:ext cx="0" cy="0"/>
+          <a:chOff x="0" y="0"/>
+          <a:chExt cx="0" cy="0"/>
+        </a:xfrm>
+      </p:grpSpPr>
+      <p:sp>
+        <p:nvSpPr>
+          <p:cNvPr id="2" name="Title 1">
+            <a:extLst>
+              <a:ext uri="{FF2B5EF4-FFF2-40B4-BE49-F238E27FC236}">
+                <a16:creationId xmlns:a16="http://schemas.microsoft.com/office/drawing/2014/main" id="{5FA1E2A4-C2D3-092B-E707-504A200298E7}"/>
+              </a:ext>
+            </a:extLst>
+          </p:cNvPr>
+          <p:cNvSpPr>
+            <a:spLocks noGrp="1"/>
+          </p:cNvSpPr>
+          <p:nvPr>
+            <p:ph type="title"/>
+          </p:nvPr>
+        </p:nvSpPr>
+        <p:spPr/>
+        <p:txBody>
+          <a:bodyPr/>
+          <a:lstStyle/>
+          <a:p>
+            <a:r>
+              <a:rPr lang="en-US" dirty="0"/>
+              <a:t>Goals</a:t>
+            </a:r>
+          </a:p>
+        </p:txBody>
+      </p:sp>
+      <p:sp>
+        <p:nvSpPr>
+          <p:cNvPr id="3" name="Content Placeholder 2">
+            <a:extLst>
+              <a:ext uri="{FF2B5EF4-FFF2-40B4-BE49-F238E27FC236}">
+                <a16:creationId xmlns:a16="http://schemas.microsoft.com/office/drawing/2014/main" id="{C37B6B56-2138-CADD-E2D5-70BE27CBC5CC}"/>
+              </a:ext>
+            </a:extLst>
+          </p:cNvPr>
+          <p:cNvSpPr>
+            <a:spLocks noGrp="1"/>
+          </p:cNvSpPr>
+          <p:nvPr>
+            <p:ph idx="1"/>
+          </p:nvPr>
+        </p:nvSpPr>
+        <p:spPr/>
+        <p:txBody>
+          <a:bodyPr/>
+          <a:lstStyle/>
+          <a:p>
+            <a:r>
+              <a:rPr lang="en-US" dirty="0"/>
+              <a:t>Understand the compute layer that generates evidence</a:t>
+            </a:r>
+          </a:p>
+          <a:p>
+            <a:r>
+              <a:rPr lang="en-US" dirty="0"/>
+              <a:t>The approach to investigating browser history</a:t>
+            </a:r>
+          </a:p>
+          <a:p>
+            <a:r>
+              <a:rPr lang="en-US"/>
+              <a:t>Familiar </a:t>
+            </a:r>
+            <a:r>
+              <a:rPr lang="en-US" dirty="0"/>
+              <a:t>with important tools for cyber investigations</a:t>
+            </a:r>
+          </a:p>
+        </p:txBody>
+      </p:sp>
+    </p:spTree>
+    <p:extLst>
+      <p:ext uri="{BB962C8B-B14F-4D97-AF65-F5344CB8AC3E}">
+        <p14:creationId xmlns:p14="http://schemas.microsoft.com/office/powerpoint/2010/main" val="2202518917"/>
+      </p:ext>
+    </p:extLst>
+  </p:cSld>
+  <p:clrMapOvr>
+    <a:masterClrMapping/>
+  </p:clrMapOvr>
+</p:sld>
+</file>
+
+<file path=ppt/slides/slide20.xml><?xml version="1.0" encoding="utf-8"?>
 <p:sld xmlns:a="http://schemas.openxmlformats.org/drawingml/2006/main" xmlns:r="http://schemas.openxmlformats.org/officeDocument/2006/relationships" xmlns:p="http://schemas.openxmlformats.org/presentationml/2006/main">
   <p:cSld>
     <p:spTree>
@@ -9979,7 +10519,7 @@
 </p:sld>
 </file>
 
-<file path=ppt/slides/slide19.xml><?xml version="1.0" encoding="utf-8"?>
+<file path=ppt/slides/slide21.xml><?xml version="1.0" encoding="utf-8"?>
 <p:sld xmlns:a="http://schemas.openxmlformats.org/drawingml/2006/main" xmlns:r="http://schemas.openxmlformats.org/officeDocument/2006/relationships" xmlns:p="http://schemas.openxmlformats.org/presentationml/2006/main">
   <p:cSld>
     <p:spTree>
@@ -10033,285 +10573,7 @@
 </p:sld>
 </file>
 
-<file path=ppt/slides/slide2.xml><?xml version="1.0" encoding="utf-8"?>
-<p:sld xmlns:a="http://schemas.openxmlformats.org/drawingml/2006/main" xmlns:r="http://schemas.openxmlformats.org/officeDocument/2006/relationships" xmlns:p="http://schemas.openxmlformats.org/presentationml/2006/main">
-  <p:cSld>
-    <p:spTree>
-      <p:nvGrpSpPr>
-        <p:cNvPr id="1" name=""/>
-        <p:cNvGrpSpPr/>
-        <p:nvPr/>
-      </p:nvGrpSpPr>
-      <p:grpSpPr>
-        <a:xfrm>
-          <a:off x="0" y="0"/>
-          <a:ext cx="0" cy="0"/>
-          <a:chOff x="0" y="0"/>
-          <a:chExt cx="0" cy="0"/>
-        </a:xfrm>
-      </p:grpSpPr>
-      <p:pic>
-        <p:nvPicPr>
-          <p:cNvPr id="1026" name="Picture 2" descr="Technology layers from hardware to users.">
-            <a:extLst>
-              <a:ext uri="{FF2B5EF4-FFF2-40B4-BE49-F238E27FC236}">
-                <a16:creationId xmlns:a16="http://schemas.microsoft.com/office/drawing/2014/main" id="{383A4A36-A8F1-4488-B678-B0A846360527}"/>
-              </a:ext>
-            </a:extLst>
-          </p:cNvPr>
-          <p:cNvPicPr>
-            <a:picLocks noChangeAspect="1" noChangeArrowheads="1"/>
-          </p:cNvPicPr>
-          <p:nvPr/>
-        </p:nvPicPr>
-        <p:blipFill>
-          <a:blip r:embed="rId2">
-            <a:extLst>
-              <a:ext uri="{28A0092B-C50C-407E-A947-70E740481C1C}">
-                <a14:useLocalDpi xmlns:a14="http://schemas.microsoft.com/office/drawing/2010/main" val="0"/>
-              </a:ext>
-            </a:extLst>
-          </a:blip>
-          <a:stretch>
-            <a:fillRect/>
-          </a:stretch>
-        </p:blipFill>
-        <p:spPr bwMode="auto">
-          <a:xfrm>
-            <a:off x="841894" y="446882"/>
-            <a:ext cx="8105747" cy="5411755"/>
-          </a:xfrm>
-          <a:prstGeom prst="rect">
-            <a:avLst/>
-          </a:prstGeom>
-          <a:noFill/>
-          <a:extLst>
-            <a:ext uri="{909E8E84-426E-40DD-AFC4-6F175D3DCCD1}">
-              <a14:hiddenFill xmlns:a14="http://schemas.microsoft.com/office/drawing/2010/main">
-                <a:solidFill>
-                  <a:srgbClr val="FFFFFF"/>
-                </a:solidFill>
-              </a14:hiddenFill>
-            </a:ext>
-          </a:extLst>
-        </p:spPr>
-      </p:pic>
-      <p:sp>
-        <p:nvSpPr>
-          <p:cNvPr id="6" name="TextBox 5">
-            <a:extLst>
-              <a:ext uri="{FF2B5EF4-FFF2-40B4-BE49-F238E27FC236}">
-                <a16:creationId xmlns:a16="http://schemas.microsoft.com/office/drawing/2014/main" id="{DBB35AD8-5C2E-43B0-9DEE-1602D90C480F}"/>
-              </a:ext>
-            </a:extLst>
-          </p:cNvPr>
-          <p:cNvSpPr txBox="1"/>
-          <p:nvPr/>
-        </p:nvSpPr>
-        <p:spPr>
-          <a:xfrm>
-            <a:off x="7189393" y="6566910"/>
-            <a:ext cx="6176864" cy="261610"/>
-          </a:xfrm>
-          <a:prstGeom prst="rect">
-            <a:avLst/>
-          </a:prstGeom>
-          <a:noFill/>
-        </p:spPr>
-        <p:txBody>
-          <a:bodyPr wrap="square">
-            <a:spAutoFit/>
-          </a:bodyPr>
-          <a:lstStyle/>
-          <a:p>
-            <a:r>
-              <a:rPr lang="en-US" sz="1050" dirty="0"/>
-              <a:t>https://windsongtraining.ca/</a:t>
-            </a:r>
-            <a:r>
-              <a:rPr lang="en-US" sz="900" dirty="0"/>
-              <a:t>the-technology-layer-cake-users-apps-os-and-hardware</a:t>
-            </a:r>
-            <a:r>
-              <a:rPr lang="en-US" sz="1050" dirty="0"/>
-              <a:t>/</a:t>
-            </a:r>
-          </a:p>
-        </p:txBody>
-      </p:sp>
-      <p:sp>
-        <p:nvSpPr>
-          <p:cNvPr id="3" name="Right Brace 2">
-            <a:extLst>
-              <a:ext uri="{FF2B5EF4-FFF2-40B4-BE49-F238E27FC236}">
-                <a16:creationId xmlns:a16="http://schemas.microsoft.com/office/drawing/2014/main" id="{81FF3E71-63E4-4E3A-83FB-207CA7A70BB5}"/>
-              </a:ext>
-            </a:extLst>
-          </p:cNvPr>
-          <p:cNvSpPr/>
-          <p:nvPr/>
-        </p:nvSpPr>
-        <p:spPr>
-          <a:xfrm>
-            <a:off x="9157307" y="1468999"/>
-            <a:ext cx="946484" cy="4321015"/>
-          </a:xfrm>
-          <a:prstGeom prst="rightBrace">
-            <a:avLst/>
-          </a:prstGeom>
-        </p:spPr>
-        <p:style>
-          <a:lnRef idx="1">
-            <a:schemeClr val="accent1"/>
-          </a:lnRef>
-          <a:fillRef idx="0">
-            <a:schemeClr val="accent1"/>
-          </a:fillRef>
-          <a:effectRef idx="0">
-            <a:schemeClr val="accent1"/>
-          </a:effectRef>
-          <a:fontRef idx="minor">
-            <a:schemeClr val="tx1"/>
-          </a:fontRef>
-        </p:style>
-        <p:txBody>
-          <a:bodyPr rtlCol="0" anchor="ctr"/>
-          <a:lstStyle/>
-          <a:p>
-            <a:pPr algn="ctr"/>
-            <a:endParaRPr lang="en-US" dirty="0"/>
-          </a:p>
-        </p:txBody>
-      </p:sp>
-      <p:sp>
-        <p:nvSpPr>
-          <p:cNvPr id="4" name="TextBox 3">
-            <a:extLst>
-              <a:ext uri="{FF2B5EF4-FFF2-40B4-BE49-F238E27FC236}">
-                <a16:creationId xmlns:a16="http://schemas.microsoft.com/office/drawing/2014/main" id="{6DF168C5-CA4C-4395-8075-B4EE8934D9AD}"/>
-              </a:ext>
-            </a:extLst>
-          </p:cNvPr>
-          <p:cNvSpPr txBox="1"/>
-          <p:nvPr/>
-        </p:nvSpPr>
-        <p:spPr>
-          <a:xfrm>
-            <a:off x="10313457" y="2056675"/>
-            <a:ext cx="1878543" cy="2585323"/>
-          </a:xfrm>
-          <a:prstGeom prst="rect">
-            <a:avLst/>
-          </a:prstGeom>
-          <a:noFill/>
-        </p:spPr>
-        <p:txBody>
-          <a:bodyPr wrap="square" rtlCol="0">
-            <a:spAutoFit/>
-          </a:bodyPr>
-          <a:lstStyle/>
-          <a:p>
-            <a:pPr marL="285750" indent="-285750">
-              <a:buFont typeface="Arial" panose="020B0604020202020204" pitchFamily="34" charset="0"/>
-              <a:buChar char="•"/>
-            </a:pPr>
-            <a:r>
-              <a:rPr lang="en-US" dirty="0">
-                <a:solidFill>
-                  <a:srgbClr val="FF0000"/>
-                </a:solidFill>
-              </a:rPr>
-              <a:t>Evidence</a:t>
-            </a:r>
-            <a:r>
-              <a:rPr lang="en-US" dirty="0"/>
-              <a:t> is generated from each layer</a:t>
-            </a:r>
-          </a:p>
-          <a:p>
-            <a:pPr marL="285750" indent="-285750">
-              <a:buFont typeface="Arial" panose="020B0604020202020204" pitchFamily="34" charset="0"/>
-              <a:buChar char="•"/>
-            </a:pPr>
-            <a:r>
-              <a:rPr lang="en-US" dirty="0">
-                <a:solidFill>
-                  <a:srgbClr val="7030A0"/>
-                </a:solidFill>
-              </a:rPr>
-              <a:t>User activities= Applications+ OS+ Disk/Memory</a:t>
-            </a:r>
-          </a:p>
-        </p:txBody>
-      </p:sp>
-      <p:sp>
-        <p:nvSpPr>
-          <p:cNvPr id="5" name="Arrow: Right 4">
-            <a:extLst>
-              <a:ext uri="{FF2B5EF4-FFF2-40B4-BE49-F238E27FC236}">
-                <a16:creationId xmlns:a16="http://schemas.microsoft.com/office/drawing/2014/main" id="{F41488E2-6CC7-AC84-80C7-6DE74C734264}"/>
-              </a:ext>
-            </a:extLst>
-          </p:cNvPr>
-          <p:cNvSpPr/>
-          <p:nvPr/>
-        </p:nvSpPr>
-        <p:spPr>
-          <a:xfrm>
-            <a:off x="165005" y="2660698"/>
-            <a:ext cx="838772" cy="343759"/>
-          </a:xfrm>
-          <a:prstGeom prst="rightArrow">
-            <a:avLst/>
-          </a:prstGeom>
-          <a:solidFill>
-            <a:srgbClr val="FF0000"/>
-          </a:solidFill>
-          <a:ln>
-            <a:solidFill>
-              <a:srgbClr val="FF0000"/>
-            </a:solidFill>
-          </a:ln>
-        </p:spPr>
-        <p:style>
-          <a:lnRef idx="2">
-            <a:schemeClr val="accent1">
-              <a:shade val="50000"/>
-            </a:schemeClr>
-          </a:lnRef>
-          <a:fillRef idx="1">
-            <a:schemeClr val="accent1"/>
-          </a:fillRef>
-          <a:effectRef idx="0">
-            <a:schemeClr val="accent1"/>
-          </a:effectRef>
-          <a:fontRef idx="minor">
-            <a:schemeClr val="lt1"/>
-          </a:fontRef>
-        </p:style>
-        <p:txBody>
-          <a:bodyPr rtlCol="0" anchor="ctr"/>
-          <a:lstStyle/>
-          <a:p>
-            <a:pPr algn="ctr"/>
-            <a:endParaRPr lang="en-US"/>
-          </a:p>
-        </p:txBody>
-      </p:sp>
-    </p:spTree>
-    <p:extLst>
-      <p:ext uri="{BB962C8B-B14F-4D97-AF65-F5344CB8AC3E}">
-        <p14:creationId xmlns:p14="http://schemas.microsoft.com/office/powerpoint/2010/main" val="4010385979"/>
-      </p:ext>
-    </p:extLst>
-  </p:cSld>
-  <p:clrMapOvr>
-    <a:masterClrMapping/>
-  </p:clrMapOvr>
-</p:sld>
-</file>
-
-<file path=ppt/slides/slide20.xml><?xml version="1.0" encoding="utf-8"?>
+<file path=ppt/slides/slide22.xml><?xml version="1.0" encoding="utf-8"?>
 <p:sld xmlns:a="http://schemas.openxmlformats.org/drawingml/2006/main" xmlns:r="http://schemas.openxmlformats.org/officeDocument/2006/relationships" xmlns:p="http://schemas.openxmlformats.org/presentationml/2006/main">
   <p:cSld>
     <p:spTree>
@@ -10525,7 +10787,7 @@
 </p:sld>
 </file>
 
-<file path=ppt/slides/slide21.xml><?xml version="1.0" encoding="utf-8"?>
+<file path=ppt/slides/slide23.xml><?xml version="1.0" encoding="utf-8"?>
 <p:sld xmlns:a="http://schemas.openxmlformats.org/drawingml/2006/main" xmlns:r="http://schemas.openxmlformats.org/officeDocument/2006/relationships" xmlns:p="http://schemas.openxmlformats.org/presentationml/2006/main">
   <p:cSld>
     <p:spTree>
@@ -10722,7 +10984,7 @@
 </p:sld>
 </file>
 
-<file path=ppt/slides/slide22.xml><?xml version="1.0" encoding="utf-8"?>
+<file path=ppt/slides/slide24.xml><?xml version="1.0" encoding="utf-8"?>
 <p:sld xmlns:a="http://schemas.openxmlformats.org/drawingml/2006/main" xmlns:r="http://schemas.openxmlformats.org/officeDocument/2006/relationships" xmlns:p="http://schemas.openxmlformats.org/presentationml/2006/main">
   <p:cSld>
     <p:spTree>
@@ -11157,7 +11419,7 @@
 </p:sld>
 </file>
 
-<file path=ppt/slides/slide23.xml><?xml version="1.0" encoding="utf-8"?>
+<file path=ppt/slides/slide25.xml><?xml version="1.0" encoding="utf-8"?>
 <p:sld xmlns:a="http://schemas.openxmlformats.org/drawingml/2006/main" xmlns:r="http://schemas.openxmlformats.org/officeDocument/2006/relationships" xmlns:p="http://schemas.openxmlformats.org/presentationml/2006/main">
   <p:cSld>
     <p:spTree>
@@ -11321,7 +11583,7 @@
 </p:sld>
 </file>
 
-<file path=ppt/slides/slide24.xml><?xml version="1.0" encoding="utf-8"?>
+<file path=ppt/slides/slide26.xml><?xml version="1.0" encoding="utf-8"?>
 <p:sld xmlns:a="http://schemas.openxmlformats.org/drawingml/2006/main" xmlns:r="http://schemas.openxmlformats.org/officeDocument/2006/relationships" xmlns:p="http://schemas.openxmlformats.org/presentationml/2006/main">
   <p:cSld>
     <p:spTree>
@@ -11430,7 +11692,7 @@
 </p:sld>
 </file>
 
-<file path=ppt/slides/slide25.xml><?xml version="1.0" encoding="utf-8"?>
+<file path=ppt/slides/slide27.xml><?xml version="1.0" encoding="utf-8"?>
 <p:sld xmlns:a="http://schemas.openxmlformats.org/drawingml/2006/main" xmlns:r="http://schemas.openxmlformats.org/officeDocument/2006/relationships" xmlns:p="http://schemas.openxmlformats.org/presentationml/2006/main">
   <p:cSld>
     <p:spTree>
@@ -11733,7 +11995,7 @@
 </p:sld>
 </file>
 
-<file path=ppt/slides/slide26.xml><?xml version="1.0" encoding="utf-8"?>
+<file path=ppt/slides/slide28.xml><?xml version="1.0" encoding="utf-8"?>
 <p:sld xmlns:a="http://schemas.openxmlformats.org/drawingml/2006/main" xmlns:r="http://schemas.openxmlformats.org/officeDocument/2006/relationships" xmlns:p="http://schemas.openxmlformats.org/presentationml/2006/main">
   <p:cSld>
     <p:spTree>
@@ -11933,7 +12195,7 @@
 </p:sld>
 </file>
 
-<file path=ppt/slides/slide27.xml><?xml version="1.0" encoding="utf-8"?>
+<file path=ppt/slides/slide29.xml><?xml version="1.0" encoding="utf-8"?>
 <p:sld xmlns:a="http://schemas.openxmlformats.org/drawingml/2006/main" xmlns:r="http://schemas.openxmlformats.org/officeDocument/2006/relationships" xmlns:p="http://schemas.openxmlformats.org/presentationml/2006/main">
   <p:cSld>
     <p:spTree>
@@ -12087,7 +12349,285 @@
 </p:sld>
 </file>
 
-<file path=ppt/slides/slide28.xml><?xml version="1.0" encoding="utf-8"?>
+<file path=ppt/slides/slide3.xml><?xml version="1.0" encoding="utf-8"?>
+<p:sld xmlns:a="http://schemas.openxmlformats.org/drawingml/2006/main" xmlns:r="http://schemas.openxmlformats.org/officeDocument/2006/relationships" xmlns:p="http://schemas.openxmlformats.org/presentationml/2006/main">
+  <p:cSld>
+    <p:spTree>
+      <p:nvGrpSpPr>
+        <p:cNvPr id="1" name=""/>
+        <p:cNvGrpSpPr/>
+        <p:nvPr/>
+      </p:nvGrpSpPr>
+      <p:grpSpPr>
+        <a:xfrm>
+          <a:off x="0" y="0"/>
+          <a:ext cx="0" cy="0"/>
+          <a:chOff x="0" y="0"/>
+          <a:chExt cx="0" cy="0"/>
+        </a:xfrm>
+      </p:grpSpPr>
+      <p:pic>
+        <p:nvPicPr>
+          <p:cNvPr id="1026" name="Picture 2" descr="Technology layers from hardware to users.">
+            <a:extLst>
+              <a:ext uri="{FF2B5EF4-FFF2-40B4-BE49-F238E27FC236}">
+                <a16:creationId xmlns:a16="http://schemas.microsoft.com/office/drawing/2014/main" id="{383A4A36-A8F1-4488-B678-B0A846360527}"/>
+              </a:ext>
+            </a:extLst>
+          </p:cNvPr>
+          <p:cNvPicPr>
+            <a:picLocks noChangeAspect="1" noChangeArrowheads="1"/>
+          </p:cNvPicPr>
+          <p:nvPr/>
+        </p:nvPicPr>
+        <p:blipFill>
+          <a:blip r:embed="rId2">
+            <a:extLst>
+              <a:ext uri="{28A0092B-C50C-407E-A947-70E740481C1C}">
+                <a14:useLocalDpi xmlns:a14="http://schemas.microsoft.com/office/drawing/2010/main" val="0"/>
+              </a:ext>
+            </a:extLst>
+          </a:blip>
+          <a:stretch>
+            <a:fillRect/>
+          </a:stretch>
+        </p:blipFill>
+        <p:spPr bwMode="auto">
+          <a:xfrm>
+            <a:off x="841894" y="446882"/>
+            <a:ext cx="8105747" cy="5411755"/>
+          </a:xfrm>
+          <a:prstGeom prst="rect">
+            <a:avLst/>
+          </a:prstGeom>
+          <a:noFill/>
+          <a:extLst>
+            <a:ext uri="{909E8E84-426E-40DD-AFC4-6F175D3DCCD1}">
+              <a14:hiddenFill xmlns:a14="http://schemas.microsoft.com/office/drawing/2010/main">
+                <a:solidFill>
+                  <a:srgbClr val="FFFFFF"/>
+                </a:solidFill>
+              </a14:hiddenFill>
+            </a:ext>
+          </a:extLst>
+        </p:spPr>
+      </p:pic>
+      <p:sp>
+        <p:nvSpPr>
+          <p:cNvPr id="6" name="TextBox 5">
+            <a:extLst>
+              <a:ext uri="{FF2B5EF4-FFF2-40B4-BE49-F238E27FC236}">
+                <a16:creationId xmlns:a16="http://schemas.microsoft.com/office/drawing/2014/main" id="{DBB35AD8-5C2E-43B0-9DEE-1602D90C480F}"/>
+              </a:ext>
+            </a:extLst>
+          </p:cNvPr>
+          <p:cNvSpPr txBox="1"/>
+          <p:nvPr/>
+        </p:nvSpPr>
+        <p:spPr>
+          <a:xfrm>
+            <a:off x="7189393" y="6566910"/>
+            <a:ext cx="6176864" cy="261610"/>
+          </a:xfrm>
+          <a:prstGeom prst="rect">
+            <a:avLst/>
+          </a:prstGeom>
+          <a:noFill/>
+        </p:spPr>
+        <p:txBody>
+          <a:bodyPr wrap="square">
+            <a:spAutoFit/>
+          </a:bodyPr>
+          <a:lstStyle/>
+          <a:p>
+            <a:r>
+              <a:rPr lang="en-US" sz="1050" dirty="0"/>
+              <a:t>https://windsongtraining.ca/</a:t>
+            </a:r>
+            <a:r>
+              <a:rPr lang="en-US" sz="900" dirty="0"/>
+              <a:t>the-technology-layer-cake-users-apps-os-and-hardware</a:t>
+            </a:r>
+            <a:r>
+              <a:rPr lang="en-US" sz="1050" dirty="0"/>
+              <a:t>/</a:t>
+            </a:r>
+          </a:p>
+        </p:txBody>
+      </p:sp>
+      <p:sp>
+        <p:nvSpPr>
+          <p:cNvPr id="3" name="Right Brace 2">
+            <a:extLst>
+              <a:ext uri="{FF2B5EF4-FFF2-40B4-BE49-F238E27FC236}">
+                <a16:creationId xmlns:a16="http://schemas.microsoft.com/office/drawing/2014/main" id="{81FF3E71-63E4-4E3A-83FB-207CA7A70BB5}"/>
+              </a:ext>
+            </a:extLst>
+          </p:cNvPr>
+          <p:cNvSpPr/>
+          <p:nvPr/>
+        </p:nvSpPr>
+        <p:spPr>
+          <a:xfrm>
+            <a:off x="9157307" y="1468999"/>
+            <a:ext cx="946484" cy="4321015"/>
+          </a:xfrm>
+          <a:prstGeom prst="rightBrace">
+            <a:avLst/>
+          </a:prstGeom>
+        </p:spPr>
+        <p:style>
+          <a:lnRef idx="1">
+            <a:schemeClr val="accent1"/>
+          </a:lnRef>
+          <a:fillRef idx="0">
+            <a:schemeClr val="accent1"/>
+          </a:fillRef>
+          <a:effectRef idx="0">
+            <a:schemeClr val="accent1"/>
+          </a:effectRef>
+          <a:fontRef idx="minor">
+            <a:schemeClr val="tx1"/>
+          </a:fontRef>
+        </p:style>
+        <p:txBody>
+          <a:bodyPr rtlCol="0" anchor="ctr"/>
+          <a:lstStyle/>
+          <a:p>
+            <a:pPr algn="ctr"/>
+            <a:endParaRPr lang="en-US" dirty="0"/>
+          </a:p>
+        </p:txBody>
+      </p:sp>
+      <p:sp>
+        <p:nvSpPr>
+          <p:cNvPr id="4" name="TextBox 3">
+            <a:extLst>
+              <a:ext uri="{FF2B5EF4-FFF2-40B4-BE49-F238E27FC236}">
+                <a16:creationId xmlns:a16="http://schemas.microsoft.com/office/drawing/2014/main" id="{6DF168C5-CA4C-4395-8075-B4EE8934D9AD}"/>
+              </a:ext>
+            </a:extLst>
+          </p:cNvPr>
+          <p:cNvSpPr txBox="1"/>
+          <p:nvPr/>
+        </p:nvSpPr>
+        <p:spPr>
+          <a:xfrm>
+            <a:off x="10313457" y="2056675"/>
+            <a:ext cx="1878543" cy="2585323"/>
+          </a:xfrm>
+          <a:prstGeom prst="rect">
+            <a:avLst/>
+          </a:prstGeom>
+          <a:noFill/>
+        </p:spPr>
+        <p:txBody>
+          <a:bodyPr wrap="square" rtlCol="0">
+            <a:spAutoFit/>
+          </a:bodyPr>
+          <a:lstStyle/>
+          <a:p>
+            <a:pPr marL="285750" indent="-285750">
+              <a:buFont typeface="Arial" panose="020B0604020202020204" pitchFamily="34" charset="0"/>
+              <a:buChar char="•"/>
+            </a:pPr>
+            <a:r>
+              <a:rPr lang="en-US" dirty="0">
+                <a:solidFill>
+                  <a:srgbClr val="FF0000"/>
+                </a:solidFill>
+              </a:rPr>
+              <a:t>Evidence</a:t>
+            </a:r>
+            <a:r>
+              <a:rPr lang="en-US" dirty="0"/>
+              <a:t> is generated from each layer</a:t>
+            </a:r>
+          </a:p>
+          <a:p>
+            <a:pPr marL="285750" indent="-285750">
+              <a:buFont typeface="Arial" panose="020B0604020202020204" pitchFamily="34" charset="0"/>
+              <a:buChar char="•"/>
+            </a:pPr>
+            <a:r>
+              <a:rPr lang="en-US" dirty="0">
+                <a:solidFill>
+                  <a:srgbClr val="7030A0"/>
+                </a:solidFill>
+              </a:rPr>
+              <a:t>User activities= Applications+ OS+ Disk/Memory</a:t>
+            </a:r>
+          </a:p>
+        </p:txBody>
+      </p:sp>
+      <p:sp>
+        <p:nvSpPr>
+          <p:cNvPr id="5" name="Arrow: Right 4">
+            <a:extLst>
+              <a:ext uri="{FF2B5EF4-FFF2-40B4-BE49-F238E27FC236}">
+                <a16:creationId xmlns:a16="http://schemas.microsoft.com/office/drawing/2014/main" id="{F41488E2-6CC7-AC84-80C7-6DE74C734264}"/>
+              </a:ext>
+            </a:extLst>
+          </p:cNvPr>
+          <p:cNvSpPr/>
+          <p:nvPr/>
+        </p:nvSpPr>
+        <p:spPr>
+          <a:xfrm>
+            <a:off x="165005" y="2660698"/>
+            <a:ext cx="838772" cy="343759"/>
+          </a:xfrm>
+          <a:prstGeom prst="rightArrow">
+            <a:avLst/>
+          </a:prstGeom>
+          <a:solidFill>
+            <a:srgbClr val="FF0000"/>
+          </a:solidFill>
+          <a:ln>
+            <a:solidFill>
+              <a:srgbClr val="FF0000"/>
+            </a:solidFill>
+          </a:ln>
+        </p:spPr>
+        <p:style>
+          <a:lnRef idx="2">
+            <a:schemeClr val="accent1">
+              <a:shade val="50000"/>
+            </a:schemeClr>
+          </a:lnRef>
+          <a:fillRef idx="1">
+            <a:schemeClr val="accent1"/>
+          </a:fillRef>
+          <a:effectRef idx="0">
+            <a:schemeClr val="accent1"/>
+          </a:effectRef>
+          <a:fontRef idx="minor">
+            <a:schemeClr val="lt1"/>
+          </a:fontRef>
+        </p:style>
+        <p:txBody>
+          <a:bodyPr rtlCol="0" anchor="ctr"/>
+          <a:lstStyle/>
+          <a:p>
+            <a:pPr algn="ctr"/>
+            <a:endParaRPr lang="en-US"/>
+          </a:p>
+        </p:txBody>
+      </p:sp>
+    </p:spTree>
+    <p:extLst>
+      <p:ext uri="{BB962C8B-B14F-4D97-AF65-F5344CB8AC3E}">
+        <p14:creationId xmlns:p14="http://schemas.microsoft.com/office/powerpoint/2010/main" val="4010385979"/>
+      </p:ext>
+    </p:extLst>
+  </p:cSld>
+  <p:clrMapOvr>
+    <a:masterClrMapping/>
+  </p:clrMapOvr>
+</p:sld>
+</file>
+
+<file path=ppt/slides/slide30.xml><?xml version="1.0" encoding="utf-8"?>
 <p:sld xmlns:a="http://schemas.openxmlformats.org/drawingml/2006/main" xmlns:r="http://schemas.openxmlformats.org/officeDocument/2006/relationships" xmlns:p="http://schemas.openxmlformats.org/presentationml/2006/main">
   <p:cSld>
     <p:spTree>
@@ -12180,7 +12720,7 @@
 </p:sld>
 </file>
 
-<file path=ppt/slides/slide29.xml><?xml version="1.0" encoding="utf-8"?>
+<file path=ppt/slides/slide31.xml><?xml version="1.0" encoding="utf-8"?>
 <p:sld xmlns:a="http://schemas.openxmlformats.org/drawingml/2006/main" xmlns:r="http://schemas.openxmlformats.org/officeDocument/2006/relationships" xmlns:p="http://schemas.openxmlformats.org/presentationml/2006/main">
   <p:cSld>
     <p:spTree>
@@ -12326,213 +12866,7 @@
 </p:sld>
 </file>
 
-<file path=ppt/slides/slide3.xml><?xml version="1.0" encoding="utf-8"?>
-<p:sld xmlns:a="http://schemas.openxmlformats.org/drawingml/2006/main" xmlns:r="http://schemas.openxmlformats.org/officeDocument/2006/relationships" xmlns:p="http://schemas.openxmlformats.org/presentationml/2006/main">
-  <p:cSld>
-    <p:spTree>
-      <p:nvGrpSpPr>
-        <p:cNvPr id="1" name=""/>
-        <p:cNvGrpSpPr/>
-        <p:nvPr/>
-      </p:nvGrpSpPr>
-      <p:grpSpPr>
-        <a:xfrm>
-          <a:off x="0" y="0"/>
-          <a:ext cx="0" cy="0"/>
-          <a:chOff x="0" y="0"/>
-          <a:chExt cx="0" cy="0"/>
-        </a:xfrm>
-      </p:grpSpPr>
-      <p:pic>
-        <p:nvPicPr>
-          <p:cNvPr id="1026" name="Picture 2" descr="The Two Types of Application Software: General Purpose Applications and  Custom Software - TurboFuture">
-            <a:extLst>
-              <a:ext uri="{FF2B5EF4-FFF2-40B4-BE49-F238E27FC236}">
-                <a16:creationId xmlns:a16="http://schemas.microsoft.com/office/drawing/2014/main" id="{35B4E213-5AE6-5BDE-1396-0D6E0E28D24C}"/>
-              </a:ext>
-            </a:extLst>
-          </p:cNvPr>
-          <p:cNvPicPr>
-            <a:picLocks noChangeAspect="1" noChangeArrowheads="1"/>
-          </p:cNvPicPr>
-          <p:nvPr/>
-        </p:nvPicPr>
-        <p:blipFill>
-          <a:blip r:embed="rId2">
-            <a:extLst>
-              <a:ext uri="{28A0092B-C50C-407E-A947-70E740481C1C}">
-                <a14:useLocalDpi xmlns:a14="http://schemas.microsoft.com/office/drawing/2010/main" val="0"/>
-              </a:ext>
-            </a:extLst>
-          </a:blip>
-          <a:srcRect/>
-          <a:stretch>
-            <a:fillRect/>
-          </a:stretch>
-        </p:blipFill>
-        <p:spPr bwMode="auto">
-          <a:xfrm>
-            <a:off x="1176130" y="2422973"/>
-            <a:ext cx="3576983" cy="2012053"/>
-          </a:xfrm>
-          <a:prstGeom prst="rect">
-            <a:avLst/>
-          </a:prstGeom>
-          <a:noFill/>
-          <a:extLst>
-            <a:ext uri="{909E8E84-426E-40DD-AFC4-6F175D3DCCD1}">
-              <a14:hiddenFill xmlns:a14="http://schemas.microsoft.com/office/drawing/2010/main">
-                <a:solidFill>
-                  <a:srgbClr val="FFFFFF"/>
-                </a:solidFill>
-              </a14:hiddenFill>
-            </a:ext>
-          </a:extLst>
-        </p:spPr>
-      </p:pic>
-      <p:pic>
-        <p:nvPicPr>
-          <p:cNvPr id="1030" name="Picture 6" descr="Storage Solutions on Microsoft Azure | by AnisKHELOUFI | Analytics Vidhya |  Medium">
-            <a:extLst>
-              <a:ext uri="{FF2B5EF4-FFF2-40B4-BE49-F238E27FC236}">
-                <a16:creationId xmlns:a16="http://schemas.microsoft.com/office/drawing/2014/main" id="{4E99F73B-9894-2401-CF24-79CAB34653F6}"/>
-              </a:ext>
-            </a:extLst>
-          </p:cNvPr>
-          <p:cNvPicPr>
-            <a:picLocks noChangeAspect="1" noChangeArrowheads="1"/>
-          </p:cNvPicPr>
-          <p:nvPr/>
-        </p:nvPicPr>
-        <p:blipFill>
-          <a:blip r:embed="rId3">
-            <a:extLst>
-              <a:ext uri="{28A0092B-C50C-407E-A947-70E740481C1C}">
-                <a14:useLocalDpi xmlns:a14="http://schemas.microsoft.com/office/drawing/2010/main" val="0"/>
-              </a:ext>
-            </a:extLst>
-          </a:blip>
-          <a:srcRect/>
-          <a:stretch>
-            <a:fillRect/>
-          </a:stretch>
-        </p:blipFill>
-        <p:spPr bwMode="auto">
-          <a:xfrm>
-            <a:off x="6096000" y="2716764"/>
-            <a:ext cx="4737953" cy="1424470"/>
-          </a:xfrm>
-          <a:prstGeom prst="rect">
-            <a:avLst/>
-          </a:prstGeom>
-          <a:noFill/>
-          <a:extLst>
-            <a:ext uri="{909E8E84-426E-40DD-AFC4-6F175D3DCCD1}">
-              <a14:hiddenFill xmlns:a14="http://schemas.microsoft.com/office/drawing/2010/main">
-                <a:solidFill>
-                  <a:srgbClr val="FFFFFF"/>
-                </a:solidFill>
-              </a14:hiddenFill>
-            </a:ext>
-          </a:extLst>
-        </p:spPr>
-      </p:pic>
-      <p:sp>
-        <p:nvSpPr>
-          <p:cNvPr id="2" name="Arrow: Right 1">
-            <a:extLst>
-              <a:ext uri="{FF2B5EF4-FFF2-40B4-BE49-F238E27FC236}">
-                <a16:creationId xmlns:a16="http://schemas.microsoft.com/office/drawing/2014/main" id="{793588AD-1E41-081C-1983-AD173D4A0A45}"/>
-              </a:ext>
-            </a:extLst>
-          </p:cNvPr>
-          <p:cNvSpPr/>
-          <p:nvPr/>
-        </p:nvSpPr>
-        <p:spPr>
-          <a:xfrm>
-            <a:off x="5094813" y="3333250"/>
-            <a:ext cx="838772" cy="343759"/>
-          </a:xfrm>
-          <a:prstGeom prst="rightArrow">
-            <a:avLst/>
-          </a:prstGeom>
-          <a:solidFill>
-            <a:srgbClr val="FF0000"/>
-          </a:solidFill>
-          <a:ln>
-            <a:solidFill>
-              <a:srgbClr val="FF0000"/>
-            </a:solidFill>
-          </a:ln>
-        </p:spPr>
-        <p:style>
-          <a:lnRef idx="2">
-            <a:schemeClr val="accent1">
-              <a:shade val="50000"/>
-            </a:schemeClr>
-          </a:lnRef>
-          <a:fillRef idx="1">
-            <a:schemeClr val="accent1"/>
-          </a:fillRef>
-          <a:effectRef idx="0">
-            <a:schemeClr val="accent1"/>
-          </a:effectRef>
-          <a:fontRef idx="minor">
-            <a:schemeClr val="lt1"/>
-          </a:fontRef>
-        </p:style>
-        <p:txBody>
-          <a:bodyPr rtlCol="0" anchor="ctr"/>
-          <a:lstStyle/>
-          <a:p>
-            <a:pPr algn="ctr"/>
-            <a:endParaRPr lang="en-US"/>
-          </a:p>
-        </p:txBody>
-      </p:sp>
-      <p:sp>
-        <p:nvSpPr>
-          <p:cNvPr id="3" name="Title 2">
-            <a:extLst>
-              <a:ext uri="{FF2B5EF4-FFF2-40B4-BE49-F238E27FC236}">
-                <a16:creationId xmlns:a16="http://schemas.microsoft.com/office/drawing/2014/main" id="{A2FBCAF6-1D6B-F98D-62FF-A370F64D637F}"/>
-              </a:ext>
-            </a:extLst>
-          </p:cNvPr>
-          <p:cNvSpPr>
-            <a:spLocks noGrp="1"/>
-          </p:cNvSpPr>
-          <p:nvPr>
-            <p:ph type="title"/>
-          </p:nvPr>
-        </p:nvSpPr>
-        <p:spPr/>
-        <p:txBody>
-          <a:bodyPr/>
-          <a:lstStyle/>
-          <a:p>
-            <a:r>
-              <a:rPr lang="en-US" dirty="0"/>
-              <a:t>Data generated by applications have different formats</a:t>
-            </a:r>
-          </a:p>
-        </p:txBody>
-      </p:sp>
-    </p:spTree>
-    <p:extLst>
-      <p:ext uri="{BB962C8B-B14F-4D97-AF65-F5344CB8AC3E}">
-        <p14:creationId xmlns:p14="http://schemas.microsoft.com/office/powerpoint/2010/main" val="2055990861"/>
-      </p:ext>
-    </p:extLst>
-  </p:cSld>
-  <p:clrMapOvr>
-    <a:masterClrMapping/>
-  </p:clrMapOvr>
-</p:sld>
-</file>
-
-<file path=ppt/slides/slide30.xml><?xml version="1.0" encoding="utf-8"?>
+<file path=ppt/slides/slide32.xml><?xml version="1.0" encoding="utf-8"?>
 <p:sld xmlns:a="http://schemas.openxmlformats.org/drawingml/2006/main" xmlns:r="http://schemas.openxmlformats.org/officeDocument/2006/relationships" xmlns:p="http://schemas.openxmlformats.org/presentationml/2006/main">
   <p:cSld>
     <p:spTree>
@@ -12658,7 +12992,7 @@
 </p:sld>
 </file>
 
-<file path=ppt/slides/slide31.xml><?xml version="1.0" encoding="utf-8"?>
+<file path=ppt/slides/slide33.xml><?xml version="1.0" encoding="utf-8"?>
 <p:sld xmlns:a="http://schemas.openxmlformats.org/drawingml/2006/main" xmlns:r="http://schemas.openxmlformats.org/officeDocument/2006/relationships" xmlns:p="http://schemas.openxmlformats.org/presentationml/2006/main">
   <p:cSld>
     <p:spTree>
@@ -12857,7 +13191,7 @@
 </p:sld>
 </file>
 
-<file path=ppt/slides/slide32.xml><?xml version="1.0" encoding="utf-8"?>
+<file path=ppt/slides/slide34.xml><?xml version="1.0" encoding="utf-8"?>
 <p:sld xmlns:a="http://schemas.openxmlformats.org/drawingml/2006/main" xmlns:r="http://schemas.openxmlformats.org/officeDocument/2006/relationships" xmlns:p="http://schemas.openxmlformats.org/presentationml/2006/main">
   <p:cSld>
     <p:spTree>
@@ -13047,15 +13381,7 @@
             </a:r>
             <a:r>
               <a:rPr lang="en-US" dirty="0"/>
-              <a:t> second – </a:t>
-            </a:r>
-            <a:r>
-              <a:rPr lang="en-US" dirty="0" err="1"/>
-              <a:t>unix</a:t>
-            </a:r>
-            <a:r>
-              <a:rPr lang="en-US" dirty="0"/>
-              <a:t> epoch time)</a:t>
+              <a:t> second – Unix epoch time)</a:t>
             </a:r>
           </a:p>
           <a:p>
@@ -13228,7 +13554,7 @@
 </p:sld>
 </file>
 
-<file path=ppt/slides/slide33.xml><?xml version="1.0" encoding="utf-8"?>
+<file path=ppt/slides/slide35.xml><?xml version="1.0" encoding="utf-8"?>
 <p:sld xmlns:a="http://schemas.openxmlformats.org/drawingml/2006/main" xmlns:r="http://schemas.openxmlformats.org/officeDocument/2006/relationships" xmlns:p="http://schemas.openxmlformats.org/presentationml/2006/main">
   <p:cSld>
     <p:spTree>
@@ -13338,7 +13664,7 @@
 </p:sld>
 </file>
 
-<file path=ppt/slides/slide34.xml><?xml version="1.0" encoding="utf-8"?>
+<file path=ppt/slides/slide36.xml><?xml version="1.0" encoding="utf-8"?>
 <p:sld xmlns:a="http://schemas.openxmlformats.org/drawingml/2006/main" xmlns:r="http://schemas.openxmlformats.org/officeDocument/2006/relationships" xmlns:p="http://schemas.openxmlformats.org/presentationml/2006/main">
   <p:cSld>
     <p:spTree>
@@ -13429,7 +13755,7 @@
 </p:sld>
 </file>
 
-<file path=ppt/slides/slide35.xml><?xml version="1.0" encoding="utf-8"?>
+<file path=ppt/slides/slide37.xml><?xml version="1.0" encoding="utf-8"?>
 <p:sld xmlns:a="http://schemas.openxmlformats.org/drawingml/2006/main" xmlns:r="http://schemas.openxmlformats.org/officeDocument/2006/relationships" xmlns:p="http://schemas.openxmlformats.org/presentationml/2006/main">
   <p:cSld>
     <p:spTree>
@@ -13608,7 +13934,7 @@
 </p:sld>
 </file>
 
-<file path=ppt/slides/slide36.xml><?xml version="1.0" encoding="utf-8"?>
+<file path=ppt/slides/slide38.xml><?xml version="1.0" encoding="utf-8"?>
 <p:sld xmlns:a="http://schemas.openxmlformats.org/drawingml/2006/main" xmlns:r="http://schemas.openxmlformats.org/officeDocument/2006/relationships" xmlns:p="http://schemas.openxmlformats.org/presentationml/2006/main">
   <p:cSld>
     <p:spTree>
@@ -14018,7 +14344,7 @@
 </p:sld>
 </file>
 
-<file path=ppt/slides/slide37.xml><?xml version="1.0" encoding="utf-8"?>
+<file path=ppt/slides/slide39.xml><?xml version="1.0" encoding="utf-8"?>
 <p:sld xmlns:a="http://schemas.openxmlformats.org/drawingml/2006/main" xmlns:r="http://schemas.openxmlformats.org/officeDocument/2006/relationships" xmlns:p="http://schemas.openxmlformats.org/presentationml/2006/main">
   <p:cSld>
     <p:spTree>
@@ -14106,7 +14432,213 @@
 </p:sld>
 </file>
 
-<file path=ppt/slides/slide38.xml><?xml version="1.0" encoding="utf-8"?>
+<file path=ppt/slides/slide4.xml><?xml version="1.0" encoding="utf-8"?>
+<p:sld xmlns:a="http://schemas.openxmlformats.org/drawingml/2006/main" xmlns:r="http://schemas.openxmlformats.org/officeDocument/2006/relationships" xmlns:p="http://schemas.openxmlformats.org/presentationml/2006/main">
+  <p:cSld>
+    <p:spTree>
+      <p:nvGrpSpPr>
+        <p:cNvPr id="1" name=""/>
+        <p:cNvGrpSpPr/>
+        <p:nvPr/>
+      </p:nvGrpSpPr>
+      <p:grpSpPr>
+        <a:xfrm>
+          <a:off x="0" y="0"/>
+          <a:ext cx="0" cy="0"/>
+          <a:chOff x="0" y="0"/>
+          <a:chExt cx="0" cy="0"/>
+        </a:xfrm>
+      </p:grpSpPr>
+      <p:pic>
+        <p:nvPicPr>
+          <p:cNvPr id="1026" name="Picture 2" descr="The Two Types of Application Software: General Purpose Applications and  Custom Software - TurboFuture">
+            <a:extLst>
+              <a:ext uri="{FF2B5EF4-FFF2-40B4-BE49-F238E27FC236}">
+                <a16:creationId xmlns:a16="http://schemas.microsoft.com/office/drawing/2014/main" id="{35B4E213-5AE6-5BDE-1396-0D6E0E28D24C}"/>
+              </a:ext>
+            </a:extLst>
+          </p:cNvPr>
+          <p:cNvPicPr>
+            <a:picLocks noChangeAspect="1" noChangeArrowheads="1"/>
+          </p:cNvPicPr>
+          <p:nvPr/>
+        </p:nvPicPr>
+        <p:blipFill>
+          <a:blip r:embed="rId2">
+            <a:extLst>
+              <a:ext uri="{28A0092B-C50C-407E-A947-70E740481C1C}">
+                <a14:useLocalDpi xmlns:a14="http://schemas.microsoft.com/office/drawing/2010/main" val="0"/>
+              </a:ext>
+            </a:extLst>
+          </a:blip>
+          <a:srcRect/>
+          <a:stretch>
+            <a:fillRect/>
+          </a:stretch>
+        </p:blipFill>
+        <p:spPr bwMode="auto">
+          <a:xfrm>
+            <a:off x="1176130" y="2422973"/>
+            <a:ext cx="3576983" cy="2012053"/>
+          </a:xfrm>
+          <a:prstGeom prst="rect">
+            <a:avLst/>
+          </a:prstGeom>
+          <a:noFill/>
+          <a:extLst>
+            <a:ext uri="{909E8E84-426E-40DD-AFC4-6F175D3DCCD1}">
+              <a14:hiddenFill xmlns:a14="http://schemas.microsoft.com/office/drawing/2010/main">
+                <a:solidFill>
+                  <a:srgbClr val="FFFFFF"/>
+                </a:solidFill>
+              </a14:hiddenFill>
+            </a:ext>
+          </a:extLst>
+        </p:spPr>
+      </p:pic>
+      <p:pic>
+        <p:nvPicPr>
+          <p:cNvPr id="1030" name="Picture 6" descr="Storage Solutions on Microsoft Azure | by AnisKHELOUFI | Analytics Vidhya |  Medium">
+            <a:extLst>
+              <a:ext uri="{FF2B5EF4-FFF2-40B4-BE49-F238E27FC236}">
+                <a16:creationId xmlns:a16="http://schemas.microsoft.com/office/drawing/2014/main" id="{4E99F73B-9894-2401-CF24-79CAB34653F6}"/>
+              </a:ext>
+            </a:extLst>
+          </p:cNvPr>
+          <p:cNvPicPr>
+            <a:picLocks noChangeAspect="1" noChangeArrowheads="1"/>
+          </p:cNvPicPr>
+          <p:nvPr/>
+        </p:nvPicPr>
+        <p:blipFill>
+          <a:blip r:embed="rId3">
+            <a:extLst>
+              <a:ext uri="{28A0092B-C50C-407E-A947-70E740481C1C}">
+                <a14:useLocalDpi xmlns:a14="http://schemas.microsoft.com/office/drawing/2010/main" val="0"/>
+              </a:ext>
+            </a:extLst>
+          </a:blip>
+          <a:srcRect/>
+          <a:stretch>
+            <a:fillRect/>
+          </a:stretch>
+        </p:blipFill>
+        <p:spPr bwMode="auto">
+          <a:xfrm>
+            <a:off x="6096000" y="2716764"/>
+            <a:ext cx="4737953" cy="1424470"/>
+          </a:xfrm>
+          <a:prstGeom prst="rect">
+            <a:avLst/>
+          </a:prstGeom>
+          <a:noFill/>
+          <a:extLst>
+            <a:ext uri="{909E8E84-426E-40DD-AFC4-6F175D3DCCD1}">
+              <a14:hiddenFill xmlns:a14="http://schemas.microsoft.com/office/drawing/2010/main">
+                <a:solidFill>
+                  <a:srgbClr val="FFFFFF"/>
+                </a:solidFill>
+              </a14:hiddenFill>
+            </a:ext>
+          </a:extLst>
+        </p:spPr>
+      </p:pic>
+      <p:sp>
+        <p:nvSpPr>
+          <p:cNvPr id="2" name="Arrow: Right 1">
+            <a:extLst>
+              <a:ext uri="{FF2B5EF4-FFF2-40B4-BE49-F238E27FC236}">
+                <a16:creationId xmlns:a16="http://schemas.microsoft.com/office/drawing/2014/main" id="{793588AD-1E41-081C-1983-AD173D4A0A45}"/>
+              </a:ext>
+            </a:extLst>
+          </p:cNvPr>
+          <p:cNvSpPr/>
+          <p:nvPr/>
+        </p:nvSpPr>
+        <p:spPr>
+          <a:xfrm>
+            <a:off x="5094813" y="3333250"/>
+            <a:ext cx="838772" cy="343759"/>
+          </a:xfrm>
+          <a:prstGeom prst="rightArrow">
+            <a:avLst/>
+          </a:prstGeom>
+          <a:solidFill>
+            <a:srgbClr val="FF0000"/>
+          </a:solidFill>
+          <a:ln>
+            <a:solidFill>
+              <a:srgbClr val="FF0000"/>
+            </a:solidFill>
+          </a:ln>
+        </p:spPr>
+        <p:style>
+          <a:lnRef idx="2">
+            <a:schemeClr val="accent1">
+              <a:shade val="50000"/>
+            </a:schemeClr>
+          </a:lnRef>
+          <a:fillRef idx="1">
+            <a:schemeClr val="accent1"/>
+          </a:fillRef>
+          <a:effectRef idx="0">
+            <a:schemeClr val="accent1"/>
+          </a:effectRef>
+          <a:fontRef idx="minor">
+            <a:schemeClr val="lt1"/>
+          </a:fontRef>
+        </p:style>
+        <p:txBody>
+          <a:bodyPr rtlCol="0" anchor="ctr"/>
+          <a:lstStyle/>
+          <a:p>
+            <a:pPr algn="ctr"/>
+            <a:endParaRPr lang="en-US"/>
+          </a:p>
+        </p:txBody>
+      </p:sp>
+      <p:sp>
+        <p:nvSpPr>
+          <p:cNvPr id="3" name="Title 2">
+            <a:extLst>
+              <a:ext uri="{FF2B5EF4-FFF2-40B4-BE49-F238E27FC236}">
+                <a16:creationId xmlns:a16="http://schemas.microsoft.com/office/drawing/2014/main" id="{A2FBCAF6-1D6B-F98D-62FF-A370F64D637F}"/>
+              </a:ext>
+            </a:extLst>
+          </p:cNvPr>
+          <p:cNvSpPr>
+            <a:spLocks noGrp="1"/>
+          </p:cNvSpPr>
+          <p:nvPr>
+            <p:ph type="title"/>
+          </p:nvPr>
+        </p:nvSpPr>
+        <p:spPr/>
+        <p:txBody>
+          <a:bodyPr/>
+          <a:lstStyle/>
+          <a:p>
+            <a:r>
+              <a:rPr lang="en-US" dirty="0"/>
+              <a:t>Data generated by applications have different formats</a:t>
+            </a:r>
+          </a:p>
+        </p:txBody>
+      </p:sp>
+    </p:spTree>
+    <p:extLst>
+      <p:ext uri="{BB962C8B-B14F-4D97-AF65-F5344CB8AC3E}">
+        <p14:creationId xmlns:p14="http://schemas.microsoft.com/office/powerpoint/2010/main" val="2055990861"/>
+      </p:ext>
+    </p:extLst>
+  </p:cSld>
+  <p:clrMapOvr>
+    <a:masterClrMapping/>
+  </p:clrMapOvr>
+</p:sld>
+</file>
+
+<file path=ppt/slides/slide40.xml><?xml version="1.0" encoding="utf-8"?>
 <p:sld xmlns:a="http://schemas.openxmlformats.org/drawingml/2006/main" xmlns:r="http://schemas.openxmlformats.org/officeDocument/2006/relationships" xmlns:p="http://schemas.openxmlformats.org/presentationml/2006/main">
   <p:cSld>
     <p:spTree>
@@ -14280,7 +14812,7 @@
 </p:sld>
 </file>
 
-<file path=ppt/slides/slide39.xml><?xml version="1.0" encoding="utf-8"?>
+<file path=ppt/slides/slide41.xml><?xml version="1.0" encoding="utf-8"?>
 <p:sld xmlns:a="http://schemas.openxmlformats.org/drawingml/2006/main" xmlns:r="http://schemas.openxmlformats.org/officeDocument/2006/relationships" xmlns:p="http://schemas.openxmlformats.org/presentationml/2006/main">
   <p:cSld>
     <p:spTree>
@@ -14356,91 +14888,7 @@
 </p:sld>
 </file>
 
-<file path=ppt/slides/slide4.xml><?xml version="1.0" encoding="utf-8"?>
-<p:sld xmlns:a="http://schemas.openxmlformats.org/drawingml/2006/main" xmlns:r="http://schemas.openxmlformats.org/officeDocument/2006/relationships" xmlns:p="http://schemas.openxmlformats.org/presentationml/2006/main">
-  <p:cSld>
-    <p:spTree>
-      <p:nvGrpSpPr>
-        <p:cNvPr id="1" name=""/>
-        <p:cNvGrpSpPr/>
-        <p:nvPr/>
-      </p:nvGrpSpPr>
-      <p:grpSpPr>
-        <a:xfrm>
-          <a:off x="0" y="0"/>
-          <a:ext cx="0" cy="0"/>
-          <a:chOff x="0" y="0"/>
-          <a:chExt cx="0" cy="0"/>
-        </a:xfrm>
-      </p:grpSpPr>
-      <p:sp>
-        <p:nvSpPr>
-          <p:cNvPr id="2" name="Title 1"/>
-          <p:cNvSpPr>
-            <a:spLocks noGrp="1"/>
-          </p:cNvSpPr>
-          <p:nvPr>
-            <p:ph type="title"/>
-          </p:nvPr>
-        </p:nvSpPr>
-        <p:spPr/>
-        <p:txBody>
-          <a:bodyPr/>
-          <a:lstStyle/>
-          <a:p>
-            <a:r>
-              <a:rPr lang="en-US" dirty="0">
-                <a:solidFill>
-                  <a:srgbClr val="FF0000"/>
-                </a:solidFill>
-              </a:rPr>
-              <a:t>13. </a:t>
-            </a:r>
-            <a:r>
-              <a:rPr lang="en-US" dirty="0"/>
-              <a:t>What web browsers were used?</a:t>
-            </a:r>
-          </a:p>
-        </p:txBody>
-      </p:sp>
-      <p:pic>
-        <p:nvPicPr>
-          <p:cNvPr id="4" name="Picture 3"/>
-          <p:cNvPicPr>
-            <a:picLocks noChangeAspect="1"/>
-          </p:cNvPicPr>
-          <p:nvPr/>
-        </p:nvPicPr>
-        <p:blipFill>
-          <a:blip r:embed="rId3"/>
-          <a:stretch>
-            <a:fillRect/>
-          </a:stretch>
-        </p:blipFill>
-        <p:spPr>
-          <a:xfrm>
-            <a:off x="838199" y="1555339"/>
-            <a:ext cx="10574295" cy="4855971"/>
-          </a:xfrm>
-          <a:prstGeom prst="rect">
-            <a:avLst/>
-          </a:prstGeom>
-        </p:spPr>
-      </p:pic>
-    </p:spTree>
-    <p:extLst>
-      <p:ext uri="{BB962C8B-B14F-4D97-AF65-F5344CB8AC3E}">
-        <p14:creationId xmlns:p14="http://schemas.microsoft.com/office/powerpoint/2010/main" val="3091480736"/>
-      </p:ext>
-    </p:extLst>
-  </p:cSld>
-  <p:clrMapOvr>
-    <a:masterClrMapping/>
-  </p:clrMapOvr>
-</p:sld>
-</file>
-
-<file path=ppt/slides/slide40.xml><?xml version="1.0" encoding="utf-8"?>
+<file path=ppt/slides/slide42.xml><?xml version="1.0" encoding="utf-8"?>
 <p:sld xmlns:a="http://schemas.openxmlformats.org/drawingml/2006/main" xmlns:r="http://schemas.openxmlformats.org/officeDocument/2006/relationships" xmlns:p="http://schemas.openxmlformats.org/presentationml/2006/main">
   <p:cSld>
     <p:spTree>
@@ -14569,7 +15017,7 @@
 </p:sld>
 </file>
 
-<file path=ppt/slides/slide41.xml><?xml version="1.0" encoding="utf-8"?>
+<file path=ppt/slides/slide43.xml><?xml version="1.0" encoding="utf-8"?>
 <p:sld xmlns:a="http://schemas.openxmlformats.org/drawingml/2006/main" xmlns:r="http://schemas.openxmlformats.org/officeDocument/2006/relationships" xmlns:p="http://schemas.openxmlformats.org/presentationml/2006/main">
   <p:cSld>
     <p:spTree>
@@ -14657,7 +15105,7 @@
 </p:sld>
 </file>
 
-<file path=ppt/slides/slide42.xml><?xml version="1.0" encoding="utf-8"?>
+<file path=ppt/slides/slide44.xml><?xml version="1.0" encoding="utf-8"?>
 <p:sld xmlns:a="http://schemas.openxmlformats.org/drawingml/2006/main" xmlns:r="http://schemas.openxmlformats.org/officeDocument/2006/relationships" xmlns:p="http://schemas.openxmlformats.org/presentationml/2006/main">
   <p:cSld>
     <p:spTree>
@@ -14868,7 +15316,7 @@
 </p:sld>
 </file>
 
-<file path=ppt/slides/slide43.xml><?xml version="1.0" encoding="utf-8"?>
+<file path=ppt/slides/slide45.xml><?xml version="1.0" encoding="utf-8"?>
 <p:sld xmlns:a="http://schemas.openxmlformats.org/drawingml/2006/main" xmlns:r="http://schemas.openxmlformats.org/officeDocument/2006/relationships" xmlns:p="http://schemas.openxmlformats.org/presentationml/2006/main">
   <p:cSld>
     <p:spTree>
@@ -15078,6 +15526,215 @@
 </file>
 
 <file path=ppt/slides/slide5.xml><?xml version="1.0" encoding="utf-8"?>
+<p:sld xmlns:a="http://schemas.openxmlformats.org/drawingml/2006/main" xmlns:r="http://schemas.openxmlformats.org/officeDocument/2006/relationships" xmlns:p="http://schemas.openxmlformats.org/presentationml/2006/main">
+  <p:cSld>
+    <p:spTree>
+      <p:nvGrpSpPr>
+        <p:cNvPr id="1" name=""/>
+        <p:cNvGrpSpPr/>
+        <p:nvPr/>
+      </p:nvGrpSpPr>
+      <p:grpSpPr>
+        <a:xfrm>
+          <a:off x="0" y="0"/>
+          <a:ext cx="0" cy="0"/>
+          <a:chOff x="0" y="0"/>
+          <a:chExt cx="0" cy="0"/>
+        </a:xfrm>
+      </p:grpSpPr>
+      <p:sp>
+        <p:nvSpPr>
+          <p:cNvPr id="2" name="Title 1">
+            <a:extLst>
+              <a:ext uri="{FF2B5EF4-FFF2-40B4-BE49-F238E27FC236}">
+                <a16:creationId xmlns:a16="http://schemas.microsoft.com/office/drawing/2014/main" id="{C990B706-7E51-C619-EDB7-465188F981AD}"/>
+              </a:ext>
+            </a:extLst>
+          </p:cNvPr>
+          <p:cNvSpPr>
+            <a:spLocks noGrp="1"/>
+          </p:cNvSpPr>
+          <p:nvPr>
+            <p:ph type="title"/>
+          </p:nvPr>
+        </p:nvSpPr>
+        <p:spPr/>
+        <p:txBody>
+          <a:bodyPr/>
+          <a:lstStyle/>
+          <a:p>
+            <a:r>
+              <a:rPr lang="en-US" dirty="0"/>
+              <a:t>Investigation Approach</a:t>
+            </a:r>
+          </a:p>
+        </p:txBody>
+      </p:sp>
+      <p:sp>
+        <p:nvSpPr>
+          <p:cNvPr id="3" name="Content Placeholder 2">
+            <a:extLst>
+              <a:ext uri="{FF2B5EF4-FFF2-40B4-BE49-F238E27FC236}">
+                <a16:creationId xmlns:a16="http://schemas.microsoft.com/office/drawing/2014/main" id="{FDE5C25D-0753-82FA-B101-7283CC9D92A5}"/>
+              </a:ext>
+            </a:extLst>
+          </p:cNvPr>
+          <p:cNvSpPr>
+            <a:spLocks noGrp="1"/>
+          </p:cNvSpPr>
+          <p:nvPr>
+            <p:ph idx="1"/>
+          </p:nvPr>
+        </p:nvSpPr>
+        <p:spPr/>
+        <p:txBody>
+          <a:bodyPr/>
+          <a:lstStyle/>
+          <a:p>
+            <a:r>
+              <a:rPr lang="en-US" dirty="0"/>
+              <a:t>Find all possible browsers used by suspects</a:t>
+            </a:r>
+          </a:p>
+          <a:p>
+            <a:r>
+              <a:rPr lang="en-US" dirty="0"/>
+              <a:t>Find browser history log files</a:t>
+            </a:r>
+          </a:p>
+          <a:p>
+            <a:r>
+              <a:rPr lang="en-US" dirty="0"/>
+              <a:t>Copy log files to a working directory</a:t>
+            </a:r>
+          </a:p>
+          <a:p>
+            <a:r>
+              <a:rPr lang="en-US" dirty="0"/>
+              <a:t>Find the format of the log files</a:t>
+            </a:r>
+          </a:p>
+          <a:p>
+            <a:r>
+              <a:rPr lang="en-US" dirty="0"/>
+              <a:t>Pick up the correct parsing tools to parse log files</a:t>
+            </a:r>
+          </a:p>
+          <a:p>
+            <a:r>
+              <a:rPr lang="en-US" dirty="0"/>
+              <a:t>Analyze log files</a:t>
+            </a:r>
+          </a:p>
+          <a:p>
+            <a:r>
+              <a:rPr lang="en-US" dirty="0"/>
+              <a:t>Make conclusions</a:t>
+            </a:r>
+          </a:p>
+          <a:p>
+            <a:endParaRPr lang="en-US" dirty="0"/>
+          </a:p>
+        </p:txBody>
+      </p:sp>
+    </p:spTree>
+    <p:extLst>
+      <p:ext uri="{BB962C8B-B14F-4D97-AF65-F5344CB8AC3E}">
+        <p14:creationId xmlns:p14="http://schemas.microsoft.com/office/powerpoint/2010/main" val="4165459125"/>
+      </p:ext>
+    </p:extLst>
+  </p:cSld>
+  <p:clrMapOvr>
+    <a:masterClrMapping/>
+  </p:clrMapOvr>
+</p:sld>
+</file>
+
+<file path=ppt/slides/slide6.xml><?xml version="1.0" encoding="utf-8"?>
+<p:sld xmlns:a="http://schemas.openxmlformats.org/drawingml/2006/main" xmlns:r="http://schemas.openxmlformats.org/officeDocument/2006/relationships" xmlns:p="http://schemas.openxmlformats.org/presentationml/2006/main">
+  <p:cSld>
+    <p:spTree>
+      <p:nvGrpSpPr>
+        <p:cNvPr id="1" name=""/>
+        <p:cNvGrpSpPr/>
+        <p:nvPr/>
+      </p:nvGrpSpPr>
+      <p:grpSpPr>
+        <a:xfrm>
+          <a:off x="0" y="0"/>
+          <a:ext cx="0" cy="0"/>
+          <a:chOff x="0" y="0"/>
+          <a:chExt cx="0" cy="0"/>
+        </a:xfrm>
+      </p:grpSpPr>
+      <p:sp>
+        <p:nvSpPr>
+          <p:cNvPr id="2" name="Title 1"/>
+          <p:cNvSpPr>
+            <a:spLocks noGrp="1"/>
+          </p:cNvSpPr>
+          <p:nvPr>
+            <p:ph type="title"/>
+          </p:nvPr>
+        </p:nvSpPr>
+        <p:spPr/>
+        <p:txBody>
+          <a:bodyPr/>
+          <a:lstStyle/>
+          <a:p>
+            <a:r>
+              <a:rPr lang="en-US" dirty="0">
+                <a:solidFill>
+                  <a:srgbClr val="FF0000"/>
+                </a:solidFill>
+              </a:rPr>
+              <a:t>13. </a:t>
+            </a:r>
+            <a:r>
+              <a:rPr lang="en-US" dirty="0"/>
+              <a:t>What web browsers were used?</a:t>
+            </a:r>
+          </a:p>
+        </p:txBody>
+      </p:sp>
+      <p:pic>
+        <p:nvPicPr>
+          <p:cNvPr id="4" name="Picture 3"/>
+          <p:cNvPicPr>
+            <a:picLocks noChangeAspect="1"/>
+          </p:cNvPicPr>
+          <p:nvPr/>
+        </p:nvPicPr>
+        <p:blipFill>
+          <a:blip r:embed="rId3"/>
+          <a:stretch>
+            <a:fillRect/>
+          </a:stretch>
+        </p:blipFill>
+        <p:spPr>
+          <a:xfrm>
+            <a:off x="838199" y="1555339"/>
+            <a:ext cx="10574295" cy="4855971"/>
+          </a:xfrm>
+          <a:prstGeom prst="rect">
+            <a:avLst/>
+          </a:prstGeom>
+        </p:spPr>
+      </p:pic>
+    </p:spTree>
+    <p:extLst>
+      <p:ext uri="{BB962C8B-B14F-4D97-AF65-F5344CB8AC3E}">
+        <p14:creationId xmlns:p14="http://schemas.microsoft.com/office/powerpoint/2010/main" val="3091480736"/>
+      </p:ext>
+    </p:extLst>
+  </p:cSld>
+  <p:clrMapOvr>
+    <a:masterClrMapping/>
+  </p:clrMapOvr>
+</p:sld>
+</file>
+
+<file path=ppt/slides/slide7.xml><?xml version="1.0" encoding="utf-8"?>
 <p:sld xmlns:a="http://schemas.openxmlformats.org/drawingml/2006/main" xmlns:r="http://schemas.openxmlformats.org/officeDocument/2006/relationships" xmlns:p="http://schemas.openxmlformats.org/presentationml/2006/main">
   <p:cSld>
     <p:spTree>
@@ -15233,7 +15890,7 @@
 </p:sld>
 </file>
 
-<file path=ppt/slides/slide6.xml><?xml version="1.0" encoding="utf-8"?>
+<file path=ppt/slides/slide8.xml><?xml version="1.0" encoding="utf-8"?>
 <p:sld xmlns:a="http://schemas.openxmlformats.org/drawingml/2006/main" xmlns:r="http://schemas.openxmlformats.org/officeDocument/2006/relationships" xmlns:p="http://schemas.openxmlformats.org/presentationml/2006/main">
   <p:cSld>
     <p:spTree>
@@ -15318,403 +15975,6 @@
 </p:sld>
 </file>
 
-<file path=ppt/slides/slide7.xml><?xml version="1.0" encoding="utf-8"?>
-<p:sld xmlns:a="http://schemas.openxmlformats.org/drawingml/2006/main" xmlns:r="http://schemas.openxmlformats.org/officeDocument/2006/relationships" xmlns:p="http://schemas.openxmlformats.org/presentationml/2006/main">
-  <p:cSld>
-    <p:spTree>
-      <p:nvGrpSpPr>
-        <p:cNvPr id="1" name=""/>
-        <p:cNvGrpSpPr/>
-        <p:nvPr/>
-      </p:nvGrpSpPr>
-      <p:grpSpPr>
-        <a:xfrm>
-          <a:off x="0" y="0"/>
-          <a:ext cx="0" cy="0"/>
-          <a:chOff x="0" y="0"/>
-          <a:chExt cx="0" cy="0"/>
-        </a:xfrm>
-      </p:grpSpPr>
-      <p:sp>
-        <p:nvSpPr>
-          <p:cNvPr id="2" name="Title 1"/>
-          <p:cNvSpPr>
-            <a:spLocks noGrp="1"/>
-          </p:cNvSpPr>
-          <p:nvPr>
-            <p:ph type="title"/>
-          </p:nvPr>
-        </p:nvSpPr>
-        <p:spPr/>
-        <p:txBody>
-          <a:bodyPr/>
-          <a:lstStyle/>
-          <a:p>
-            <a:r>
-              <a:rPr lang="en-US" dirty="0">
-                <a:solidFill>
-                  <a:srgbClr val="FF0000"/>
-                </a:solidFill>
-              </a:rPr>
-              <a:t>13.1</a:t>
-            </a:r>
-            <a:r>
-              <a:rPr lang="en-US" dirty="0"/>
-              <a:t> Can you find the version number?</a:t>
-            </a:r>
-          </a:p>
-        </p:txBody>
-      </p:sp>
-      <p:sp>
-        <p:nvSpPr>
-          <p:cNvPr id="3" name="Content Placeholder 2"/>
-          <p:cNvSpPr>
-            <a:spLocks noGrp="1"/>
-          </p:cNvSpPr>
-          <p:nvPr>
-            <p:ph idx="1"/>
-          </p:nvPr>
-        </p:nvSpPr>
-        <p:spPr>
-          <a:xfrm>
-            <a:off x="838200" y="1825625"/>
-            <a:ext cx="10515600" cy="2863606"/>
-          </a:xfrm>
-        </p:spPr>
-        <p:txBody>
-          <a:bodyPr>
-            <a:normAutofit/>
-          </a:bodyPr>
-          <a:lstStyle/>
-          <a:p>
-            <a:r>
-              <a:rPr lang="en-US" dirty="0"/>
-              <a:t>Locations to exam browsers’ version</a:t>
-            </a:r>
-          </a:p>
-          <a:p>
-            <a:pPr lvl="1"/>
-            <a:r>
-              <a:rPr lang="en-US" i="1" dirty="0">
-                <a:solidFill>
-                  <a:srgbClr val="007DB5"/>
-                </a:solidFill>
-              </a:rPr>
-              <a:t>HKLM\SOFTWARE\Microsoft\Internet Explorer (value: </a:t>
-            </a:r>
-            <a:r>
-              <a:rPr lang="en-US" i="1" dirty="0" err="1">
-                <a:solidFill>
-                  <a:srgbClr val="007DB5"/>
-                </a:solidFill>
-              </a:rPr>
-              <a:t>svcVersion</a:t>
-            </a:r>
-            <a:r>
-              <a:rPr lang="en-US" i="1" dirty="0">
-                <a:solidFill>
-                  <a:srgbClr val="007DB5"/>
-                </a:solidFill>
-              </a:rPr>
-              <a:t>)</a:t>
-            </a:r>
-          </a:p>
-          <a:p>
-            <a:pPr lvl="1"/>
-            <a:r>
-              <a:rPr lang="en-US" i="1" dirty="0">
-                <a:solidFill>
-                  <a:srgbClr val="007DB5"/>
-                </a:solidFill>
-              </a:rPr>
-              <a:t>HKU\informant\Software\Google\Chrome\</a:t>
-            </a:r>
-            <a:r>
-              <a:rPr lang="en-US" i="1" dirty="0" err="1">
-                <a:solidFill>
-                  <a:srgbClr val="007DB5"/>
-                </a:solidFill>
-              </a:rPr>
-              <a:t>BLBeacon</a:t>
-            </a:r>
-            <a:r>
-              <a:rPr lang="en-US" i="1" dirty="0">
-                <a:solidFill>
-                  <a:srgbClr val="007DB5"/>
-                </a:solidFill>
-              </a:rPr>
-              <a:t> (value: version)</a:t>
-            </a:r>
-          </a:p>
-          <a:p>
-            <a:r>
-              <a:rPr lang="en-US" dirty="0"/>
-              <a:t>Use Windows Registry hive shell (</a:t>
-            </a:r>
-            <a:r>
-              <a:rPr lang="en-US" i="1" dirty="0" err="1">
-                <a:solidFill>
-                  <a:srgbClr val="007DB5"/>
-                </a:solidFill>
-              </a:rPr>
-              <a:t>hivexsh</a:t>
-            </a:r>
-            <a:r>
-              <a:rPr lang="en-US" dirty="0"/>
-              <a:t>) </a:t>
-            </a:r>
-          </a:p>
-          <a:p>
-            <a:pPr lvl="1"/>
-            <a:r>
-              <a:rPr lang="en-US" dirty="0"/>
-              <a:t>It provides a simple shell for navigating Windows Registry 'hive' files.</a:t>
-            </a:r>
-          </a:p>
-        </p:txBody>
-      </p:sp>
-    </p:spTree>
-    <p:extLst>
-      <p:ext uri="{BB962C8B-B14F-4D97-AF65-F5344CB8AC3E}">
-        <p14:creationId xmlns:p14="http://schemas.microsoft.com/office/powerpoint/2010/main" val="3910298338"/>
-      </p:ext>
-    </p:extLst>
-  </p:cSld>
-  <p:clrMapOvr>
-    <a:masterClrMapping/>
-  </p:clrMapOvr>
-</p:sld>
-</file>
-
-<file path=ppt/slides/slide8.xml><?xml version="1.0" encoding="utf-8"?>
-<p:sld xmlns:a="http://schemas.openxmlformats.org/drawingml/2006/main" xmlns:r="http://schemas.openxmlformats.org/officeDocument/2006/relationships" xmlns:p="http://schemas.openxmlformats.org/presentationml/2006/main">
-  <p:cSld>
-    <p:spTree>
-      <p:nvGrpSpPr>
-        <p:cNvPr id="1" name=""/>
-        <p:cNvGrpSpPr/>
-        <p:nvPr/>
-      </p:nvGrpSpPr>
-      <p:grpSpPr>
-        <a:xfrm>
-          <a:off x="0" y="0"/>
-          <a:ext cx="0" cy="0"/>
-          <a:chOff x="0" y="0"/>
-          <a:chExt cx="0" cy="0"/>
-        </a:xfrm>
-      </p:grpSpPr>
-      <p:pic>
-        <p:nvPicPr>
-          <p:cNvPr id="4" name="Picture 3"/>
-          <p:cNvPicPr>
-            <a:picLocks noChangeAspect="1"/>
-          </p:cNvPicPr>
-          <p:nvPr/>
-        </p:nvPicPr>
-        <p:blipFill>
-          <a:blip r:embed="rId3"/>
-          <a:stretch>
-            <a:fillRect/>
-          </a:stretch>
-        </p:blipFill>
-        <p:spPr>
-          <a:xfrm>
-            <a:off x="3591719" y="3530456"/>
-            <a:ext cx="3563713" cy="762988"/>
-          </a:xfrm>
-          <a:prstGeom prst="rect">
-            <a:avLst/>
-          </a:prstGeom>
-        </p:spPr>
-      </p:pic>
-      <p:pic>
-        <p:nvPicPr>
-          <p:cNvPr id="5" name="Picture 4"/>
-          <p:cNvPicPr>
-            <a:picLocks noChangeAspect="1"/>
-          </p:cNvPicPr>
-          <p:nvPr/>
-        </p:nvPicPr>
-        <p:blipFill>
-          <a:blip r:embed="rId4"/>
-          <a:stretch>
-            <a:fillRect/>
-          </a:stretch>
-        </p:blipFill>
-        <p:spPr>
-          <a:xfrm>
-            <a:off x="3607101" y="4395981"/>
-            <a:ext cx="6238503" cy="1744805"/>
-          </a:xfrm>
-          <a:prstGeom prst="rect">
-            <a:avLst/>
-          </a:prstGeom>
-        </p:spPr>
-      </p:pic>
-      <p:pic>
-        <p:nvPicPr>
-          <p:cNvPr id="6" name="Picture 5"/>
-          <p:cNvPicPr>
-            <a:picLocks noChangeAspect="1"/>
-          </p:cNvPicPr>
-          <p:nvPr/>
-        </p:nvPicPr>
-        <p:blipFill>
-          <a:blip r:embed="rId5"/>
-          <a:stretch>
-            <a:fillRect/>
-          </a:stretch>
-        </p:blipFill>
-        <p:spPr>
-          <a:xfrm>
-            <a:off x="3607101" y="1876897"/>
-            <a:ext cx="5902911" cy="1468529"/>
-          </a:xfrm>
-          <a:prstGeom prst="rect">
-            <a:avLst/>
-          </a:prstGeom>
-        </p:spPr>
-      </p:pic>
-      <p:sp>
-        <p:nvSpPr>
-          <p:cNvPr id="7" name="TextBox 6"/>
-          <p:cNvSpPr txBox="1"/>
-          <p:nvPr/>
-        </p:nvSpPr>
-        <p:spPr>
-          <a:xfrm>
-            <a:off x="896816" y="1875718"/>
-            <a:ext cx="2710285" cy="369332"/>
-          </a:xfrm>
-          <a:prstGeom prst="rect">
-            <a:avLst/>
-          </a:prstGeom>
-          <a:solidFill>
-            <a:srgbClr val="FFC000"/>
-          </a:solidFill>
-        </p:spPr>
-        <p:txBody>
-          <a:bodyPr wrap="square" rtlCol="0">
-            <a:spAutoFit/>
-          </a:bodyPr>
-          <a:lstStyle/>
-          <a:p>
-            <a:r>
-              <a:rPr lang="en-US" dirty="0"/>
-              <a:t>Install </a:t>
-            </a:r>
-            <a:r>
-              <a:rPr lang="en-US" i="1" dirty="0" err="1">
-                <a:solidFill>
-                  <a:srgbClr val="007DB5"/>
-                </a:solidFill>
-              </a:rPr>
-              <a:t>hivexsh</a:t>
-            </a:r>
-            <a:endParaRPr lang="en-US" i="1" dirty="0">
-              <a:solidFill>
-                <a:srgbClr val="007DB5"/>
-              </a:solidFill>
-            </a:endParaRPr>
-          </a:p>
-        </p:txBody>
-      </p:sp>
-      <p:sp>
-        <p:nvSpPr>
-          <p:cNvPr id="2" name="Title 1"/>
-          <p:cNvSpPr>
-            <a:spLocks noGrp="1"/>
-          </p:cNvSpPr>
-          <p:nvPr>
-            <p:ph type="title"/>
-          </p:nvPr>
-        </p:nvSpPr>
-        <p:spPr/>
-        <p:txBody>
-          <a:bodyPr/>
-          <a:lstStyle/>
-          <a:p>
-            <a:r>
-              <a:rPr lang="en-US" dirty="0"/>
-              <a:t>Install </a:t>
-            </a:r>
-            <a:r>
-              <a:rPr lang="en-US" i="1" dirty="0" err="1">
-                <a:solidFill>
-                  <a:srgbClr val="FF0000"/>
-                </a:solidFill>
-              </a:rPr>
-              <a:t>hivexsh</a:t>
-            </a:r>
-            <a:endParaRPr lang="en-US" i="1" dirty="0">
-              <a:solidFill>
-                <a:srgbClr val="FF0000"/>
-              </a:solidFill>
-            </a:endParaRPr>
-          </a:p>
-        </p:txBody>
-      </p:sp>
-      <p:sp>
-        <p:nvSpPr>
-          <p:cNvPr id="8" name="TextBox 7"/>
-          <p:cNvSpPr txBox="1"/>
-          <p:nvPr/>
-        </p:nvSpPr>
-        <p:spPr>
-          <a:xfrm>
-            <a:off x="881434" y="3542618"/>
-            <a:ext cx="2710285" cy="369332"/>
-          </a:xfrm>
-          <a:prstGeom prst="rect">
-            <a:avLst/>
-          </a:prstGeom>
-          <a:solidFill>
-            <a:srgbClr val="FFC000"/>
-          </a:solidFill>
-        </p:spPr>
-        <p:txBody>
-          <a:bodyPr wrap="square" rtlCol="0">
-            <a:spAutoFit/>
-          </a:bodyPr>
-          <a:lstStyle/>
-          <a:p>
-            <a:r>
-              <a:rPr lang="en-US" dirty="0"/>
-              <a:t>Show </a:t>
-            </a:r>
-            <a:r>
-              <a:rPr lang="en-US" i="1" dirty="0" err="1">
-                <a:solidFill>
-                  <a:srgbClr val="007DB5"/>
-                </a:solidFill>
-              </a:rPr>
-              <a:t>hivexsh</a:t>
-            </a:r>
-            <a:r>
-              <a:rPr lang="en-US" dirty="0"/>
-              <a:t> manual</a:t>
-            </a:r>
-            <a:endParaRPr lang="en-US" i="1" dirty="0">
-              <a:solidFill>
-                <a:srgbClr val="007DB5"/>
-              </a:solidFill>
-            </a:endParaRPr>
-          </a:p>
-        </p:txBody>
-      </p:sp>
-    </p:spTree>
-    <p:extLst>
-      <p:ext uri="{BB962C8B-B14F-4D97-AF65-F5344CB8AC3E}">
-        <p14:creationId xmlns:p14="http://schemas.microsoft.com/office/powerpoint/2010/main" val="929697321"/>
-      </p:ext>
-    </p:extLst>
-  </p:cSld>
-  <p:clrMapOvr>
-    <a:masterClrMapping/>
-  </p:clrMapOvr>
-</p:sld>
-</file>
-
 <file path=ppt/slides/slide9.xml><?xml version="1.0" encoding="utf-8"?>
 <p:sld xmlns:a="http://schemas.openxmlformats.org/drawingml/2006/main" xmlns:r="http://schemas.openxmlformats.org/officeDocument/2006/relationships" xmlns:p="http://schemas.openxmlformats.org/presentationml/2006/main">
   <p:cSld>
@@ -15732,57 +15992,121 @@
           <a:chExt cx="0" cy="0"/>
         </a:xfrm>
       </p:grpSpPr>
-      <p:pic>
-        <p:nvPicPr>
-          <p:cNvPr id="2" name="Picture 1"/>
-          <p:cNvPicPr>
-            <a:picLocks noChangeAspect="1"/>
-          </p:cNvPicPr>
-          <p:nvPr/>
-        </p:nvPicPr>
-        <p:blipFill>
-          <a:blip r:embed="rId3"/>
-          <a:stretch>
-            <a:fillRect/>
-          </a:stretch>
-        </p:blipFill>
+      <p:sp>
+        <p:nvSpPr>
+          <p:cNvPr id="2" name="Title 1"/>
+          <p:cNvSpPr>
+            <a:spLocks noGrp="1"/>
+          </p:cNvSpPr>
+          <p:nvPr>
+            <p:ph type="title"/>
+          </p:nvPr>
+        </p:nvSpPr>
+        <p:spPr/>
+        <p:txBody>
+          <a:bodyPr/>
+          <a:lstStyle/>
+          <a:p>
+            <a:r>
+              <a:rPr lang="en-US" dirty="0">
+                <a:solidFill>
+                  <a:srgbClr val="FF0000"/>
+                </a:solidFill>
+              </a:rPr>
+              <a:t>13.1</a:t>
+            </a:r>
+            <a:r>
+              <a:rPr lang="en-US" dirty="0"/>
+              <a:t> Can you find the version number?</a:t>
+            </a:r>
+          </a:p>
+        </p:txBody>
+      </p:sp>
+      <p:sp>
+        <p:nvSpPr>
+          <p:cNvPr id="3" name="Content Placeholder 2"/>
+          <p:cNvSpPr>
+            <a:spLocks noGrp="1"/>
+          </p:cNvSpPr>
+          <p:nvPr>
+            <p:ph idx="1"/>
+          </p:nvPr>
+        </p:nvSpPr>
         <p:spPr>
           <a:xfrm>
-            <a:off x="1361882" y="967040"/>
-            <a:ext cx="7321618" cy="3469507"/>
+            <a:off x="838200" y="1825625"/>
+            <a:ext cx="10515600" cy="2863606"/>
           </a:xfrm>
-          <a:prstGeom prst="rect">
-            <a:avLst/>
-          </a:prstGeom>
         </p:spPr>
-      </p:pic>
-      <p:sp>
-        <p:nvSpPr>
-          <p:cNvPr id="3" name="TextBox 2"/>
-          <p:cNvSpPr txBox="1"/>
-          <p:nvPr/>
-        </p:nvSpPr>
-        <p:spPr>
-          <a:xfrm>
-            <a:off x="1361882" y="597708"/>
-            <a:ext cx="4304272" cy="369332"/>
-          </a:xfrm>
-          <a:prstGeom prst="rect">
-            <a:avLst/>
-          </a:prstGeom>
-          <a:solidFill>
-            <a:srgbClr val="FFC000"/>
-          </a:solidFill>
-        </p:spPr>
-        <p:txBody>
-          <a:bodyPr wrap="square" rtlCol="0">
-            <a:spAutoFit/>
+        <p:txBody>
+          <a:bodyPr>
+            <a:normAutofit/>
           </a:bodyPr>
           <a:lstStyle/>
           <a:p>
             <a:r>
               <a:rPr lang="en-US" dirty="0"/>
-              <a:t>Exam the version of IE using </a:t>
+              <a:t>Locations to exam browsers’ version</a:t>
+            </a:r>
+          </a:p>
+          <a:p>
+            <a:pPr lvl="1"/>
+            <a:r>
+              <a:rPr lang="en-US" i="1" dirty="0">
+                <a:solidFill>
+                  <a:srgbClr val="007DB5"/>
+                </a:solidFill>
+              </a:rPr>
+              <a:t>HKLM\SOFTWARE\Microsoft\Internet Explorer (value: </a:t>
+            </a:r>
+            <a:r>
+              <a:rPr lang="en-US" i="1" dirty="0" err="1">
+                <a:solidFill>
+                  <a:srgbClr val="007DB5"/>
+                </a:solidFill>
+              </a:rPr>
+              <a:t>svcVersion</a:t>
+            </a:r>
+            <a:r>
+              <a:rPr lang="en-US" i="1" dirty="0">
+                <a:solidFill>
+                  <a:srgbClr val="007DB5"/>
+                </a:solidFill>
+              </a:rPr>
+              <a:t>)</a:t>
+            </a:r>
+          </a:p>
+          <a:p>
+            <a:pPr lvl="1"/>
+            <a:r>
+              <a:rPr lang="en-US" i="1" dirty="0">
+                <a:solidFill>
+                  <a:srgbClr val="007DB5"/>
+                </a:solidFill>
+              </a:rPr>
+              <a:t>HKU\informant\Software\Google\Chrome\</a:t>
+            </a:r>
+            <a:r>
+              <a:rPr lang="en-US" i="1" dirty="0" err="1">
+                <a:solidFill>
+                  <a:srgbClr val="007DB5"/>
+                </a:solidFill>
+              </a:rPr>
+              <a:t>BLBeacon</a:t>
+            </a:r>
+            <a:r>
+              <a:rPr lang="en-US" i="1" dirty="0">
+                <a:solidFill>
+                  <a:srgbClr val="007DB5"/>
+                </a:solidFill>
+              </a:rPr>
+              <a:t> (value: version)</a:t>
+            </a:r>
+          </a:p>
+          <a:p>
+            <a:r>
+              <a:rPr lang="en-US" dirty="0"/>
+              <a:t>Use Windows Registry hive shell (</a:t>
             </a:r>
             <a:r>
               <a:rPr lang="en-US" i="1" dirty="0" err="1">
@@ -15792,73 +16116,16 @@
               </a:rPr>
               <a:t>hivexsh</a:t>
             </a:r>
-            <a:endParaRPr lang="en-US" i="1" dirty="0">
-              <a:solidFill>
-                <a:srgbClr val="007DB5"/>
-              </a:solidFill>
-            </a:endParaRPr>
-          </a:p>
-        </p:txBody>
-      </p:sp>
-      <p:sp>
-        <p:nvSpPr>
-          <p:cNvPr id="4" name="TextBox 3"/>
-          <p:cNvSpPr txBox="1"/>
-          <p:nvPr/>
-        </p:nvSpPr>
-        <p:spPr>
-          <a:xfrm>
-            <a:off x="1361882" y="4805879"/>
-            <a:ext cx="6508210" cy="369332"/>
-          </a:xfrm>
-          <a:prstGeom prst="rect">
-            <a:avLst/>
-          </a:prstGeom>
-          <a:solidFill>
-            <a:srgbClr val="FFC000"/>
-          </a:solidFill>
-        </p:spPr>
-        <p:txBody>
-          <a:bodyPr wrap="square" rtlCol="0">
-            <a:spAutoFit/>
-          </a:bodyPr>
-          <a:lstStyle/>
-          <a:p>
-            <a:r>
-              <a:rPr lang="en-US" dirty="0"/>
-              <a:t>How to exam the version of </a:t>
-            </a:r>
-            <a:r>
-              <a:rPr lang="en-US" i="1" dirty="0">
-                <a:solidFill>
-                  <a:srgbClr val="007DB5"/>
-                </a:solidFill>
-              </a:rPr>
-              <a:t>Chrome</a:t>
-            </a:r>
-            <a:r>
-              <a:rPr lang="en-US" dirty="0"/>
-              <a:t> using </a:t>
-            </a:r>
-            <a:r>
-              <a:rPr lang="en-US" i="1" dirty="0" err="1">
-                <a:solidFill>
-                  <a:srgbClr val="007DB5"/>
-                </a:solidFill>
-              </a:rPr>
-              <a:t>hivexsh</a:t>
-            </a:r>
-            <a:r>
-              <a:rPr lang="en-US" i="1" dirty="0">
-                <a:solidFill>
-                  <a:srgbClr val="007DB5"/>
-                </a:solidFill>
-              </a:rPr>
-              <a:t> </a:t>
-            </a:r>
-            <a:r>
-              <a:rPr lang="en-US" dirty="0"/>
-              <a:t>?</a:t>
+            <a:r>
+              <a:rPr lang="en-US" dirty="0"/>
+              <a:t>) </a:t>
+            </a:r>
+          </a:p>
+          <a:p>
+            <a:pPr lvl="1"/>
+            <a:r>
+              <a:rPr lang="en-US" dirty="0"/>
+              <a:t>It provides a simple shell for navigating Windows Registry 'hive' files.</a:t>
             </a:r>
           </a:p>
         </p:txBody>
@@ -15866,7 +16133,7 @@
     </p:spTree>
     <p:extLst>
       <p:ext uri="{BB962C8B-B14F-4D97-AF65-F5344CB8AC3E}">
-        <p14:creationId xmlns:p14="http://schemas.microsoft.com/office/powerpoint/2010/main" val="3748405130"/>
+        <p14:creationId xmlns:p14="http://schemas.microsoft.com/office/powerpoint/2010/main" val="3910298338"/>
       </p:ext>
     </p:extLst>
   </p:cSld>

</xml_diff>

<commit_message>
upload browser history for nist_data_leakage_03_WebHistory
</commit_message>
<xml_diff>
--- a/NIST_Data_Leakage_Case/NIST_Data_Leakage_03_WebHistory_SQL.pptx
+++ b/NIST_Data_Leakage_Case/NIST_Data_Leakage_03_WebHistory_SQL.pptx
@@ -162,7 +162,7 @@
 <file path=ppt/revisionInfo.xml><?xml version="1.0" encoding="utf-8"?>
 <p1510:revInfo xmlns:a="http://schemas.openxmlformats.org/drawingml/2006/main" xmlns:r="http://schemas.openxmlformats.org/officeDocument/2006/relationships" xmlns:p1510="http://schemas.microsoft.com/office/powerpoint/2015/10/main">
   <p1510:revLst>
-    <p1510:client id="{409D07DA-7E5C-4EF5-A9AF-5A4926BCA666}" v="40" dt="2022-09-27T21:28:04"/>
+    <p1510:client id="{409D07DA-7E5C-4EF5-A9AF-5A4926BCA666}" v="50" dt="2023-09-29T12:29:37.752"/>
   </p1510:revLst>
 </p1510:revInfo>
 </file>
@@ -212,7 +212,7 @@
   <pc:docChgLst>
     <pc:chgData name="Weifeng Xu" userId="e7aed605-a3dd-4d5a-a692-a87037af107b" providerId="ADAL" clId="{409D07DA-7E5C-4EF5-A9AF-5A4926BCA666}"/>
     <pc:docChg chg="undo custSel addSld delSld modSld sldOrd">
-      <pc:chgData name="Weifeng Xu" userId="e7aed605-a3dd-4d5a-a692-a87037af107b" providerId="ADAL" clId="{409D07DA-7E5C-4EF5-A9AF-5A4926BCA666}" dt="2023-02-28T15:25:30.597" v="1644" actId="6549"/>
+      <pc:chgData name="Weifeng Xu" userId="e7aed605-a3dd-4d5a-a692-a87037af107b" providerId="ADAL" clId="{409D07DA-7E5C-4EF5-A9AF-5A4926BCA666}" dt="2023-09-29T15:32:23.960" v="1962" actId="6549"/>
       <pc:docMkLst>
         <pc:docMk/>
       </pc:docMkLst>
@@ -285,7 +285,7 @@
         </pc:picChg>
       </pc:sldChg>
       <pc:sldChg chg="addSp modSp new mod modClrScheme chgLayout modNotesTx">
-        <pc:chgData name="Weifeng Xu" userId="e7aed605-a3dd-4d5a-a692-a87037af107b" providerId="ADAL" clId="{409D07DA-7E5C-4EF5-A9AF-5A4926BCA666}" dt="2023-02-28T15:05:31.701" v="1005" actId="20577"/>
+        <pc:chgData name="Weifeng Xu" userId="e7aed605-a3dd-4d5a-a692-a87037af107b" providerId="ADAL" clId="{409D07DA-7E5C-4EF5-A9AF-5A4926BCA666}" dt="2023-09-27T20:57:48.018" v="1663" actId="20577"/>
         <pc:sldMkLst>
           <pc:docMk/>
           <pc:sldMk cId="2904199124" sldId="301"/>
@@ -299,7 +299,7 @@
           </ac:spMkLst>
         </pc:spChg>
         <pc:spChg chg="add mod">
-          <ac:chgData name="Weifeng Xu" userId="e7aed605-a3dd-4d5a-a692-a87037af107b" providerId="ADAL" clId="{409D07DA-7E5C-4EF5-A9AF-5A4926BCA666}" dt="2023-02-28T15:05:31.701" v="1005" actId="20577"/>
+          <ac:chgData name="Weifeng Xu" userId="e7aed605-a3dd-4d5a-a692-a87037af107b" providerId="ADAL" clId="{409D07DA-7E5C-4EF5-A9AF-5A4926BCA666}" dt="2023-09-27T20:57:48.018" v="1663" actId="20577"/>
           <ac:spMkLst>
             <pc:docMk/>
             <pc:sldMk cId="2904199124" sldId="301"/>
@@ -393,7 +393,7 @@
         </pc:spChg>
       </pc:sldChg>
       <pc:sldChg chg="addSp delSp modSp add mod setBg modClrScheme chgLayout">
-        <pc:chgData name="Weifeng Xu" userId="e7aed605-a3dd-4d5a-a692-a87037af107b" providerId="ADAL" clId="{409D07DA-7E5C-4EF5-A9AF-5A4926BCA666}" dt="2022-09-27T21:19:57.149" v="753" actId="1076"/>
+        <pc:chgData name="Weifeng Xu" userId="e7aed605-a3dd-4d5a-a692-a87037af107b" providerId="ADAL" clId="{409D07DA-7E5C-4EF5-A9AF-5A4926BCA666}" dt="2023-09-29T15:27:12.910" v="1869" actId="14100"/>
         <pc:sldMkLst>
           <pc:docMk/>
           <pc:sldMk cId="4010385979" sldId="304"/>
@@ -415,7 +415,7 @@
           </ac:spMkLst>
         </pc:spChg>
         <pc:spChg chg="mod">
-          <ac:chgData name="Weifeng Xu" userId="e7aed605-a3dd-4d5a-a692-a87037af107b" providerId="ADAL" clId="{409D07DA-7E5C-4EF5-A9AF-5A4926BCA666}" dt="2022-09-27T21:19:37.724" v="749" actId="1076"/>
+          <ac:chgData name="Weifeng Xu" userId="e7aed605-a3dd-4d5a-a692-a87037af107b" providerId="ADAL" clId="{409D07DA-7E5C-4EF5-A9AF-5A4926BCA666}" dt="2023-09-29T15:26:47.601" v="1867" actId="14100"/>
           <ac:spMkLst>
             <pc:docMk/>
             <pc:sldMk cId="4010385979" sldId="304"/>
@@ -430,6 +430,14 @@
             <ac:spMk id="5" creationId="{F41488E2-6CC7-AC84-80C7-6DE74C734264}"/>
           </ac:spMkLst>
         </pc:spChg>
+        <pc:spChg chg="mod">
+          <ac:chgData name="Weifeng Xu" userId="e7aed605-a3dd-4d5a-a692-a87037af107b" providerId="ADAL" clId="{409D07DA-7E5C-4EF5-A9AF-5A4926BCA666}" dt="2023-09-29T15:27:12.910" v="1869" actId="14100"/>
+          <ac:spMkLst>
+            <pc:docMk/>
+            <pc:sldMk cId="4010385979" sldId="304"/>
+            <ac:spMk id="6" creationId="{DBB35AD8-5C2E-43B0-9DEE-1602D90C480F}"/>
+          </ac:spMkLst>
+        </pc:spChg>
         <pc:picChg chg="mod">
           <ac:chgData name="Weifeng Xu" userId="e7aed605-a3dd-4d5a-a692-a87037af107b" providerId="ADAL" clId="{409D07DA-7E5C-4EF5-A9AF-5A4926BCA666}" dt="2022-09-27T21:19:37.724" v="749" actId="1076"/>
           <ac:picMkLst>
@@ -440,13 +448,13 @@
         </pc:picChg>
       </pc:sldChg>
       <pc:sldChg chg="addSp delSp modSp new mod modClrScheme chgLayout">
-        <pc:chgData name="Weifeng Xu" userId="e7aed605-a3dd-4d5a-a692-a87037af107b" providerId="ADAL" clId="{409D07DA-7E5C-4EF5-A9AF-5A4926BCA666}" dt="2023-02-27T14:13:22.234" v="936" actId="20577"/>
+        <pc:chgData name="Weifeng Xu" userId="e7aed605-a3dd-4d5a-a692-a87037af107b" providerId="ADAL" clId="{409D07DA-7E5C-4EF5-A9AF-5A4926BCA666}" dt="2023-09-29T15:28:36.773" v="1922" actId="20577"/>
         <pc:sldMkLst>
           <pc:docMk/>
           <pc:sldMk cId="2055990861" sldId="305"/>
         </pc:sldMkLst>
         <pc:spChg chg="add mod">
-          <ac:chgData name="Weifeng Xu" userId="e7aed605-a3dd-4d5a-a692-a87037af107b" providerId="ADAL" clId="{409D07DA-7E5C-4EF5-A9AF-5A4926BCA666}" dt="2022-09-27T21:28:02.821" v="783" actId="1076"/>
+          <ac:chgData name="Weifeng Xu" userId="e7aed605-a3dd-4d5a-a692-a87037af107b" providerId="ADAL" clId="{409D07DA-7E5C-4EF5-A9AF-5A4926BCA666}" dt="2023-09-29T12:22:58.723" v="1667" actId="1076"/>
           <ac:spMkLst>
             <pc:docMk/>
             <pc:sldMk cId="2055990861" sldId="305"/>
@@ -454,15 +462,39 @@
           </ac:spMkLst>
         </pc:spChg>
         <pc:spChg chg="add mod ord">
-          <ac:chgData name="Weifeng Xu" userId="e7aed605-a3dd-4d5a-a692-a87037af107b" providerId="ADAL" clId="{409D07DA-7E5C-4EF5-A9AF-5A4926BCA666}" dt="2023-02-27T14:13:22.234" v="936" actId="20577"/>
+          <ac:chgData name="Weifeng Xu" userId="e7aed605-a3dd-4d5a-a692-a87037af107b" providerId="ADAL" clId="{409D07DA-7E5C-4EF5-A9AF-5A4926BCA666}" dt="2023-09-29T15:28:36.773" v="1922" actId="20577"/>
           <ac:spMkLst>
             <pc:docMk/>
             <pc:sldMk cId="2055990861" sldId="305"/>
             <ac:spMk id="3" creationId="{A2FBCAF6-1D6B-F98D-62FF-A370F64D637F}"/>
           </ac:spMkLst>
         </pc:spChg>
+        <pc:spChg chg="add mod">
+          <ac:chgData name="Weifeng Xu" userId="e7aed605-a3dd-4d5a-a692-a87037af107b" providerId="ADAL" clId="{409D07DA-7E5C-4EF5-A9AF-5A4926BCA666}" dt="2023-09-29T12:23:29.728" v="1676" actId="404"/>
+          <ac:spMkLst>
+            <pc:docMk/>
+            <pc:sldMk cId="2055990861" sldId="305"/>
+            <ac:spMk id="5" creationId="{EEEEBAA8-D425-ADA9-D1DB-CCFB2B164B15}"/>
+          </ac:spMkLst>
+        </pc:spChg>
+        <pc:spChg chg="add mod">
+          <ac:chgData name="Weifeng Xu" userId="e7aed605-a3dd-4d5a-a692-a87037af107b" providerId="ADAL" clId="{409D07DA-7E5C-4EF5-A9AF-5A4926BCA666}" dt="2023-09-29T12:23:50.866" v="1682" actId="1076"/>
+          <ac:spMkLst>
+            <pc:docMk/>
+            <pc:sldMk cId="2055990861" sldId="305"/>
+            <ac:spMk id="6" creationId="{3EB645F8-65F9-B1F6-17AB-409CBE99BDD1}"/>
+          </ac:spMkLst>
+        </pc:spChg>
         <pc:picChg chg="add mod">
-          <ac:chgData name="Weifeng Xu" userId="e7aed605-a3dd-4d5a-a692-a87037af107b" providerId="ADAL" clId="{409D07DA-7E5C-4EF5-A9AF-5A4926BCA666}" dt="2022-09-27T21:27:53.570" v="780" actId="1076"/>
+          <ac:chgData name="Weifeng Xu" userId="e7aed605-a3dd-4d5a-a692-a87037af107b" providerId="ADAL" clId="{409D07DA-7E5C-4EF5-A9AF-5A4926BCA666}" dt="2023-09-29T12:24:23.336" v="1685" actId="1076"/>
+          <ac:picMkLst>
+            <pc:docMk/>
+            <pc:sldMk cId="2055990861" sldId="305"/>
+            <ac:picMk id="4" creationId="{25ABF1CC-FE20-A77D-EB47-33FDBEC4BAD0}"/>
+          </ac:picMkLst>
+        </pc:picChg>
+        <pc:picChg chg="add mod">
+          <ac:chgData name="Weifeng Xu" userId="e7aed605-a3dd-4d5a-a692-a87037af107b" providerId="ADAL" clId="{409D07DA-7E5C-4EF5-A9AF-5A4926BCA666}" dt="2023-09-29T12:22:58.723" v="1667" actId="1076"/>
           <ac:picMkLst>
             <pc:docMk/>
             <pc:sldMk cId="2055990861" sldId="305"/>
@@ -478,7 +510,7 @@
           </ac:picMkLst>
         </pc:picChg>
         <pc:picChg chg="add del mod">
-          <ac:chgData name="Weifeng Xu" userId="e7aed605-a3dd-4d5a-a692-a87037af107b" providerId="ADAL" clId="{409D07DA-7E5C-4EF5-A9AF-5A4926BCA666}" dt="2022-09-27T21:28:03.999" v="784" actId="1076"/>
+          <ac:chgData name="Weifeng Xu" userId="e7aed605-a3dd-4d5a-a692-a87037af107b" providerId="ADAL" clId="{409D07DA-7E5C-4EF5-A9AF-5A4926BCA666}" dt="2023-09-29T12:23:36.890" v="1678" actId="1076"/>
           <ac:picMkLst>
             <pc:docMk/>
             <pc:sldMk cId="2055990861" sldId="305"/>
@@ -487,13 +519,13 @@
         </pc:picChg>
       </pc:sldChg>
       <pc:sldChg chg="addSp modSp new mod ord modClrScheme chgLayout">
-        <pc:chgData name="Weifeng Xu" userId="e7aed605-a3dd-4d5a-a692-a87037af107b" providerId="ADAL" clId="{409D07DA-7E5C-4EF5-A9AF-5A4926BCA666}" dt="2023-02-28T15:21:39.217" v="1362" actId="20577"/>
+        <pc:chgData name="Weifeng Xu" userId="e7aed605-a3dd-4d5a-a692-a87037af107b" providerId="ADAL" clId="{409D07DA-7E5C-4EF5-A9AF-5A4926BCA666}" dt="2023-09-29T15:32:23.960" v="1962" actId="6549"/>
         <pc:sldMkLst>
           <pc:docMk/>
           <pc:sldMk cId="4165459125" sldId="306"/>
         </pc:sldMkLst>
         <pc:spChg chg="mod ord">
-          <ac:chgData name="Weifeng Xu" userId="e7aed605-a3dd-4d5a-a692-a87037af107b" providerId="ADAL" clId="{409D07DA-7E5C-4EF5-A9AF-5A4926BCA666}" dt="2023-02-28T15:16:21.162" v="1033" actId="700"/>
+          <ac:chgData name="Weifeng Xu" userId="e7aed605-a3dd-4d5a-a692-a87037af107b" providerId="ADAL" clId="{409D07DA-7E5C-4EF5-A9AF-5A4926BCA666}" dt="2023-09-29T15:32:23.960" v="1962" actId="6549"/>
           <ac:spMkLst>
             <pc:docMk/>
             <pc:sldMk cId="4165459125" sldId="306"/>
@@ -501,7 +533,7 @@
           </ac:spMkLst>
         </pc:spChg>
         <pc:spChg chg="add mod ord">
-          <ac:chgData name="Weifeng Xu" userId="e7aed605-a3dd-4d5a-a692-a87037af107b" providerId="ADAL" clId="{409D07DA-7E5C-4EF5-A9AF-5A4926BCA666}" dt="2023-02-28T15:21:39.217" v="1362" actId="20577"/>
+          <ac:chgData name="Weifeng Xu" userId="e7aed605-a3dd-4d5a-a692-a87037af107b" providerId="ADAL" clId="{409D07DA-7E5C-4EF5-A9AF-5A4926BCA666}" dt="2023-09-29T12:24:58.591" v="1708" actId="20577"/>
           <ac:spMkLst>
             <pc:docMk/>
             <pc:sldMk cId="4165459125" sldId="306"/>
@@ -510,7 +542,7 @@
         </pc:spChg>
       </pc:sldChg>
       <pc:sldChg chg="modSp new mod">
-        <pc:chgData name="Weifeng Xu" userId="e7aed605-a3dd-4d5a-a692-a87037af107b" providerId="ADAL" clId="{409D07DA-7E5C-4EF5-A9AF-5A4926BCA666}" dt="2023-02-28T15:25:30.597" v="1644" actId="6549"/>
+        <pc:chgData name="Weifeng Xu" userId="e7aed605-a3dd-4d5a-a692-a87037af107b" providerId="ADAL" clId="{409D07DA-7E5C-4EF5-A9AF-5A4926BCA666}" dt="2023-09-29T12:42:57.552" v="1866" actId="20577"/>
         <pc:sldMkLst>
           <pc:docMk/>
           <pc:sldMk cId="2202518917" sldId="307"/>
@@ -524,13 +556,20 @@
           </ac:spMkLst>
         </pc:spChg>
         <pc:spChg chg="mod">
-          <ac:chgData name="Weifeng Xu" userId="e7aed605-a3dd-4d5a-a692-a87037af107b" providerId="ADAL" clId="{409D07DA-7E5C-4EF5-A9AF-5A4926BCA666}" dt="2023-02-28T15:25:30.597" v="1644" actId="6549"/>
+          <ac:chgData name="Weifeng Xu" userId="e7aed605-a3dd-4d5a-a692-a87037af107b" providerId="ADAL" clId="{409D07DA-7E5C-4EF5-A9AF-5A4926BCA666}" dt="2023-09-29T12:42:57.552" v="1866" actId="20577"/>
           <ac:spMkLst>
             <pc:docMk/>
             <pc:sldMk cId="2202518917" sldId="307"/>
             <ac:spMk id="3" creationId="{C37B6B56-2138-CADD-E2D5-70BE27CBC5CC}"/>
           </ac:spMkLst>
         </pc:spChg>
+      </pc:sldChg>
+      <pc:sldChg chg="add del">
+        <pc:chgData name="Weifeng Xu" userId="e7aed605-a3dd-4d5a-a692-a87037af107b" providerId="ADAL" clId="{409D07DA-7E5C-4EF5-A9AF-5A4926BCA666}" dt="2023-09-29T12:24:15.180" v="1683" actId="47"/>
+        <pc:sldMkLst>
+          <pc:docMk/>
+          <pc:sldMk cId="982507903" sldId="342"/>
+        </pc:sldMkLst>
       </pc:sldChg>
     </pc:docChg>
   </pc:docChgLst>
@@ -862,7 +901,7 @@
           <a:p>
             <a:fld id="{EE41F6E3-57F9-402E-BDBA-5B2DE11C8530}" type="datetimeFigureOut">
               <a:rPr lang="en-US" smtClean="0"/>
-              <a:t>2/28/2023</a:t>
+              <a:t>9/29/2023</a:t>
             </a:fld>
             <a:endParaRPr lang="en-US"/>
           </a:p>
@@ -5299,7 +5338,7 @@
           <a:p>
             <a:fld id="{4263717A-E3C1-4BED-ABE0-B7069385E023}" type="datetimeFigureOut">
               <a:rPr lang="en-US" smtClean="0"/>
-              <a:t>2/28/2023</a:t>
+              <a:t>9/29/2023</a:t>
             </a:fld>
             <a:endParaRPr lang="en-US"/>
           </a:p>
@@ -5472,7 +5511,7 @@
           <a:p>
             <a:fld id="{4263717A-E3C1-4BED-ABE0-B7069385E023}" type="datetimeFigureOut">
               <a:rPr lang="en-US" smtClean="0"/>
-              <a:t>2/28/2023</a:t>
+              <a:t>9/29/2023</a:t>
             </a:fld>
             <a:endParaRPr lang="en-US"/>
           </a:p>
@@ -5650,7 +5689,7 @@
           <a:p>
             <a:fld id="{4263717A-E3C1-4BED-ABE0-B7069385E023}" type="datetimeFigureOut">
               <a:rPr lang="en-US" smtClean="0"/>
-              <a:t>2/28/2023</a:t>
+              <a:t>9/29/2023</a:t>
             </a:fld>
             <a:endParaRPr lang="en-US"/>
           </a:p>
@@ -5818,7 +5857,7 @@
           <a:p>
             <a:fld id="{4263717A-E3C1-4BED-ABE0-B7069385E023}" type="datetimeFigureOut">
               <a:rPr lang="en-US" smtClean="0"/>
-              <a:t>2/28/2023</a:t>
+              <a:t>9/29/2023</a:t>
             </a:fld>
             <a:endParaRPr lang="en-US"/>
           </a:p>
@@ -6063,7 +6102,7 @@
           <a:p>
             <a:fld id="{4263717A-E3C1-4BED-ABE0-B7069385E023}" type="datetimeFigureOut">
               <a:rPr lang="en-US" smtClean="0"/>
-              <a:t>2/28/2023</a:t>
+              <a:t>9/29/2023</a:t>
             </a:fld>
             <a:endParaRPr lang="en-US"/>
           </a:p>
@@ -6292,7 +6331,7 @@
           <a:p>
             <a:fld id="{4263717A-E3C1-4BED-ABE0-B7069385E023}" type="datetimeFigureOut">
               <a:rPr lang="en-US" smtClean="0"/>
-              <a:t>2/28/2023</a:t>
+              <a:t>9/29/2023</a:t>
             </a:fld>
             <a:endParaRPr lang="en-US"/>
           </a:p>
@@ -6656,7 +6695,7 @@
           <a:p>
             <a:fld id="{4263717A-E3C1-4BED-ABE0-B7069385E023}" type="datetimeFigureOut">
               <a:rPr lang="en-US" smtClean="0"/>
-              <a:t>2/28/2023</a:t>
+              <a:t>9/29/2023</a:t>
             </a:fld>
             <a:endParaRPr lang="en-US"/>
           </a:p>
@@ -6773,7 +6812,7 @@
           <a:p>
             <a:fld id="{4263717A-E3C1-4BED-ABE0-B7069385E023}" type="datetimeFigureOut">
               <a:rPr lang="en-US" smtClean="0"/>
-              <a:t>2/28/2023</a:t>
+              <a:t>9/29/2023</a:t>
             </a:fld>
             <a:endParaRPr lang="en-US"/>
           </a:p>
@@ -6868,7 +6907,7 @@
           <a:p>
             <a:fld id="{4263717A-E3C1-4BED-ABE0-B7069385E023}" type="datetimeFigureOut">
               <a:rPr lang="en-US" smtClean="0"/>
-              <a:t>2/28/2023</a:t>
+              <a:t>9/29/2023</a:t>
             </a:fld>
             <a:endParaRPr lang="en-US"/>
           </a:p>
@@ -7143,7 +7182,7 @@
           <a:p>
             <a:fld id="{4263717A-E3C1-4BED-ABE0-B7069385E023}" type="datetimeFigureOut">
               <a:rPr lang="en-US" smtClean="0"/>
-              <a:t>2/28/2023</a:t>
+              <a:t>9/29/2023</a:t>
             </a:fld>
             <a:endParaRPr lang="en-US"/>
           </a:p>
@@ -7395,7 +7434,7 @@
           <a:p>
             <a:fld id="{4263717A-E3C1-4BED-ABE0-B7069385E023}" type="datetimeFigureOut">
               <a:rPr lang="en-US" smtClean="0"/>
-              <a:t>2/28/2023</a:t>
+              <a:t>9/29/2023</a:t>
             </a:fld>
             <a:endParaRPr lang="en-US"/>
           </a:p>
@@ -7606,7 +7645,7 @@
           <a:p>
             <a:fld id="{4263717A-E3C1-4BED-ABE0-B7069385E023}" type="datetimeFigureOut">
               <a:rPr lang="en-US" smtClean="0"/>
-              <a:t>2/28/2023</a:t>
+              <a:t>9/29/2023</a:t>
             </a:fld>
             <a:endParaRPr lang="en-US"/>
           </a:p>
@@ -10264,23 +10303,25 @@
           <a:p>
             <a:r>
               <a:rPr lang="en-US" dirty="0"/>
-              <a:t>Understand the compute layer that generates evidence</a:t>
-            </a:r>
-          </a:p>
-          <a:p>
-            <a:r>
-              <a:rPr lang="en-US" dirty="0"/>
-              <a:t>The approach to investigating browser history</a:t>
-            </a:r>
-          </a:p>
-          <a:p>
-            <a:r>
-              <a:rPr lang="en-US"/>
-              <a:t>Familiar </a:t>
-            </a:r>
-            <a:r>
-              <a:rPr lang="en-US" dirty="0"/>
-              <a:t>with important tools for cyber investigations</a:t>
+              <a:t>Understand the application layer of a computer system that generates evidence</a:t>
+            </a:r>
+          </a:p>
+          <a:p>
+            <a:r>
+              <a:rPr lang="en-US" dirty="0"/>
+              <a:t>Understand the behavioral model of an application</a:t>
+            </a:r>
+          </a:p>
+          <a:p>
+            <a:r>
+              <a:rPr lang="en-US" dirty="0"/>
+              <a:t>The approach to investigating browser history (evidence generated by an application)</a:t>
+            </a:r>
+          </a:p>
+          <a:p>
+            <a:r>
+              <a:rPr lang="en-US" dirty="0"/>
+              <a:t>Familiar with important tools for browser investigations</a:t>
             </a:r>
           </a:p>
         </p:txBody>
@@ -12426,8 +12467,8 @@
         </p:nvSpPr>
         <p:spPr>
           <a:xfrm>
-            <a:off x="7189393" y="6566910"/>
-            <a:ext cx="6176864" cy="261610"/>
+            <a:off x="6930313" y="6411118"/>
+            <a:ext cx="4453967" cy="261610"/>
           </a:xfrm>
           <a:prstGeom prst="rect">
             <a:avLst/>
@@ -12514,7 +12555,7 @@
         <p:spPr>
           <a:xfrm>
             <a:off x="10313457" y="2056675"/>
-            <a:ext cx="1878543" cy="2585323"/>
+            <a:ext cx="1771863" cy="2585323"/>
           </a:xfrm>
           <a:prstGeom prst="rect">
             <a:avLst/>
@@ -13366,7 +13407,15 @@
             </a:r>
             <a:r>
               <a:rPr lang="en-US" dirty="0"/>
-              <a:t> second (/1000,000)</a:t>
+              <a:t> second </a:t>
+            </a:r>
+            <a:r>
+              <a:rPr lang="en-US"/>
+              <a:t>(/1,000,000</a:t>
+            </a:r>
+            <a:r>
+              <a:rPr lang="en-US" dirty="0"/>
+              <a:t>)</a:t>
             </a:r>
           </a:p>
           <a:p>
@@ -14478,7 +14527,7 @@
         </p:blipFill>
         <p:spPr bwMode="auto">
           <a:xfrm>
-            <a:off x="1176130" y="2422973"/>
+            <a:off x="1031350" y="1942913"/>
             <a:ext cx="3576983" cy="2012053"/>
           </a:xfrm>
           <a:prstGeom prst="rect">
@@ -14525,8 +14574,8 @@
         </p:blipFill>
         <p:spPr bwMode="auto">
           <a:xfrm>
-            <a:off x="6096000" y="2716764"/>
-            <a:ext cx="4737953" cy="1424470"/>
+            <a:off x="5943600" y="1971607"/>
+            <a:ext cx="5864492" cy="1763165"/>
           </a:xfrm>
           <a:prstGeom prst="rect">
             <a:avLst/>
@@ -14557,7 +14606,7 @@
         </p:nvSpPr>
         <p:spPr>
           <a:xfrm>
-            <a:off x="5094813" y="3333250"/>
+            <a:off x="4950033" y="2853190"/>
             <a:ext cx="838772" cy="343759"/>
           </a:xfrm>
           <a:prstGeom prst="rightArrow">
@@ -14620,8 +14669,138 @@
           <a:p>
             <a:r>
               <a:rPr lang="en-US" dirty="0"/>
-              <a:t>Data generated by applications have different formats</a:t>
-            </a:r>
+              <a:t>Reconstruct behavior models from app-generated data</a:t>
+            </a:r>
+          </a:p>
+        </p:txBody>
+      </p:sp>
+      <p:pic>
+        <p:nvPicPr>
+          <p:cNvPr id="4" name="Graphic 3">
+            <a:extLst>
+              <a:ext uri="{FF2B5EF4-FFF2-40B4-BE49-F238E27FC236}">
+                <a16:creationId xmlns:a16="http://schemas.microsoft.com/office/drawing/2014/main" id="{25ABF1CC-FE20-A77D-EB47-33FDBEC4BAD0}"/>
+              </a:ext>
+            </a:extLst>
+          </p:cNvPr>
+          <p:cNvPicPr>
+            <a:picLocks noChangeAspect="1"/>
+          </p:cNvPicPr>
+          <p:nvPr/>
+        </p:nvPicPr>
+        <p:blipFill>
+          <a:blip r:embed="rId4">
+            <a:extLst>
+              <a:ext uri="{28A0092B-C50C-407E-A947-70E740481C1C}">
+                <a14:useLocalDpi xmlns:a14="http://schemas.microsoft.com/office/drawing/2010/main" val="0"/>
+              </a:ext>
+              <a:ext uri="{96DAC541-7B7A-43D3-8B79-37D633B846F1}">
+                <asvg:svgBlip xmlns:asvg="http://schemas.microsoft.com/office/drawing/2016/SVG/main" r:embed="rId5"/>
+              </a:ext>
+            </a:extLst>
+          </a:blip>
+          <a:stretch>
+            <a:fillRect/>
+          </a:stretch>
+        </p:blipFill>
+        <p:spPr>
+          <a:xfrm>
+            <a:off x="838200" y="4363824"/>
+            <a:ext cx="10515600" cy="1846982"/>
+          </a:xfrm>
+          <a:prstGeom prst="rect">
+            <a:avLst/>
+          </a:prstGeom>
+        </p:spPr>
+      </p:pic>
+      <p:sp>
+        <p:nvSpPr>
+          <p:cNvPr id="5" name="TextBox 4">
+            <a:extLst>
+              <a:ext uri="{FF2B5EF4-FFF2-40B4-BE49-F238E27FC236}">
+                <a16:creationId xmlns:a16="http://schemas.microsoft.com/office/drawing/2014/main" id="{EEEEBAA8-D425-ADA9-D1DB-CCFB2B164B15}"/>
+              </a:ext>
+            </a:extLst>
+          </p:cNvPr>
+          <p:cNvSpPr txBox="1"/>
+          <p:nvPr/>
+        </p:nvSpPr>
+        <p:spPr>
+          <a:xfrm>
+            <a:off x="1809547" y="6264147"/>
+            <a:ext cx="8789873" cy="369332"/>
+          </a:xfrm>
+          <a:prstGeom prst="rect">
+            <a:avLst/>
+          </a:prstGeom>
+          <a:noFill/>
+        </p:spPr>
+        <p:txBody>
+          <a:bodyPr wrap="square" rtlCol="0">
+            <a:spAutoFit/>
+          </a:bodyPr>
+          <a:lstStyle/>
+          <a:p>
+            <a:pPr algn="ctr"/>
+            <a:r>
+              <a:rPr lang="en-GB" dirty="0"/>
+              <a:t>A state diagram for application usage investigations</a:t>
+            </a:r>
+            <a:endParaRPr lang="en-US" dirty="0"/>
+          </a:p>
+        </p:txBody>
+      </p:sp>
+      <p:sp>
+        <p:nvSpPr>
+          <p:cNvPr id="6" name="Arrow: Right 5">
+            <a:extLst>
+              <a:ext uri="{FF2B5EF4-FFF2-40B4-BE49-F238E27FC236}">
+                <a16:creationId xmlns:a16="http://schemas.microsoft.com/office/drawing/2014/main" id="{3EB645F8-65F9-B1F6-17AB-409CBE99BDD1}"/>
+              </a:ext>
+            </a:extLst>
+          </p:cNvPr>
+          <p:cNvSpPr/>
+          <p:nvPr/>
+        </p:nvSpPr>
+        <p:spPr>
+          <a:xfrm rot="5400000">
+            <a:off x="8699073" y="3945998"/>
+            <a:ext cx="838772" cy="343759"/>
+          </a:xfrm>
+          <a:prstGeom prst="rightArrow">
+            <a:avLst/>
+          </a:prstGeom>
+          <a:solidFill>
+            <a:srgbClr val="FF0000"/>
+          </a:solidFill>
+          <a:ln>
+            <a:solidFill>
+              <a:srgbClr val="FF0000"/>
+            </a:solidFill>
+          </a:ln>
+        </p:spPr>
+        <p:style>
+          <a:lnRef idx="2">
+            <a:schemeClr val="accent1">
+              <a:shade val="50000"/>
+            </a:schemeClr>
+          </a:lnRef>
+          <a:fillRef idx="1">
+            <a:schemeClr val="accent1"/>
+          </a:fillRef>
+          <a:effectRef idx="0">
+            <a:schemeClr val="accent1"/>
+          </a:effectRef>
+          <a:fontRef idx="minor">
+            <a:schemeClr val="lt1"/>
+          </a:fontRef>
+        </p:style>
+        <p:txBody>
+          <a:bodyPr rtlCol="0" anchor="ctr"/>
+          <a:lstStyle/>
+          <a:p>
+            <a:pPr algn="ctr"/>
+            <a:endParaRPr lang="en-US"/>
           </a:p>
         </p:txBody>
       </p:sp>
@@ -15565,8 +15744,13 @@
           <a:p>
             <a:r>
               <a:rPr lang="en-US" dirty="0"/>
-              <a:t>Investigation Approach</a:t>
-            </a:r>
+              <a:t>Application Investigation Approach: Modeling</a:t>
+            </a:r>
+            <a:r>
+              <a:rPr lang="en-US" sz="2400" dirty="0"/>
+              <a:t> </a:t>
+            </a:r>
+            <a:endParaRPr lang="en-US" dirty="0"/>
           </a:p>
         </p:txBody>
       </p:sp>
@@ -15593,7 +15777,7 @@
           <a:p>
             <a:r>
               <a:rPr lang="en-US" dirty="0"/>
-              <a:t>Find all possible browsers used by suspects</a:t>
+              <a:t>Find all possible browsers (versions) used by suspects</a:t>
             </a:r>
           </a:p>
           <a:p>
@@ -15629,7 +15813,7 @@
           <a:p>
             <a:r>
               <a:rPr lang="en-US" dirty="0"/>
-              <a:t>Make conclusions</a:t>
+              <a:t>Make conclusions (with  state models)</a:t>
             </a:r>
           </a:p>
           <a:p>

</xml_diff>

<commit_message>
add Python version to NIST dataleakage case
</commit_message>
<xml_diff>
--- a/NIST_Data_Leakage_Case/NIST_Data_Leakage_03_WebHistory_SQL.pptx
+++ b/NIST_Data_Leakage_Case/NIST_Data_Leakage_03_WebHistory_SQL.pptx
@@ -162,7 +162,7 @@
 <file path=ppt/revisionInfo.xml><?xml version="1.0" encoding="utf-8"?>
 <p1510:revInfo xmlns:a="http://schemas.openxmlformats.org/drawingml/2006/main" xmlns:r="http://schemas.openxmlformats.org/officeDocument/2006/relationships" xmlns:p1510="http://schemas.microsoft.com/office/powerpoint/2015/10/main">
   <p1510:revLst>
-    <p1510:client id="{409D07DA-7E5C-4EF5-A9AF-5A4926BCA666}" v="50" dt="2023-09-29T12:29:37.752"/>
+    <p1510:client id="{409D07DA-7E5C-4EF5-A9AF-5A4926BCA666}" v="51" dt="2023-09-30T20:00:51.327"/>
   </p1510:revLst>
 </p1510:revInfo>
 </file>
@@ -212,7 +212,7 @@
   <pc:docChgLst>
     <pc:chgData name="Weifeng Xu" userId="e7aed605-a3dd-4d5a-a692-a87037af107b" providerId="ADAL" clId="{409D07DA-7E5C-4EF5-A9AF-5A4926BCA666}"/>
     <pc:docChg chg="undo custSel addSld delSld modSld sldOrd">
-      <pc:chgData name="Weifeng Xu" userId="e7aed605-a3dd-4d5a-a692-a87037af107b" providerId="ADAL" clId="{409D07DA-7E5C-4EF5-A9AF-5A4926BCA666}" dt="2023-09-29T15:32:23.960" v="1962" actId="6549"/>
+      <pc:chgData name="Weifeng Xu" userId="e7aed605-a3dd-4d5a-a692-a87037af107b" providerId="ADAL" clId="{409D07DA-7E5C-4EF5-A9AF-5A4926BCA666}" dt="2023-09-30T20:00:51.327" v="1963"/>
       <pc:docMkLst>
         <pc:docMk/>
       </pc:docMkLst>
@@ -222,6 +222,29 @@
           <pc:docMk/>
           <pc:sldMk cId="162022530" sldId="256"/>
         </pc:sldMkLst>
+      </pc:sldChg>
+      <pc:sldChg chg="addSp modSp">
+        <pc:chgData name="Weifeng Xu" userId="e7aed605-a3dd-4d5a-a692-a87037af107b" providerId="ADAL" clId="{409D07DA-7E5C-4EF5-A9AF-5A4926BCA666}" dt="2023-09-30T20:00:51.327" v="1963"/>
+        <pc:sldMkLst>
+          <pc:docMk/>
+          <pc:sldMk cId="2467373167" sldId="273"/>
+        </pc:sldMkLst>
+        <pc:spChg chg="add mod">
+          <ac:chgData name="Weifeng Xu" userId="e7aed605-a3dd-4d5a-a692-a87037af107b" providerId="ADAL" clId="{409D07DA-7E5C-4EF5-A9AF-5A4926BCA666}" dt="2023-09-30T20:00:51.327" v="1963"/>
+          <ac:spMkLst>
+            <pc:docMk/>
+            <pc:sldMk cId="2467373167" sldId="273"/>
+            <ac:spMk id="2" creationId="{A1CFE1A6-6357-323E-FC80-EB0655F1F629}"/>
+          </ac:spMkLst>
+        </pc:spChg>
+        <pc:picChg chg="add mod">
+          <ac:chgData name="Weifeng Xu" userId="e7aed605-a3dd-4d5a-a692-a87037af107b" providerId="ADAL" clId="{409D07DA-7E5C-4EF5-A9AF-5A4926BCA666}" dt="2023-09-30T20:00:51.327" v="1963"/>
+          <ac:picMkLst>
+            <pc:docMk/>
+            <pc:sldMk cId="2467373167" sldId="273"/>
+            <ac:picMk id="3" creationId="{74D27F6F-A270-A6AC-CE3D-D81B60853AFF}"/>
+          </ac:picMkLst>
+        </pc:picChg>
       </pc:sldChg>
       <pc:sldChg chg="modSp">
         <pc:chgData name="Weifeng Xu" userId="e7aed605-a3dd-4d5a-a692-a87037af107b" providerId="ADAL" clId="{409D07DA-7E5C-4EF5-A9AF-5A4926BCA666}" dt="2022-03-08T23:20:49.315" v="344" actId="20578"/>
@@ -901,7 +924,7 @@
           <a:p>
             <a:fld id="{EE41F6E3-57F9-402E-BDBA-5B2DE11C8530}" type="datetimeFigureOut">
               <a:rPr lang="en-US" smtClean="0"/>
-              <a:t>9/29/2023</a:t>
+              <a:t>9/30/2023</a:t>
             </a:fld>
             <a:endParaRPr lang="en-US"/>
           </a:p>
@@ -5338,7 +5361,7 @@
           <a:p>
             <a:fld id="{4263717A-E3C1-4BED-ABE0-B7069385E023}" type="datetimeFigureOut">
               <a:rPr lang="en-US" smtClean="0"/>
-              <a:t>9/29/2023</a:t>
+              <a:t>9/30/2023</a:t>
             </a:fld>
             <a:endParaRPr lang="en-US"/>
           </a:p>
@@ -5511,7 +5534,7 @@
           <a:p>
             <a:fld id="{4263717A-E3C1-4BED-ABE0-B7069385E023}" type="datetimeFigureOut">
               <a:rPr lang="en-US" smtClean="0"/>
-              <a:t>9/29/2023</a:t>
+              <a:t>9/30/2023</a:t>
             </a:fld>
             <a:endParaRPr lang="en-US"/>
           </a:p>
@@ -5689,7 +5712,7 @@
           <a:p>
             <a:fld id="{4263717A-E3C1-4BED-ABE0-B7069385E023}" type="datetimeFigureOut">
               <a:rPr lang="en-US" smtClean="0"/>
-              <a:t>9/29/2023</a:t>
+              <a:t>9/30/2023</a:t>
             </a:fld>
             <a:endParaRPr lang="en-US"/>
           </a:p>
@@ -5857,7 +5880,7 @@
           <a:p>
             <a:fld id="{4263717A-E3C1-4BED-ABE0-B7069385E023}" type="datetimeFigureOut">
               <a:rPr lang="en-US" smtClean="0"/>
-              <a:t>9/29/2023</a:t>
+              <a:t>9/30/2023</a:t>
             </a:fld>
             <a:endParaRPr lang="en-US"/>
           </a:p>
@@ -6102,7 +6125,7 @@
           <a:p>
             <a:fld id="{4263717A-E3C1-4BED-ABE0-B7069385E023}" type="datetimeFigureOut">
               <a:rPr lang="en-US" smtClean="0"/>
-              <a:t>9/29/2023</a:t>
+              <a:t>9/30/2023</a:t>
             </a:fld>
             <a:endParaRPr lang="en-US"/>
           </a:p>
@@ -6331,7 +6354,7 @@
           <a:p>
             <a:fld id="{4263717A-E3C1-4BED-ABE0-B7069385E023}" type="datetimeFigureOut">
               <a:rPr lang="en-US" smtClean="0"/>
-              <a:t>9/29/2023</a:t>
+              <a:t>9/30/2023</a:t>
             </a:fld>
             <a:endParaRPr lang="en-US"/>
           </a:p>
@@ -6695,7 +6718,7 @@
           <a:p>
             <a:fld id="{4263717A-E3C1-4BED-ABE0-B7069385E023}" type="datetimeFigureOut">
               <a:rPr lang="en-US" smtClean="0"/>
-              <a:t>9/29/2023</a:t>
+              <a:t>9/30/2023</a:t>
             </a:fld>
             <a:endParaRPr lang="en-US"/>
           </a:p>
@@ -6812,7 +6835,7 @@
           <a:p>
             <a:fld id="{4263717A-E3C1-4BED-ABE0-B7069385E023}" type="datetimeFigureOut">
               <a:rPr lang="en-US" smtClean="0"/>
-              <a:t>9/29/2023</a:t>
+              <a:t>9/30/2023</a:t>
             </a:fld>
             <a:endParaRPr lang="en-US"/>
           </a:p>
@@ -6907,7 +6930,7 @@
           <a:p>
             <a:fld id="{4263717A-E3C1-4BED-ABE0-B7069385E023}" type="datetimeFigureOut">
               <a:rPr lang="en-US" smtClean="0"/>
-              <a:t>9/29/2023</a:t>
+              <a:t>9/30/2023</a:t>
             </a:fld>
             <a:endParaRPr lang="en-US"/>
           </a:p>
@@ -7182,7 +7205,7 @@
           <a:p>
             <a:fld id="{4263717A-E3C1-4BED-ABE0-B7069385E023}" type="datetimeFigureOut">
               <a:rPr lang="en-US" smtClean="0"/>
-              <a:t>9/29/2023</a:t>
+              <a:t>9/30/2023</a:t>
             </a:fld>
             <a:endParaRPr lang="en-US"/>
           </a:p>
@@ -7434,7 +7457,7 @@
           <a:p>
             <a:fld id="{4263717A-E3C1-4BED-ABE0-B7069385E023}" type="datetimeFigureOut">
               <a:rPr lang="en-US" smtClean="0"/>
-              <a:t>9/29/2023</a:t>
+              <a:t>9/30/2023</a:t>
             </a:fld>
             <a:endParaRPr lang="en-US"/>
           </a:p>
@@ -7645,7 +7668,7 @@
           <a:p>
             <a:fld id="{4263717A-E3C1-4BED-ABE0-B7069385E023}" type="datetimeFigureOut">
               <a:rPr lang="en-US" smtClean="0"/>
-              <a:t>9/29/2023</a:t>
+              <a:t>9/30/2023</a:t>
             </a:fld>
             <a:endParaRPr lang="en-US"/>
           </a:p>
@@ -10023,6 +10046,96 @@
           </a:prstGeom>
         </p:spPr>
       </p:pic>
+      <p:sp>
+        <p:nvSpPr>
+          <p:cNvPr id="2" name="TextBox 1">
+            <a:extLst>
+              <a:ext uri="{FF2B5EF4-FFF2-40B4-BE49-F238E27FC236}">
+                <a16:creationId xmlns:a16="http://schemas.microsoft.com/office/drawing/2014/main" id="{A1CFE1A6-6357-323E-FC80-EB0655F1F629}"/>
+              </a:ext>
+            </a:extLst>
+          </p:cNvPr>
+          <p:cNvSpPr txBox="1"/>
+          <p:nvPr/>
+        </p:nvSpPr>
+        <p:spPr>
+          <a:xfrm>
+            <a:off x="829491" y="5433724"/>
+            <a:ext cx="8969991" cy="738664"/>
+          </a:xfrm>
+          <a:prstGeom prst="rect">
+            <a:avLst/>
+          </a:prstGeom>
+          <a:noFill/>
+        </p:spPr>
+        <p:txBody>
+          <a:bodyPr wrap="square">
+            <a:spAutoFit/>
+          </a:bodyPr>
+          <a:lstStyle/>
+          <a:p>
+            <a:r>
+              <a:rPr lang="en-US" sz="1400" dirty="0"/>
+              <a:t>Download all files used in the lab: </a:t>
+            </a:r>
+          </a:p>
+          <a:p>
+            <a:r>
+              <a:rPr lang="en-US" sz="1400" dirty="0">
+                <a:latin typeface="OCRB" panose="020B0609020202020204" pitchFamily="49" charset="0"/>
+              </a:rPr>
+              <a:t>https://github.com/frankwxu/digital-forensics-lab/tree/main/NIST_Data_Leakage_Case/NIST_Answers/lab_generated_file/webhistory</a:t>
+            </a:r>
+          </a:p>
+        </p:txBody>
+      </p:sp>
+      <p:pic>
+        <p:nvPicPr>
+          <p:cNvPr id="3" name="Picture 2" descr="Download Download Download Now Download Icon Royalty-Free Stock  Illustration Image - Pixabay">
+            <a:extLst>
+              <a:ext uri="{FF2B5EF4-FFF2-40B4-BE49-F238E27FC236}">
+                <a16:creationId xmlns:a16="http://schemas.microsoft.com/office/drawing/2014/main" id="{74D27F6F-A270-A6AC-CE3D-D81B60853AFF}"/>
+              </a:ext>
+            </a:extLst>
+          </p:cNvPr>
+          <p:cNvPicPr>
+            <a:picLocks noChangeAspect="1" noChangeArrowheads="1"/>
+          </p:cNvPicPr>
+          <p:nvPr/>
+        </p:nvPicPr>
+        <p:blipFill>
+          <a:blip r:embed="rId4">
+            <a:extLst>
+              <a:ext uri="{28A0092B-C50C-407E-A947-70E740481C1C}">
+                <a14:useLocalDpi xmlns:a14="http://schemas.microsoft.com/office/drawing/2010/main" val="0"/>
+              </a:ext>
+            </a:extLst>
+          </a:blip>
+          <a:srcRect/>
+          <a:stretch>
+            <a:fillRect/>
+          </a:stretch>
+        </p:blipFill>
+        <p:spPr bwMode="auto">
+          <a:xfrm>
+            <a:off x="829491" y="4139304"/>
+            <a:ext cx="1185273" cy="1185273"/>
+          </a:xfrm>
+          <a:prstGeom prst="rect">
+            <a:avLst/>
+          </a:prstGeom>
+          <a:noFill/>
+          <a:extLst>
+            <a:ext uri="{909E8E84-426E-40DD-AFC4-6F175D3DCCD1}">
+              <a14:hiddenFill xmlns:a14="http://schemas.microsoft.com/office/drawing/2010/main">
+                <a:solidFill>
+                  <a:srgbClr val="FFFFFF"/>
+                </a:solidFill>
+              </a14:hiddenFill>
+            </a:ext>
+          </a:extLst>
+        </p:spPr>
+      </p:pic>
     </p:spTree>
     <p:extLst>
       <p:ext uri="{BB962C8B-B14F-4D97-AF65-F5344CB8AC3E}">

</xml_diff>